<commit_message>
SPMP, SDD, RAD; ODD; TM; UM
</commit_message>
<xml_diff>
--- a/Topology-Editor.pptx
+++ b/Topology-Editor.pptx
@@ -4130,6 +4130,13 @@
         </dgm:presLayoutVars>
       </dgm:prSet>
       <dgm:spPr/>
+      <dgm:t>
+        <a:bodyPr/>
+        <a:lstStyle/>
+        <a:p>
+          <a:endParaRPr lang="de-DE"/>
+        </a:p>
+      </dgm:t>
     </dgm:pt>
     <dgm:pt modelId="{E3B93B31-32D8-4416-A261-5CA14FC031FD}" type="pres">
       <dgm:prSet presAssocID="{8EFBBE4B-BA83-4F2C-B7DC-936C70EB636B}" presName="node" presStyleLbl="node1" presStyleIdx="0" presStyleCnt="4">
@@ -4142,6 +4149,13 @@
           <a:avLst/>
         </a:prstGeom>
       </dgm:spPr>
+      <dgm:t>
+        <a:bodyPr/>
+        <a:lstStyle/>
+        <a:p>
+          <a:endParaRPr lang="de-DE"/>
+        </a:p>
+      </dgm:t>
     </dgm:pt>
     <dgm:pt modelId="{3B5584AE-7BA2-478B-B7E2-5E43981F66FA}" type="pres">
       <dgm:prSet presAssocID="{DB0B624C-66F2-49D8-AEA4-6848F2530DCF}" presName="sibTrans" presStyleCnt="0"/>
@@ -4158,6 +4172,13 @@
           <a:avLst/>
         </a:prstGeom>
       </dgm:spPr>
+      <dgm:t>
+        <a:bodyPr/>
+        <a:lstStyle/>
+        <a:p>
+          <a:endParaRPr lang="de-DE"/>
+        </a:p>
+      </dgm:t>
     </dgm:pt>
     <dgm:pt modelId="{8C23EEB9-DE69-4152-8E1E-6AE36410C6D8}" type="pres">
       <dgm:prSet presAssocID="{E55ED425-828B-4A5B-B5BB-06D44A059386}" presName="sibTrans" presStyleCnt="0"/>
@@ -4174,6 +4195,13 @@
           <a:avLst/>
         </a:prstGeom>
       </dgm:spPr>
+      <dgm:t>
+        <a:bodyPr/>
+        <a:lstStyle/>
+        <a:p>
+          <a:endParaRPr lang="de-DE"/>
+        </a:p>
+      </dgm:t>
     </dgm:pt>
     <dgm:pt modelId="{0FFEF3FD-37F8-48FE-B648-A7F88BAA6A6D}" type="pres">
       <dgm:prSet presAssocID="{2C7202BE-4A70-4084-BDB8-CD1BDB153074}" presName="sibTrans" presStyleCnt="0"/>
@@ -4190,18 +4218,25 @@
           <a:avLst/>
         </a:prstGeom>
       </dgm:spPr>
+      <dgm:t>
+        <a:bodyPr/>
+        <a:lstStyle/>
+        <a:p>
+          <a:endParaRPr lang="de-DE"/>
+        </a:p>
+      </dgm:t>
     </dgm:pt>
   </dgm:ptLst>
   <dgm:cxnLst>
-    <dgm:cxn modelId="{86FAA609-E612-4419-BD92-E19A8BACB1BC}" srcId="{E8D35918-DEFC-4FAB-9D9C-A926D32C03E2}" destId="{EB6658FB-32EB-4FEB-91DB-B3933CF4EFB8}" srcOrd="3" destOrd="0" parTransId="{273B25B5-9C13-4F3F-B879-B8C54379EB53}" sibTransId="{D0414F0D-D38A-479E-BB6E-32A4C9F47ACB}"/>
-    <dgm:cxn modelId="{423F7139-FDE8-4782-AC5E-64078F9B25D1}" type="presOf" srcId="{EB6658FB-32EB-4FEB-91DB-B3933CF4EFB8}" destId="{DACF08B4-CC41-4B4C-8B10-6FC93923333B}" srcOrd="0" destOrd="0" presId="urn:microsoft.com/office/officeart/2005/8/layout/default"/>
-    <dgm:cxn modelId="{39F9C03A-94EF-4CDD-AC63-9784937FC1E5}" srcId="{E8D35918-DEFC-4FAB-9D9C-A926D32C03E2}" destId="{A9A6F6DD-4F40-4187-B81A-C9F15234F05B}" srcOrd="2" destOrd="0" parTransId="{8D2253CA-F2F1-415F-A3E6-8F9839653CEA}" sibTransId="{2C7202BE-4A70-4084-BDB8-CD1BDB153074}"/>
+    <dgm:cxn modelId="{B591BAD1-AA9D-42FC-B7A1-80C00C2A6E60}" type="presOf" srcId="{A9A6F6DD-4F40-4187-B81A-C9F15234F05B}" destId="{773ECFB5-00D3-479A-A6EE-EFEEE6AAFC91}" srcOrd="0" destOrd="0" presId="urn:microsoft.com/office/officeart/2005/8/layout/default"/>
+    <dgm:cxn modelId="{149652F4-13F7-4811-96B1-83FDD2B8CA2C}" srcId="{E8D35918-DEFC-4FAB-9D9C-A926D32C03E2}" destId="{8EFBBE4B-BA83-4F2C-B7DC-936C70EB636B}" srcOrd="0" destOrd="0" parTransId="{BF881EC4-403E-4350-825E-DAEE2ECCFC2F}" sibTransId="{DB0B624C-66F2-49D8-AEA4-6848F2530DCF}"/>
+    <dgm:cxn modelId="{36A735B5-772F-48C6-9C34-843F80D43D13}" type="presOf" srcId="{8EFBBE4B-BA83-4F2C-B7DC-936C70EB636B}" destId="{E3B93B31-32D8-4416-A261-5CA14FC031FD}" srcOrd="0" destOrd="0" presId="urn:microsoft.com/office/officeart/2005/8/layout/default"/>
     <dgm:cxn modelId="{79B7FC6A-5AC1-43E1-AB04-6BF18E01B56D}" srcId="{E8D35918-DEFC-4FAB-9D9C-A926D32C03E2}" destId="{CB852511-358C-492D-AB64-6F5656547F15}" srcOrd="1" destOrd="0" parTransId="{26DE5FAE-7B11-409B-B190-0C1C62B423BF}" sibTransId="{E55ED425-828B-4A5B-B5BB-06D44A059386}"/>
     <dgm:cxn modelId="{5C6F617D-9874-4D39-856A-A74149CBBFF3}" type="presOf" srcId="{CB852511-358C-492D-AB64-6F5656547F15}" destId="{16FD48F7-713A-4886-A2F9-3EC26972A198}" srcOrd="0" destOrd="0" presId="urn:microsoft.com/office/officeart/2005/8/layout/default"/>
+    <dgm:cxn modelId="{423F7139-FDE8-4782-AC5E-64078F9B25D1}" type="presOf" srcId="{EB6658FB-32EB-4FEB-91DB-B3933CF4EFB8}" destId="{DACF08B4-CC41-4B4C-8B10-6FC93923333B}" srcOrd="0" destOrd="0" presId="urn:microsoft.com/office/officeart/2005/8/layout/default"/>
     <dgm:cxn modelId="{3DBFEAB1-E8EC-4097-BE64-B420E604D1E5}" type="presOf" srcId="{E8D35918-DEFC-4FAB-9D9C-A926D32C03E2}" destId="{CAE94EC1-FB26-4C6F-B916-9EC44ED63B8E}" srcOrd="0" destOrd="0" presId="urn:microsoft.com/office/officeart/2005/8/layout/default"/>
-    <dgm:cxn modelId="{36A735B5-772F-48C6-9C34-843F80D43D13}" type="presOf" srcId="{8EFBBE4B-BA83-4F2C-B7DC-936C70EB636B}" destId="{E3B93B31-32D8-4416-A261-5CA14FC031FD}" srcOrd="0" destOrd="0" presId="urn:microsoft.com/office/officeart/2005/8/layout/default"/>
-    <dgm:cxn modelId="{B591BAD1-AA9D-42FC-B7A1-80C00C2A6E60}" type="presOf" srcId="{A9A6F6DD-4F40-4187-B81A-C9F15234F05B}" destId="{773ECFB5-00D3-479A-A6EE-EFEEE6AAFC91}" srcOrd="0" destOrd="0" presId="urn:microsoft.com/office/officeart/2005/8/layout/default"/>
-    <dgm:cxn modelId="{149652F4-13F7-4811-96B1-83FDD2B8CA2C}" srcId="{E8D35918-DEFC-4FAB-9D9C-A926D32C03E2}" destId="{8EFBBE4B-BA83-4F2C-B7DC-936C70EB636B}" srcOrd="0" destOrd="0" parTransId="{BF881EC4-403E-4350-825E-DAEE2ECCFC2F}" sibTransId="{DB0B624C-66F2-49D8-AEA4-6848F2530DCF}"/>
+    <dgm:cxn modelId="{86FAA609-E612-4419-BD92-E19A8BACB1BC}" srcId="{E8D35918-DEFC-4FAB-9D9C-A926D32C03E2}" destId="{EB6658FB-32EB-4FEB-91DB-B3933CF4EFB8}" srcOrd="3" destOrd="0" parTransId="{273B25B5-9C13-4F3F-B879-B8C54379EB53}" sibTransId="{D0414F0D-D38A-479E-BB6E-32A4C9F47ACB}"/>
+    <dgm:cxn modelId="{39F9C03A-94EF-4CDD-AC63-9784937FC1E5}" srcId="{E8D35918-DEFC-4FAB-9D9C-A926D32C03E2}" destId="{A9A6F6DD-4F40-4187-B81A-C9F15234F05B}" srcOrd="2" destOrd="0" parTransId="{8D2253CA-F2F1-415F-A3E6-8F9839653CEA}" sibTransId="{2C7202BE-4A70-4084-BDB8-CD1BDB153074}"/>
     <dgm:cxn modelId="{A7293AF9-0866-4EEC-86AF-2905A46C657C}" type="presParOf" srcId="{CAE94EC1-FB26-4C6F-B916-9EC44ED63B8E}" destId="{E3B93B31-32D8-4416-A261-5CA14FC031FD}" srcOrd="0" destOrd="0" presId="urn:microsoft.com/office/officeart/2005/8/layout/default"/>
     <dgm:cxn modelId="{D484D3AB-379E-4326-87EE-B14C95A99A43}" type="presParOf" srcId="{CAE94EC1-FB26-4C6F-B916-9EC44ED63B8E}" destId="{3B5584AE-7BA2-478B-B7E2-5E43981F66FA}" srcOrd="1" destOrd="0" presId="urn:microsoft.com/office/officeart/2005/8/layout/default"/>
     <dgm:cxn modelId="{85ED0EFF-9EF1-4D5A-8783-97A1BA787DB9}" type="presParOf" srcId="{CAE94EC1-FB26-4C6F-B916-9EC44ED63B8E}" destId="{16FD48F7-713A-4886-A2F9-3EC26972A198}" srcOrd="2" destOrd="0" presId="urn:microsoft.com/office/officeart/2005/8/layout/default"/>
@@ -4327,10 +4362,24 @@
         </dgm:presLayoutVars>
       </dgm:prSet>
       <dgm:spPr/>
+      <dgm:t>
+        <a:bodyPr/>
+        <a:lstStyle/>
+        <a:p>
+          <a:endParaRPr lang="de-DE"/>
+        </a:p>
+      </dgm:t>
     </dgm:pt>
     <dgm:pt modelId="{66E3E58E-4D97-4302-A17C-EC20E70E3793}" type="pres">
       <dgm:prSet presAssocID="{E4D0EF0E-DBA2-4531-A31C-C6930D214C84}" presName="circ1" presStyleLbl="vennNode1" presStyleIdx="0" presStyleCnt="2"/>
       <dgm:spPr/>
+      <dgm:t>
+        <a:bodyPr/>
+        <a:lstStyle/>
+        <a:p>
+          <a:endParaRPr lang="de-DE"/>
+        </a:p>
+      </dgm:t>
     </dgm:pt>
     <dgm:pt modelId="{8C7BF37F-BC1E-4275-849D-5A2D4F9C3F9D}" type="pres">
       <dgm:prSet presAssocID="{E4D0EF0E-DBA2-4531-A31C-C6930D214C84}" presName="circ1Tx" presStyleLbl="revTx" presStyleIdx="0" presStyleCnt="0">
@@ -4341,10 +4390,24 @@
         </dgm:presLayoutVars>
       </dgm:prSet>
       <dgm:spPr/>
+      <dgm:t>
+        <a:bodyPr/>
+        <a:lstStyle/>
+        <a:p>
+          <a:endParaRPr lang="de-DE"/>
+        </a:p>
+      </dgm:t>
     </dgm:pt>
     <dgm:pt modelId="{A1E145C4-BD38-4E1E-9C41-61BC097FBF06}" type="pres">
       <dgm:prSet presAssocID="{077EF243-B640-473B-BB71-B7A3B8393BAE}" presName="circ2" presStyleLbl="vennNode1" presStyleIdx="1" presStyleCnt="2"/>
       <dgm:spPr/>
+      <dgm:t>
+        <a:bodyPr/>
+        <a:lstStyle/>
+        <a:p>
+          <a:endParaRPr lang="de-DE"/>
+        </a:p>
+      </dgm:t>
     </dgm:pt>
     <dgm:pt modelId="{EAC5C05D-8120-4F73-A71F-02F05BA7C2FC}" type="pres">
       <dgm:prSet presAssocID="{077EF243-B640-473B-BB71-B7A3B8393BAE}" presName="circ2Tx" presStyleLbl="revTx" presStyleIdx="0" presStyleCnt="0">
@@ -4355,16 +4418,23 @@
         </dgm:presLayoutVars>
       </dgm:prSet>
       <dgm:spPr/>
+      <dgm:t>
+        <a:bodyPr/>
+        <a:lstStyle/>
+        <a:p>
+          <a:endParaRPr lang="de-DE"/>
+        </a:p>
+      </dgm:t>
     </dgm:pt>
   </dgm:ptLst>
   <dgm:cxnLst>
+    <dgm:cxn modelId="{B33D83B8-14CA-407D-B3EC-6692ABD962B1}" srcId="{E6B90233-3499-4EBD-846D-F4882C32CF44}" destId="{E4D0EF0E-DBA2-4531-A31C-C6930D214C84}" srcOrd="0" destOrd="0" parTransId="{889FCBBC-EE1A-42B9-9566-E1F5040A8482}" sibTransId="{398041D4-FF59-4E3A-9A4B-740C42FC210F}"/>
+    <dgm:cxn modelId="{182C297E-7A65-4D99-94A3-95A9A17F6F37}" type="presOf" srcId="{E4D0EF0E-DBA2-4531-A31C-C6930D214C84}" destId="{8C7BF37F-BC1E-4275-849D-5A2D4F9C3F9D}" srcOrd="1" destOrd="0" presId="urn:microsoft.com/office/officeart/2005/8/layout/venn1"/>
     <dgm:cxn modelId="{F9827419-875B-4992-B6DB-7039F0B93327}" srcId="{E6B90233-3499-4EBD-846D-F4882C32CF44}" destId="{077EF243-B640-473B-BB71-B7A3B8393BAE}" srcOrd="1" destOrd="0" parTransId="{4C4788DA-5D99-4988-9B48-84CE93F94A46}" sibTransId="{D0203047-3670-489B-AEEE-4D042F9D2635}"/>
+    <dgm:cxn modelId="{333B35FD-8412-40C9-BA4D-66A3636BB43A}" type="presOf" srcId="{077EF243-B640-473B-BB71-B7A3B8393BAE}" destId="{A1E145C4-BD38-4E1E-9C41-61BC097FBF06}" srcOrd="0" destOrd="0" presId="urn:microsoft.com/office/officeart/2005/8/layout/venn1"/>
+    <dgm:cxn modelId="{B0DF6674-1A89-40F3-A217-035F05ED4C17}" type="presOf" srcId="{E4D0EF0E-DBA2-4531-A31C-C6930D214C84}" destId="{66E3E58E-4D97-4302-A17C-EC20E70E3793}" srcOrd="0" destOrd="0" presId="urn:microsoft.com/office/officeart/2005/8/layout/venn1"/>
+    <dgm:cxn modelId="{79080AF1-9869-4F79-A4A2-D9AF4F2C582C}" type="presOf" srcId="{E6B90233-3499-4EBD-846D-F4882C32CF44}" destId="{2D0E4173-B873-4B5F-8340-E243B4472D6D}" srcOrd="0" destOrd="0" presId="urn:microsoft.com/office/officeart/2005/8/layout/venn1"/>
     <dgm:cxn modelId="{BC0F8567-DEDD-408D-B3B0-715512DD58F9}" type="presOf" srcId="{077EF243-B640-473B-BB71-B7A3B8393BAE}" destId="{EAC5C05D-8120-4F73-A71F-02F05BA7C2FC}" srcOrd="1" destOrd="0" presId="urn:microsoft.com/office/officeart/2005/8/layout/venn1"/>
-    <dgm:cxn modelId="{B0DF6674-1A89-40F3-A217-035F05ED4C17}" type="presOf" srcId="{E4D0EF0E-DBA2-4531-A31C-C6930D214C84}" destId="{66E3E58E-4D97-4302-A17C-EC20E70E3793}" srcOrd="0" destOrd="0" presId="urn:microsoft.com/office/officeart/2005/8/layout/venn1"/>
-    <dgm:cxn modelId="{182C297E-7A65-4D99-94A3-95A9A17F6F37}" type="presOf" srcId="{E4D0EF0E-DBA2-4531-A31C-C6930D214C84}" destId="{8C7BF37F-BC1E-4275-849D-5A2D4F9C3F9D}" srcOrd="1" destOrd="0" presId="urn:microsoft.com/office/officeart/2005/8/layout/venn1"/>
-    <dgm:cxn modelId="{B33D83B8-14CA-407D-B3EC-6692ABD962B1}" srcId="{E6B90233-3499-4EBD-846D-F4882C32CF44}" destId="{E4D0EF0E-DBA2-4531-A31C-C6930D214C84}" srcOrd="0" destOrd="0" parTransId="{889FCBBC-EE1A-42B9-9566-E1F5040A8482}" sibTransId="{398041D4-FF59-4E3A-9A4B-740C42FC210F}"/>
-    <dgm:cxn modelId="{79080AF1-9869-4F79-A4A2-D9AF4F2C582C}" type="presOf" srcId="{E6B90233-3499-4EBD-846D-F4882C32CF44}" destId="{2D0E4173-B873-4B5F-8340-E243B4472D6D}" srcOrd="0" destOrd="0" presId="urn:microsoft.com/office/officeart/2005/8/layout/venn1"/>
-    <dgm:cxn modelId="{333B35FD-8412-40C9-BA4D-66A3636BB43A}" type="presOf" srcId="{077EF243-B640-473B-BB71-B7A3B8393BAE}" destId="{A1E145C4-BD38-4E1E-9C41-61BC097FBF06}" srcOrd="0" destOrd="0" presId="urn:microsoft.com/office/officeart/2005/8/layout/venn1"/>
     <dgm:cxn modelId="{1971B7E5-2280-4990-9482-3320D2F4C247}" type="presParOf" srcId="{2D0E4173-B873-4B5F-8340-E243B4472D6D}" destId="{66E3E58E-4D97-4302-A17C-EC20E70E3793}" srcOrd="0" destOrd="0" presId="urn:microsoft.com/office/officeart/2005/8/layout/venn1"/>
     <dgm:cxn modelId="{C84CA035-C07C-4E46-95F7-D4E0D5D0CFD2}" type="presParOf" srcId="{2D0E4173-B873-4B5F-8340-E243B4472D6D}" destId="{8C7BF37F-BC1E-4275-849D-5A2D4F9C3F9D}" srcOrd="1" destOrd="0" presId="urn:microsoft.com/office/officeart/2005/8/layout/venn1"/>
     <dgm:cxn modelId="{FAE84917-6A7F-4FC3-86E8-1800D8BAF973}" type="presParOf" srcId="{2D0E4173-B873-4B5F-8340-E243B4472D6D}" destId="{A1E145C4-BD38-4E1E-9C41-61BC097FBF06}" srcOrd="2" destOrd="0" presId="urn:microsoft.com/office/officeart/2005/8/layout/venn1"/>
@@ -4443,6 +4513,13 @@
         </dgm:presLayoutVars>
       </dgm:prSet>
       <dgm:spPr/>
+      <dgm:t>
+        <a:bodyPr/>
+        <a:lstStyle/>
+        <a:p>
+          <a:endParaRPr lang="de-DE"/>
+        </a:p>
+      </dgm:t>
     </dgm:pt>
     <dgm:pt modelId="{1590028B-441C-4AF2-A195-E7406520C2FB}" type="pres">
       <dgm:prSet presAssocID="{5BD8170D-6914-4F7C-989B-81251EF67F3B}" presName="parentText" presStyleLbl="node1" presStyleIdx="0" presStyleCnt="1">
@@ -4452,19 +4529,26 @@
         </dgm:presLayoutVars>
       </dgm:prSet>
       <dgm:spPr/>
+      <dgm:t>
+        <a:bodyPr/>
+        <a:lstStyle/>
+        <a:p>
+          <a:endParaRPr lang="de-DE"/>
+        </a:p>
+      </dgm:t>
     </dgm:pt>
   </dgm:ptLst>
   <dgm:cxnLst>
     <dgm:cxn modelId="{9075C053-94FF-4A20-B294-A8233963EAEB}" type="presOf" srcId="{EEAD6A1E-9E00-40A4-8663-EE403A9C61C5}" destId="{AB7EED68-1A8A-4F84-9EA5-E26DD249B0FC}" srcOrd="0" destOrd="0" presId="urn:microsoft.com/office/officeart/2005/8/layout/vList2"/>
+    <dgm:cxn modelId="{AFAB6BC8-9B46-4EC3-B1B9-2F447096845B}" srcId="{EEAD6A1E-9E00-40A4-8663-EE403A9C61C5}" destId="{5BD8170D-6914-4F7C-989B-81251EF67F3B}" srcOrd="0" destOrd="0" parTransId="{A91D8662-2E52-4FFB-BFB2-B2CC734DF2A0}" sibTransId="{FEE4E19A-E51A-427D-96AB-7BB792BD8A99}"/>
     <dgm:cxn modelId="{6A0D65AF-9225-498F-AC78-CBE08D155998}" type="presOf" srcId="{5BD8170D-6914-4F7C-989B-81251EF67F3B}" destId="{1590028B-441C-4AF2-A195-E7406520C2FB}" srcOrd="0" destOrd="0" presId="urn:microsoft.com/office/officeart/2005/8/layout/vList2"/>
-    <dgm:cxn modelId="{AFAB6BC8-9B46-4EC3-B1B9-2F447096845B}" srcId="{EEAD6A1E-9E00-40A4-8663-EE403A9C61C5}" destId="{5BD8170D-6914-4F7C-989B-81251EF67F3B}" srcOrd="0" destOrd="0" parTransId="{A91D8662-2E52-4FFB-BFB2-B2CC734DF2A0}" sibTransId="{FEE4E19A-E51A-427D-96AB-7BB792BD8A99}"/>
     <dgm:cxn modelId="{6748F089-D990-45C8-85CE-8A116D17BC5D}" type="presParOf" srcId="{AB7EED68-1A8A-4F84-9EA5-E26DD249B0FC}" destId="{1590028B-441C-4AF2-A195-E7406520C2FB}" srcOrd="0" destOrd="0" presId="urn:microsoft.com/office/officeart/2005/8/layout/vList2"/>
   </dgm:cxnLst>
   <dgm:bg/>
   <dgm:whole/>
   <dgm:extLst>
     <a:ext uri="http://schemas.microsoft.com/office/drawing/2008/diagram">
-      <dsp:dataModelExt xmlns:dsp="http://schemas.microsoft.com/office/drawing/2008/diagram" relId="rId7" minVer="http://schemas.openxmlformats.org/drawingml/2006/diagram"/>
+      <dsp:dataModelExt xmlns:dsp="http://schemas.microsoft.com/office/drawing/2008/diagram" relId="rId8" minVer="http://schemas.openxmlformats.org/drawingml/2006/diagram"/>
     </a:ext>
   </dgm:extLst>
 </dgm:dataModel>
@@ -4533,6 +4617,13 @@
         </dgm:presLayoutVars>
       </dgm:prSet>
       <dgm:spPr/>
+      <dgm:t>
+        <a:bodyPr/>
+        <a:lstStyle/>
+        <a:p>
+          <a:endParaRPr lang="de-DE"/>
+        </a:p>
+      </dgm:t>
     </dgm:pt>
     <dgm:pt modelId="{0B000412-79C1-4F4C-BD55-10878ADA0BB8}" type="pres">
       <dgm:prSet presAssocID="{963898D0-3ACE-4C7F-836F-851CC58364B7}" presName="parentText" presStyleLbl="node1" presStyleIdx="0" presStyleCnt="1" custLinFactNeighborX="-14" custLinFactNeighborY="-1534">
@@ -4542,19 +4633,26 @@
         </dgm:presLayoutVars>
       </dgm:prSet>
       <dgm:spPr/>
+      <dgm:t>
+        <a:bodyPr/>
+        <a:lstStyle/>
+        <a:p>
+          <a:endParaRPr lang="de-DE"/>
+        </a:p>
+      </dgm:t>
     </dgm:pt>
   </dgm:ptLst>
   <dgm:cxnLst>
+    <dgm:cxn modelId="{47D31DDA-ABD1-441F-AF93-1B15A40E639B}" srcId="{52C9E91C-D27C-41D0-8467-762D3E0E7337}" destId="{963898D0-3ACE-4C7F-836F-851CC58364B7}" srcOrd="0" destOrd="0" parTransId="{5FE8966D-A173-4AE0-AFB5-3BE653DF7699}" sibTransId="{43BD4552-44CA-46E5-B318-AE54330BC5DD}"/>
+    <dgm:cxn modelId="{5EB2E771-0368-46C8-91E2-49B72FEDCADC}" type="presOf" srcId="{963898D0-3ACE-4C7F-836F-851CC58364B7}" destId="{0B000412-79C1-4F4C-BD55-10878ADA0BB8}" srcOrd="0" destOrd="0" presId="urn:microsoft.com/office/officeart/2005/8/layout/vList2"/>
     <dgm:cxn modelId="{A1083C4E-5642-4E2D-8689-B28F986ABAC6}" type="presOf" srcId="{52C9E91C-D27C-41D0-8467-762D3E0E7337}" destId="{F1B56AF7-8638-4007-BA3C-03D5B8C7FCB3}" srcOrd="0" destOrd="0" presId="urn:microsoft.com/office/officeart/2005/8/layout/vList2"/>
-    <dgm:cxn modelId="{5EB2E771-0368-46C8-91E2-49B72FEDCADC}" type="presOf" srcId="{963898D0-3ACE-4C7F-836F-851CC58364B7}" destId="{0B000412-79C1-4F4C-BD55-10878ADA0BB8}" srcOrd="0" destOrd="0" presId="urn:microsoft.com/office/officeart/2005/8/layout/vList2"/>
-    <dgm:cxn modelId="{47D31DDA-ABD1-441F-AF93-1B15A40E639B}" srcId="{52C9E91C-D27C-41D0-8467-762D3E0E7337}" destId="{963898D0-3ACE-4C7F-836F-851CC58364B7}" srcOrd="0" destOrd="0" parTransId="{5FE8966D-A173-4AE0-AFB5-3BE653DF7699}" sibTransId="{43BD4552-44CA-46E5-B318-AE54330BC5DD}"/>
     <dgm:cxn modelId="{0895ABEF-F194-4261-AD32-9F9F28D13A8A}" type="presParOf" srcId="{F1B56AF7-8638-4007-BA3C-03D5B8C7FCB3}" destId="{0B000412-79C1-4F4C-BD55-10878ADA0BB8}" srcOrd="0" destOrd="0" presId="urn:microsoft.com/office/officeart/2005/8/layout/vList2"/>
   </dgm:cxnLst>
   <dgm:bg/>
   <dgm:whole/>
   <dgm:extLst>
     <a:ext uri="http://schemas.microsoft.com/office/drawing/2008/diagram">
-      <dsp:dataModelExt xmlns:dsp="http://schemas.microsoft.com/office/drawing/2008/diagram" relId="rId12" minVer="http://schemas.openxmlformats.org/drawingml/2006/diagram"/>
+      <dsp:dataModelExt xmlns:dsp="http://schemas.microsoft.com/office/drawing/2008/diagram" relId="rId13" minVer="http://schemas.openxmlformats.org/drawingml/2006/diagram"/>
     </a:ext>
   </dgm:extLst>
 </dgm:dataModel>
@@ -5228,6 +5326,13 @@
     <dgm:pt modelId="{59C231A3-4399-47E1-89DF-1C7125294808}" type="pres">
       <dgm:prSet presAssocID="{8FFAAD93-093A-4643-8666-6592133D5148}" presName="circ1" presStyleLbl="vennNode1" presStyleIdx="0" presStyleCnt="3"/>
       <dgm:spPr/>
+      <dgm:t>
+        <a:bodyPr/>
+        <a:lstStyle/>
+        <a:p>
+          <a:endParaRPr lang="de-DE"/>
+        </a:p>
+      </dgm:t>
     </dgm:pt>
     <dgm:pt modelId="{05A04829-3ADD-4A0E-AF44-AFC6C6576FCC}" type="pres">
       <dgm:prSet presAssocID="{8FFAAD93-093A-4643-8666-6592133D5148}" presName="circ1Tx" presStyleLbl="revTx" presStyleIdx="0" presStyleCnt="0">
@@ -5238,10 +5343,24 @@
         </dgm:presLayoutVars>
       </dgm:prSet>
       <dgm:spPr/>
+      <dgm:t>
+        <a:bodyPr/>
+        <a:lstStyle/>
+        <a:p>
+          <a:endParaRPr lang="de-DE"/>
+        </a:p>
+      </dgm:t>
     </dgm:pt>
     <dgm:pt modelId="{A0DFDC1B-77C7-48EB-A021-78AA69786ADD}" type="pres">
       <dgm:prSet presAssocID="{E8D6131E-3A0B-413C-A175-032074A7C8CD}" presName="circ2" presStyleLbl="vennNode1" presStyleIdx="1" presStyleCnt="3"/>
       <dgm:spPr/>
+      <dgm:t>
+        <a:bodyPr/>
+        <a:lstStyle/>
+        <a:p>
+          <a:endParaRPr lang="de-DE"/>
+        </a:p>
+      </dgm:t>
     </dgm:pt>
     <dgm:pt modelId="{9FF6521E-F963-4CC7-985F-8DE096D1D719}" type="pres">
       <dgm:prSet presAssocID="{E8D6131E-3A0B-413C-A175-032074A7C8CD}" presName="circ2Tx" presStyleLbl="revTx" presStyleIdx="0" presStyleCnt="0">
@@ -5252,10 +5371,24 @@
         </dgm:presLayoutVars>
       </dgm:prSet>
       <dgm:spPr/>
+      <dgm:t>
+        <a:bodyPr/>
+        <a:lstStyle/>
+        <a:p>
+          <a:endParaRPr lang="de-DE"/>
+        </a:p>
+      </dgm:t>
     </dgm:pt>
     <dgm:pt modelId="{0B0A4924-9448-4041-80D8-5133D77B1EF8}" type="pres">
       <dgm:prSet presAssocID="{C43C6B0E-82E8-459E-90D3-8FA28CDB9FEB}" presName="circ3" presStyleLbl="vennNode1" presStyleIdx="2" presStyleCnt="3" custLinFactNeighborX="-368" custLinFactNeighborY="-1797"/>
       <dgm:spPr/>
+      <dgm:t>
+        <a:bodyPr/>
+        <a:lstStyle/>
+        <a:p>
+          <a:endParaRPr lang="de-DE"/>
+        </a:p>
+      </dgm:t>
     </dgm:pt>
     <dgm:pt modelId="{23A5DA59-5A2F-44EA-A611-B33241847054}" type="pres">
       <dgm:prSet presAssocID="{C43C6B0E-82E8-459E-90D3-8FA28CDB9FEB}" presName="circ3Tx" presStyleLbl="revTx" presStyleIdx="0" presStyleCnt="0">
@@ -5266,64 +5399,71 @@
         </dgm:presLayoutVars>
       </dgm:prSet>
       <dgm:spPr/>
+      <dgm:t>
+        <a:bodyPr/>
+        <a:lstStyle/>
+        <a:p>
+          <a:endParaRPr lang="de-DE"/>
+        </a:p>
+      </dgm:t>
     </dgm:pt>
   </dgm:ptLst>
   <dgm:cxnLst>
-    <dgm:cxn modelId="{36391700-0362-45E5-86EA-8CA66C74C9B6}" type="presOf" srcId="{8FFAAD93-093A-4643-8666-6592133D5148}" destId="{59C231A3-4399-47E1-89DF-1C7125294808}" srcOrd="0" destOrd="0" presId="urn:microsoft.com/office/officeart/2005/8/layout/venn1"/>
-    <dgm:cxn modelId="{7A2FDA00-A953-4B39-9EFF-4175B7C7C32C}" type="presOf" srcId="{FC4407A3-4517-45E9-A03A-4F0190D76EDC}" destId="{59C231A3-4399-47E1-89DF-1C7125294808}" srcOrd="0" destOrd="1" presId="urn:microsoft.com/office/officeart/2005/8/layout/venn1"/>
     <dgm:cxn modelId="{C3FB9803-EF08-4F06-8E1E-DEA27C82DF1D}" type="presOf" srcId="{AE952CBC-AFBB-46D7-9562-B6107CA30E37}" destId="{A0DFDC1B-77C7-48EB-A021-78AA69786ADD}" srcOrd="0" destOrd="3" presId="urn:microsoft.com/office/officeart/2005/8/layout/venn1"/>
-    <dgm:cxn modelId="{DA1A8607-4CBA-41DE-9E7B-D89BDDFA81A3}" type="presOf" srcId="{15CBFCD6-3559-44E7-834A-375076522B1E}" destId="{0B0A4924-9448-4041-80D8-5133D77B1EF8}" srcOrd="0" destOrd="2" presId="urn:microsoft.com/office/officeart/2005/8/layout/venn1"/>
-    <dgm:cxn modelId="{378A8F0D-0AC3-4D7A-8286-7AE1F1CB9A4D}" type="presOf" srcId="{AE952CBC-AFBB-46D7-9562-B6107CA30E37}" destId="{9FF6521E-F963-4CC7-985F-8DE096D1D719}" srcOrd="1" destOrd="3" presId="urn:microsoft.com/office/officeart/2005/8/layout/venn1"/>
+    <dgm:cxn modelId="{A78C7EA7-1230-40E6-BDA7-3A1024414BC4}" type="presOf" srcId="{0D9103D6-0E0B-4A01-A0C2-A3D312E3F222}" destId="{23A5DA59-5A2F-44EA-A611-B33241847054}" srcOrd="1" destOrd="1" presId="urn:microsoft.com/office/officeart/2005/8/layout/venn1"/>
+    <dgm:cxn modelId="{D5854DC4-F81A-4FA2-80DB-7C7DBD12B42B}" srcId="{8FFAAD93-093A-4643-8666-6592133D5148}" destId="{B91FAD6A-8684-422F-8011-C8437909F67A}" srcOrd="1" destOrd="0" parTransId="{A792254C-7132-40A7-AE58-4421DC5EC861}" sibTransId="{2C588BD9-162A-4022-AF7B-2B78D08FB1DD}"/>
+    <dgm:cxn modelId="{0293A3AF-4ACB-4C8F-BB88-94B74219B65D}" type="presOf" srcId="{C43C6B0E-82E8-459E-90D3-8FA28CDB9FEB}" destId="{23A5DA59-5A2F-44EA-A611-B33241847054}" srcOrd="1" destOrd="0" presId="urn:microsoft.com/office/officeart/2005/8/layout/venn1"/>
+    <dgm:cxn modelId="{AB854BEB-DA56-4C77-A7A8-11C935F1A966}" type="presOf" srcId="{E8D6131E-3A0B-413C-A175-032074A7C8CD}" destId="{9FF6521E-F963-4CC7-985F-8DE096D1D719}" srcOrd="1" destOrd="0" presId="urn:microsoft.com/office/officeart/2005/8/layout/venn1"/>
+    <dgm:cxn modelId="{C1E0688A-C9FB-4CCF-9970-AAA0AB97FED8}" type="presOf" srcId="{9E1FD446-4E0A-4888-B45A-C24376B4CA33}" destId="{23A5DA59-5A2F-44EA-A611-B33241847054}" srcOrd="1" destOrd="3" presId="urn:microsoft.com/office/officeart/2005/8/layout/venn1"/>
+    <dgm:cxn modelId="{A79E1CD5-A539-40D4-85A5-EC2DD800039B}" type="presOf" srcId="{CD3BB932-1D7F-411F-8971-F6ADE642AEF2}" destId="{0B0A4924-9448-4041-80D8-5133D77B1EF8}" srcOrd="0" destOrd="4" presId="urn:microsoft.com/office/officeart/2005/8/layout/venn1"/>
     <dgm:cxn modelId="{12EB0213-BF67-4F4A-98AE-8BC4CEC58680}" srcId="{E8D6131E-3A0B-413C-A175-032074A7C8CD}" destId="{345FF024-0154-4AED-8D4F-D740CFF56DB4}" srcOrd="1" destOrd="0" parTransId="{DED5F523-A82A-4921-BEC4-CB77633F1A18}" sibTransId="{34246D6E-C3F0-4E13-8467-9BD04A8E94B2}"/>
-    <dgm:cxn modelId="{E09F531A-CD92-441D-96EB-680FED7EC68E}" type="presOf" srcId="{B91FAD6A-8684-422F-8011-C8437909F67A}" destId="{59C231A3-4399-47E1-89DF-1C7125294808}" srcOrd="0" destOrd="2" presId="urn:microsoft.com/office/officeart/2005/8/layout/venn1"/>
-    <dgm:cxn modelId="{266EFA1E-A305-4EE5-A882-4848E508A991}" type="presOf" srcId="{2FEA0FE4-34BA-4CAD-A918-D2CC4C70FC09}" destId="{23A5DA59-5A2F-44EA-A611-B33241847054}" srcOrd="1" destOrd="5" presId="urn:microsoft.com/office/officeart/2005/8/layout/venn1"/>
-    <dgm:cxn modelId="{1543BB28-2793-43C8-993A-8A943AF4481F}" srcId="{C43C6B0E-82E8-459E-90D3-8FA28CDB9FEB}" destId="{15CBFCD6-3559-44E7-834A-375076522B1E}" srcOrd="1" destOrd="0" parTransId="{2BDC8AB9-9099-48BF-8978-2CCF0FE0092B}" sibTransId="{96C5A207-380A-4897-BC7D-08AA38B8E6E0}"/>
-    <dgm:cxn modelId="{2AE0BB2C-D3BA-4191-8DA9-349466BA091C}" srcId="{0266A603-8232-4D71-B200-E5FE68D18F3F}" destId="{8FFAAD93-093A-4643-8666-6592133D5148}" srcOrd="0" destOrd="0" parTransId="{0EF3D4AB-DF62-4B12-9E7C-B625D3E22117}" sibTransId="{DD346E06-9D81-468D-B484-5A437B8B67C8}"/>
     <dgm:cxn modelId="{4C641434-2AFA-445A-A904-B27E1D3B8AFD}" srcId="{0266A603-8232-4D71-B200-E5FE68D18F3F}" destId="{C43C6B0E-82E8-459E-90D3-8FA28CDB9FEB}" srcOrd="2" destOrd="0" parTransId="{3A02CFBF-18DC-449F-9D07-D592D03DB4B9}" sibTransId="{BA408F00-8943-4CF4-A1AE-2FE0384E996C}"/>
-    <dgm:cxn modelId="{DDD97535-BB86-4EE5-A9DF-CFE0EB2F8521}" type="presOf" srcId="{FC92CE58-B219-47E7-B200-5C27E4A0F990}" destId="{05A04829-3ADD-4A0E-AF44-AFC6C6576FCC}" srcOrd="1" destOrd="5" presId="urn:microsoft.com/office/officeart/2005/8/layout/venn1"/>
-    <dgm:cxn modelId="{579AB135-88FB-4CCA-BA8D-32F30557EE0D}" type="presOf" srcId="{2CA1279D-C9E1-4254-95B4-AAC304B533A6}" destId="{59C231A3-4399-47E1-89DF-1C7125294808}" srcOrd="0" destOrd="3" presId="urn:microsoft.com/office/officeart/2005/8/layout/venn1"/>
-    <dgm:cxn modelId="{4A3E203D-EF88-463B-BFF5-F18F17A13201}" srcId="{C43C6B0E-82E8-459E-90D3-8FA28CDB9FEB}" destId="{CD3BB932-1D7F-411F-8971-F6ADE642AEF2}" srcOrd="3" destOrd="0" parTransId="{A2EFBDA0-4BB4-4A00-B9FC-4E9D544F850F}" sibTransId="{A423818E-CA79-49E2-9AB4-DDC02DE50575}"/>
-    <dgm:cxn modelId="{FCC1E85C-8D8F-4801-A8FC-41D62D5A5514}" srcId="{E8D6131E-3A0B-413C-A175-032074A7C8CD}" destId="{9997303C-1FFF-4B91-BAB7-2DA3BF7A2831}" srcOrd="0" destOrd="0" parTransId="{EF0D375C-04B7-4798-8AEF-201C8B6E85F3}" sibTransId="{19E359EB-905A-4BC4-97E0-B01B85EE99BD}"/>
-    <dgm:cxn modelId="{11CFA841-1C7B-459D-A9DD-20E73F9B1700}" type="presOf" srcId="{E8D6131E-3A0B-413C-A175-032074A7C8CD}" destId="{A0DFDC1B-77C7-48EB-A021-78AA69786ADD}" srcOrd="0" destOrd="0" presId="urn:microsoft.com/office/officeart/2005/8/layout/venn1"/>
-    <dgm:cxn modelId="{300E2264-29DE-4C65-AB6C-FC5FDE9551AA}" srcId="{E8D6131E-3A0B-413C-A175-032074A7C8CD}" destId="{4A47A56A-111E-4E82-BB41-959D8C716F07}" srcOrd="3" destOrd="0" parTransId="{2B8AEA3B-1339-4898-A438-20A76057A93C}" sibTransId="{E716280C-071B-4151-8DB0-FA8E7410CBDC}"/>
-    <dgm:cxn modelId="{735EE164-1F70-40B0-9FCB-70FB09CB7C2D}" type="presOf" srcId="{15CBFCD6-3559-44E7-834A-375076522B1E}" destId="{23A5DA59-5A2F-44EA-A611-B33241847054}" srcOrd="1" destOrd="2" presId="urn:microsoft.com/office/officeart/2005/8/layout/venn1"/>
-    <dgm:cxn modelId="{97851D67-2952-4049-AD5B-21A115667EEA}" type="presOf" srcId="{9E1FD446-4E0A-4888-B45A-C24376B4CA33}" destId="{0B0A4924-9448-4041-80D8-5133D77B1EF8}" srcOrd="0" destOrd="3" presId="urn:microsoft.com/office/officeart/2005/8/layout/venn1"/>
-    <dgm:cxn modelId="{80506249-D989-4ED3-BB63-0DA863A8703E}" type="presOf" srcId="{1D17ADD5-EDE9-4D10-B8FE-B9BEDF47454D}" destId="{A0DFDC1B-77C7-48EB-A021-78AA69786ADD}" srcOrd="0" destOrd="5" presId="urn:microsoft.com/office/officeart/2005/8/layout/venn1"/>
+    <dgm:cxn modelId="{1957E67E-0C8E-493C-83AE-20E4C7127FB6}" type="presOf" srcId="{FC92CE58-B219-47E7-B200-5C27E4A0F990}" destId="{59C231A3-4399-47E1-89DF-1C7125294808}" srcOrd="0" destOrd="5" presId="urn:microsoft.com/office/officeart/2005/8/layout/venn1"/>
+    <dgm:cxn modelId="{451FA8C3-F2C2-4934-9710-54746AB631D6}" type="presOf" srcId="{9997303C-1FFF-4B91-BAB7-2DA3BF7A2831}" destId="{9FF6521E-F963-4CC7-985F-8DE096D1D719}" srcOrd="1" destOrd="1" presId="urn:microsoft.com/office/officeart/2005/8/layout/venn1"/>
+    <dgm:cxn modelId="{0797F2B3-6251-47F4-BFB8-9C22FB837E90}" type="presOf" srcId="{8FFAAD93-093A-4643-8666-6592133D5148}" destId="{05A04829-3ADD-4A0E-AF44-AFC6C6576FCC}" srcOrd="1" destOrd="0" presId="urn:microsoft.com/office/officeart/2005/8/layout/venn1"/>
+    <dgm:cxn modelId="{6EF51F9D-9EDD-45E2-81C9-3886726A9979}" type="presOf" srcId="{4A47A56A-111E-4E82-BB41-959D8C716F07}" destId="{9FF6521E-F963-4CC7-985F-8DE096D1D719}" srcOrd="1" destOrd="4" presId="urn:microsoft.com/office/officeart/2005/8/layout/venn1"/>
     <dgm:cxn modelId="{0BB89B71-3713-4C02-8B24-5D365C3BA271}" srcId="{C43C6B0E-82E8-459E-90D3-8FA28CDB9FEB}" destId="{9E1FD446-4E0A-4888-B45A-C24376B4CA33}" srcOrd="2" destOrd="0" parTransId="{D3BCD53E-21F0-48B8-BC8A-C4599C850072}" sibTransId="{07FB338E-75D2-45C3-8256-12C1B078B611}"/>
     <dgm:cxn modelId="{CD6BC852-AEF1-4685-B23B-68EF73B1EF2C}" srcId="{C43C6B0E-82E8-459E-90D3-8FA28CDB9FEB}" destId="{2FEA0FE4-34BA-4CAD-A918-D2CC4C70FC09}" srcOrd="4" destOrd="0" parTransId="{34ED3A9A-8E79-4098-8385-4C66C655F964}" sibTransId="{843ABC16-560E-4351-8957-CD859503BAA4}"/>
+    <dgm:cxn modelId="{257BAFCB-0E0B-4A74-8E02-4D534F4BD4B8}" type="presOf" srcId="{345FF024-0154-4AED-8D4F-D740CFF56DB4}" destId="{9FF6521E-F963-4CC7-985F-8DE096D1D719}" srcOrd="1" destOrd="2" presId="urn:microsoft.com/office/officeart/2005/8/layout/venn1"/>
+    <dgm:cxn modelId="{11CFA841-1C7B-459D-A9DD-20E73F9B1700}" type="presOf" srcId="{E8D6131E-3A0B-413C-A175-032074A7C8CD}" destId="{A0DFDC1B-77C7-48EB-A021-78AA69786ADD}" srcOrd="0" destOrd="0" presId="urn:microsoft.com/office/officeart/2005/8/layout/venn1"/>
+    <dgm:cxn modelId="{DDD97535-BB86-4EE5-A9DF-CFE0EB2F8521}" type="presOf" srcId="{FC92CE58-B219-47E7-B200-5C27E4A0F990}" destId="{05A04829-3ADD-4A0E-AF44-AFC6C6576FCC}" srcOrd="1" destOrd="5" presId="urn:microsoft.com/office/officeart/2005/8/layout/venn1"/>
+    <dgm:cxn modelId="{4A3E203D-EF88-463B-BFF5-F18F17A13201}" srcId="{C43C6B0E-82E8-459E-90D3-8FA28CDB9FEB}" destId="{CD3BB932-1D7F-411F-8971-F6ADE642AEF2}" srcOrd="3" destOrd="0" parTransId="{A2EFBDA0-4BB4-4A00-B9FC-4E9D544F850F}" sibTransId="{A423818E-CA79-49E2-9AB4-DDC02DE50575}"/>
     <dgm:cxn modelId="{BF2C2474-CB8C-423F-8679-13C4E153F4D6}" type="presOf" srcId="{4A47A56A-111E-4E82-BB41-959D8C716F07}" destId="{A0DFDC1B-77C7-48EB-A021-78AA69786ADD}" srcOrd="0" destOrd="4" presId="urn:microsoft.com/office/officeart/2005/8/layout/venn1"/>
-    <dgm:cxn modelId="{9565E676-F665-4438-933C-AD9D6A714537}" srcId="{0266A603-8232-4D71-B200-E5FE68D18F3F}" destId="{E8D6131E-3A0B-413C-A175-032074A7C8CD}" srcOrd="1" destOrd="0" parTransId="{2DFF84A4-06B4-4DE0-9EA7-677B263B0A4E}" sibTransId="{0206CF11-AF04-44BF-8AAA-B0D459371092}"/>
+    <dgm:cxn modelId="{80506249-D989-4ED3-BB63-0DA863A8703E}" type="presOf" srcId="{1D17ADD5-EDE9-4D10-B8FE-B9BEDF47454D}" destId="{A0DFDC1B-77C7-48EB-A021-78AA69786ADD}" srcOrd="0" destOrd="5" presId="urn:microsoft.com/office/officeart/2005/8/layout/venn1"/>
+    <dgm:cxn modelId="{E09F531A-CD92-441D-96EB-680FED7EC68E}" type="presOf" srcId="{B91FAD6A-8684-422F-8011-C8437909F67A}" destId="{59C231A3-4399-47E1-89DF-1C7125294808}" srcOrd="0" destOrd="2" presId="urn:microsoft.com/office/officeart/2005/8/layout/venn1"/>
+    <dgm:cxn modelId="{DA1A8607-4CBA-41DE-9E7B-D89BDDFA81A3}" type="presOf" srcId="{15CBFCD6-3559-44E7-834A-375076522B1E}" destId="{0B0A4924-9448-4041-80D8-5133D77B1EF8}" srcOrd="0" destOrd="2" presId="urn:microsoft.com/office/officeart/2005/8/layout/venn1"/>
+    <dgm:cxn modelId="{36391700-0362-45E5-86EA-8CA66C74C9B6}" type="presOf" srcId="{8FFAAD93-093A-4643-8666-6592133D5148}" destId="{59C231A3-4399-47E1-89DF-1C7125294808}" srcOrd="0" destOrd="0" presId="urn:microsoft.com/office/officeart/2005/8/layout/venn1"/>
+    <dgm:cxn modelId="{09BF0CC4-F5A7-42ED-A5D3-BB6B3A7218EB}" type="presOf" srcId="{2CA1279D-C9E1-4254-95B4-AAC304B533A6}" destId="{05A04829-3ADD-4A0E-AF44-AFC6C6576FCC}" srcOrd="1" destOrd="3" presId="urn:microsoft.com/office/officeart/2005/8/layout/venn1"/>
+    <dgm:cxn modelId="{939FBD9F-3DCE-4621-9E2D-7239689574A6}" type="presOf" srcId="{CD3BB932-1D7F-411F-8971-F6ADE642AEF2}" destId="{23A5DA59-5A2F-44EA-A611-B33241847054}" srcOrd="1" destOrd="4" presId="urn:microsoft.com/office/officeart/2005/8/layout/venn1"/>
+    <dgm:cxn modelId="{579AB135-88FB-4CCA-BA8D-32F30557EE0D}" type="presOf" srcId="{2CA1279D-C9E1-4254-95B4-AAC304B533A6}" destId="{59C231A3-4399-47E1-89DF-1C7125294808}" srcOrd="0" destOrd="3" presId="urn:microsoft.com/office/officeart/2005/8/layout/venn1"/>
+    <dgm:cxn modelId="{266EFA1E-A305-4EE5-A882-4848E508A991}" type="presOf" srcId="{2FEA0FE4-34BA-4CAD-A918-D2CC4C70FC09}" destId="{23A5DA59-5A2F-44EA-A611-B33241847054}" srcOrd="1" destOrd="5" presId="urn:microsoft.com/office/officeart/2005/8/layout/venn1"/>
+    <dgm:cxn modelId="{378A8F0D-0AC3-4D7A-8286-7AE1F1CB9A4D}" type="presOf" srcId="{AE952CBC-AFBB-46D7-9562-B6107CA30E37}" destId="{9FF6521E-F963-4CC7-985F-8DE096D1D719}" srcOrd="1" destOrd="3" presId="urn:microsoft.com/office/officeart/2005/8/layout/venn1"/>
+    <dgm:cxn modelId="{98EB3BC1-3459-49EB-B008-68B127B2329B}" srcId="{E8D6131E-3A0B-413C-A175-032074A7C8CD}" destId="{1D17ADD5-EDE9-4D10-B8FE-B9BEDF47454D}" srcOrd="4" destOrd="0" parTransId="{49E298D7-1760-4CAC-8C82-F847AF980F72}" sibTransId="{62913C03-8430-4F72-881A-A1298FFEAFD9}"/>
+    <dgm:cxn modelId="{9D7A6090-F586-49A2-A90C-12ED958EC70E}" type="presOf" srcId="{1D17ADD5-EDE9-4D10-B8FE-B9BEDF47454D}" destId="{9FF6521E-F963-4CC7-985F-8DE096D1D719}" srcOrd="1" destOrd="5" presId="urn:microsoft.com/office/officeart/2005/8/layout/venn1"/>
+    <dgm:cxn modelId="{735EE164-1F70-40B0-9FCB-70FB09CB7C2D}" type="presOf" srcId="{15CBFCD6-3559-44E7-834A-375076522B1E}" destId="{23A5DA59-5A2F-44EA-A611-B33241847054}" srcOrd="1" destOrd="2" presId="urn:microsoft.com/office/officeart/2005/8/layout/venn1"/>
+    <dgm:cxn modelId="{3E7A1EBC-B8FF-4903-A794-99A63AA373B7}" srcId="{8FFAAD93-093A-4643-8666-6592133D5148}" destId="{FC4407A3-4517-45E9-A03A-4F0190D76EDC}" srcOrd="0" destOrd="0" parTransId="{CCF611A2-4C28-4056-95E0-BC1D65ECB54B}" sibTransId="{C2E3399E-AAEE-4906-8423-00867DEEE52B}"/>
+    <dgm:cxn modelId="{2AE0BB2C-D3BA-4191-8DA9-349466BA091C}" srcId="{0266A603-8232-4D71-B200-E5FE68D18F3F}" destId="{8FFAAD93-093A-4643-8666-6592133D5148}" srcOrd="0" destOrd="0" parTransId="{0EF3D4AB-DF62-4B12-9E7C-B625D3E22117}" sibTransId="{DD346E06-9D81-468D-B484-5A437B8B67C8}"/>
+    <dgm:cxn modelId="{7A2FDA00-A953-4B39-9EFF-4175B7C7C32C}" type="presOf" srcId="{FC4407A3-4517-45E9-A03A-4F0190D76EDC}" destId="{59C231A3-4399-47E1-89DF-1C7125294808}" srcOrd="0" destOrd="1" presId="urn:microsoft.com/office/officeart/2005/8/layout/venn1"/>
+    <dgm:cxn modelId="{E0D1A9B3-DB83-45E4-908B-8F02C3F1AC9D}" type="presOf" srcId="{9997303C-1FFF-4B91-BAB7-2DA3BF7A2831}" destId="{A0DFDC1B-77C7-48EB-A021-78AA69786ADD}" srcOrd="0" destOrd="1" presId="urn:microsoft.com/office/officeart/2005/8/layout/venn1"/>
+    <dgm:cxn modelId="{92FAAEB1-ED8B-4322-85F6-49BE2975C0A7}" srcId="{8FFAAD93-093A-4643-8666-6592133D5148}" destId="{FC92CE58-B219-47E7-B200-5C27E4A0F990}" srcOrd="4" destOrd="0" parTransId="{6B3440AC-FF9F-49AC-9EED-52367445DD2B}" sibTransId="{E4DA5AAC-EC3E-4EED-B347-9097D05713F8}"/>
+    <dgm:cxn modelId="{FD02E0E9-09A3-473A-808B-F01E4D57FE2A}" type="presOf" srcId="{FC4407A3-4517-45E9-A03A-4F0190D76EDC}" destId="{05A04829-3ADD-4A0E-AF44-AFC6C6576FCC}" srcOrd="1" destOrd="1" presId="urn:microsoft.com/office/officeart/2005/8/layout/venn1"/>
     <dgm:cxn modelId="{C687215A-9BA5-46D3-8880-2F277B629C47}" type="presOf" srcId="{B91FAD6A-8684-422F-8011-C8437909F67A}" destId="{05A04829-3ADD-4A0E-AF44-AFC6C6576FCC}" srcOrd="1" destOrd="2" presId="urn:microsoft.com/office/officeart/2005/8/layout/venn1"/>
-    <dgm:cxn modelId="{15272A7C-2627-495B-AABC-9C936DD8F01C}" type="presOf" srcId="{0D9103D6-0E0B-4A01-A0C2-A3D312E3F222}" destId="{0B0A4924-9448-4041-80D8-5133D77B1EF8}" srcOrd="0" destOrd="1" presId="urn:microsoft.com/office/officeart/2005/8/layout/venn1"/>
-    <dgm:cxn modelId="{1957E67E-0C8E-493C-83AE-20E4C7127FB6}" type="presOf" srcId="{FC92CE58-B219-47E7-B200-5C27E4A0F990}" destId="{59C231A3-4399-47E1-89DF-1C7125294808}" srcOrd="0" destOrd="5" presId="urn:microsoft.com/office/officeart/2005/8/layout/venn1"/>
-    <dgm:cxn modelId="{C1E0688A-C9FB-4CCF-9970-AAA0AB97FED8}" type="presOf" srcId="{9E1FD446-4E0A-4888-B45A-C24376B4CA33}" destId="{23A5DA59-5A2F-44EA-A611-B33241847054}" srcOrd="1" destOrd="3" presId="urn:microsoft.com/office/officeart/2005/8/layout/venn1"/>
     <dgm:cxn modelId="{6BD60790-1B6B-4099-8027-E518E7AACB14}" type="presOf" srcId="{0266A603-8232-4D71-B200-E5FE68D18F3F}" destId="{11300E79-F0C0-45BF-A27C-36DBA708EADA}" srcOrd="0" destOrd="0" presId="urn:microsoft.com/office/officeart/2005/8/layout/venn1"/>
-    <dgm:cxn modelId="{9D7A6090-F586-49A2-A90C-12ED958EC70E}" type="presOf" srcId="{1D17ADD5-EDE9-4D10-B8FE-B9BEDF47454D}" destId="{9FF6521E-F963-4CC7-985F-8DE096D1D719}" srcOrd="1" destOrd="5" presId="urn:microsoft.com/office/officeart/2005/8/layout/venn1"/>
     <dgm:cxn modelId="{033B3695-04DD-4CD9-9766-B5B9B21B8F5F}" type="presOf" srcId="{345FF024-0154-4AED-8D4F-D740CFF56DB4}" destId="{A0DFDC1B-77C7-48EB-A021-78AA69786ADD}" srcOrd="0" destOrd="2" presId="urn:microsoft.com/office/officeart/2005/8/layout/venn1"/>
-    <dgm:cxn modelId="{6EF51F9D-9EDD-45E2-81C9-3886726A9979}" type="presOf" srcId="{4A47A56A-111E-4E82-BB41-959D8C716F07}" destId="{9FF6521E-F963-4CC7-985F-8DE096D1D719}" srcOrd="1" destOrd="4" presId="urn:microsoft.com/office/officeart/2005/8/layout/venn1"/>
-    <dgm:cxn modelId="{939FBD9F-3DCE-4621-9E2D-7239689574A6}" type="presOf" srcId="{CD3BB932-1D7F-411F-8971-F6ADE642AEF2}" destId="{23A5DA59-5A2F-44EA-A611-B33241847054}" srcOrd="1" destOrd="4" presId="urn:microsoft.com/office/officeart/2005/8/layout/venn1"/>
-    <dgm:cxn modelId="{A78C7EA7-1230-40E6-BDA7-3A1024414BC4}" type="presOf" srcId="{0D9103D6-0E0B-4A01-A0C2-A3D312E3F222}" destId="{23A5DA59-5A2F-44EA-A611-B33241847054}" srcOrd="1" destOrd="1" presId="urn:microsoft.com/office/officeart/2005/8/layout/venn1"/>
-    <dgm:cxn modelId="{0293A3AF-4ACB-4C8F-BB88-94B74219B65D}" type="presOf" srcId="{C43C6B0E-82E8-459E-90D3-8FA28CDB9FEB}" destId="{23A5DA59-5A2F-44EA-A611-B33241847054}" srcOrd="1" destOrd="0" presId="urn:microsoft.com/office/officeart/2005/8/layout/venn1"/>
-    <dgm:cxn modelId="{92FAAEB1-ED8B-4322-85F6-49BE2975C0A7}" srcId="{8FFAAD93-093A-4643-8666-6592133D5148}" destId="{FC92CE58-B219-47E7-B200-5C27E4A0F990}" srcOrd="4" destOrd="0" parTransId="{6B3440AC-FF9F-49AC-9EED-52367445DD2B}" sibTransId="{E4DA5AAC-EC3E-4EED-B347-9097D05713F8}"/>
-    <dgm:cxn modelId="{E0D1A9B3-DB83-45E4-908B-8F02C3F1AC9D}" type="presOf" srcId="{9997303C-1FFF-4B91-BAB7-2DA3BF7A2831}" destId="{A0DFDC1B-77C7-48EB-A021-78AA69786ADD}" srcOrd="0" destOrd="1" presId="urn:microsoft.com/office/officeart/2005/8/layout/venn1"/>
-    <dgm:cxn modelId="{0797F2B3-6251-47F4-BFB8-9C22FB837E90}" type="presOf" srcId="{8FFAAD93-093A-4643-8666-6592133D5148}" destId="{05A04829-3ADD-4A0E-AF44-AFC6C6576FCC}" srcOrd="1" destOrd="0" presId="urn:microsoft.com/office/officeart/2005/8/layout/venn1"/>
-    <dgm:cxn modelId="{70F6C2B7-91C8-4E55-A360-171B2B5B137B}" type="presOf" srcId="{2FEA0FE4-34BA-4CAD-A918-D2CC4C70FC09}" destId="{0B0A4924-9448-4041-80D8-5133D77B1EF8}" srcOrd="0" destOrd="5" presId="urn:microsoft.com/office/officeart/2005/8/layout/venn1"/>
+    <dgm:cxn modelId="{3590A3BD-A98F-47F8-AC91-1B3EAC8CE1A1}" type="presOf" srcId="{C43C6B0E-82E8-459E-90D3-8FA28CDB9FEB}" destId="{0B0A4924-9448-4041-80D8-5133D77B1EF8}" srcOrd="0" destOrd="0" presId="urn:microsoft.com/office/officeart/2005/8/layout/venn1"/>
     <dgm:cxn modelId="{2848FFBA-90DC-4F48-9B44-D6DC5B6B9336}" srcId="{8FFAAD93-093A-4643-8666-6592133D5148}" destId="{68992B54-EE22-4748-A406-5444F4DDFCCB}" srcOrd="3" destOrd="0" parTransId="{A496F618-DE23-49F6-840B-6DE3EB5CD77E}" sibTransId="{8E00248D-6041-4A16-AC78-3F21D236E2FB}"/>
-    <dgm:cxn modelId="{3E7A1EBC-B8FF-4903-A794-99A63AA373B7}" srcId="{8FFAAD93-093A-4643-8666-6592133D5148}" destId="{FC4407A3-4517-45E9-A03A-4F0190D76EDC}" srcOrd="0" destOrd="0" parTransId="{CCF611A2-4C28-4056-95E0-BC1D65ECB54B}" sibTransId="{C2E3399E-AAEE-4906-8423-00867DEEE52B}"/>
-    <dgm:cxn modelId="{3590A3BD-A98F-47F8-AC91-1B3EAC8CE1A1}" type="presOf" srcId="{C43C6B0E-82E8-459E-90D3-8FA28CDB9FEB}" destId="{0B0A4924-9448-4041-80D8-5133D77B1EF8}" srcOrd="0" destOrd="0" presId="urn:microsoft.com/office/officeart/2005/8/layout/venn1"/>
-    <dgm:cxn modelId="{98EB3BC1-3459-49EB-B008-68B127B2329B}" srcId="{E8D6131E-3A0B-413C-A175-032074A7C8CD}" destId="{1D17ADD5-EDE9-4D10-B8FE-B9BEDF47454D}" srcOrd="4" destOrd="0" parTransId="{49E298D7-1760-4CAC-8C82-F847AF980F72}" sibTransId="{62913C03-8430-4F72-881A-A1298FFEAFD9}"/>
-    <dgm:cxn modelId="{451FA8C3-F2C2-4934-9710-54746AB631D6}" type="presOf" srcId="{9997303C-1FFF-4B91-BAB7-2DA3BF7A2831}" destId="{9FF6521E-F963-4CC7-985F-8DE096D1D719}" srcOrd="1" destOrd="1" presId="urn:microsoft.com/office/officeart/2005/8/layout/venn1"/>
-    <dgm:cxn modelId="{09BF0CC4-F5A7-42ED-A5D3-BB6B3A7218EB}" type="presOf" srcId="{2CA1279D-C9E1-4254-95B4-AAC304B533A6}" destId="{05A04829-3ADD-4A0E-AF44-AFC6C6576FCC}" srcOrd="1" destOrd="3" presId="urn:microsoft.com/office/officeart/2005/8/layout/venn1"/>
-    <dgm:cxn modelId="{D5854DC4-F81A-4FA2-80DB-7C7DBD12B42B}" srcId="{8FFAAD93-093A-4643-8666-6592133D5148}" destId="{B91FAD6A-8684-422F-8011-C8437909F67A}" srcOrd="1" destOrd="0" parTransId="{A792254C-7132-40A7-AE58-4421DC5EC861}" sibTransId="{2C588BD9-162A-4022-AF7B-2B78D08FB1DD}"/>
-    <dgm:cxn modelId="{257BAFCB-0E0B-4A74-8E02-4D534F4BD4B8}" type="presOf" srcId="{345FF024-0154-4AED-8D4F-D740CFF56DB4}" destId="{9FF6521E-F963-4CC7-985F-8DE096D1D719}" srcOrd="1" destOrd="2" presId="urn:microsoft.com/office/officeart/2005/8/layout/venn1"/>
-    <dgm:cxn modelId="{A79E1CD5-A539-40D4-85A5-EC2DD800039B}" type="presOf" srcId="{CD3BB932-1D7F-411F-8971-F6ADE642AEF2}" destId="{0B0A4924-9448-4041-80D8-5133D77B1EF8}" srcOrd="0" destOrd="4" presId="urn:microsoft.com/office/officeart/2005/8/layout/venn1"/>
-    <dgm:cxn modelId="{24B569E6-0410-4E6E-B3A9-29B8018766C1}" srcId="{E8D6131E-3A0B-413C-A175-032074A7C8CD}" destId="{AE952CBC-AFBB-46D7-9562-B6107CA30E37}" srcOrd="2" destOrd="0" parTransId="{CFCFF80A-CA68-48D7-9E16-EFC0C7511E83}" sibTransId="{5C9DCE54-BFC6-4A9B-9B5E-6A10CBFF0DAF}"/>
-    <dgm:cxn modelId="{FD02E0E9-09A3-473A-808B-F01E4D57FE2A}" type="presOf" srcId="{FC4407A3-4517-45E9-A03A-4F0190D76EDC}" destId="{05A04829-3ADD-4A0E-AF44-AFC6C6576FCC}" srcOrd="1" destOrd="1" presId="urn:microsoft.com/office/officeart/2005/8/layout/venn1"/>
     <dgm:cxn modelId="{016688EA-F4C6-426D-B6A7-2BED57046B26}" type="presOf" srcId="{68992B54-EE22-4748-A406-5444F4DDFCCB}" destId="{05A04829-3ADD-4A0E-AF44-AFC6C6576FCC}" srcOrd="1" destOrd="4" presId="urn:microsoft.com/office/officeart/2005/8/layout/venn1"/>
-    <dgm:cxn modelId="{AB854BEB-DA56-4C77-A7A8-11C935F1A966}" type="presOf" srcId="{E8D6131E-3A0B-413C-A175-032074A7C8CD}" destId="{9FF6521E-F963-4CC7-985F-8DE096D1D719}" srcOrd="1" destOrd="0" presId="urn:microsoft.com/office/officeart/2005/8/layout/venn1"/>
+    <dgm:cxn modelId="{300E2264-29DE-4C65-AB6C-FC5FDE9551AA}" srcId="{E8D6131E-3A0B-413C-A175-032074A7C8CD}" destId="{4A47A56A-111E-4E82-BB41-959D8C716F07}" srcOrd="3" destOrd="0" parTransId="{2B8AEA3B-1339-4898-A438-20A76057A93C}" sibTransId="{E716280C-071B-4151-8DB0-FA8E7410CBDC}"/>
+    <dgm:cxn modelId="{1543BB28-2793-43C8-993A-8A943AF4481F}" srcId="{C43C6B0E-82E8-459E-90D3-8FA28CDB9FEB}" destId="{15CBFCD6-3559-44E7-834A-375076522B1E}" srcOrd="1" destOrd="0" parTransId="{2BDC8AB9-9099-48BF-8978-2CCF0FE0092B}" sibTransId="{96C5A207-380A-4897-BC7D-08AA38B8E6E0}"/>
+    <dgm:cxn modelId="{FCC1E85C-8D8F-4801-A8FC-41D62D5A5514}" srcId="{E8D6131E-3A0B-413C-A175-032074A7C8CD}" destId="{9997303C-1FFF-4B91-BAB7-2DA3BF7A2831}" srcOrd="0" destOrd="0" parTransId="{EF0D375C-04B7-4798-8AEF-201C8B6E85F3}" sibTransId="{19E359EB-905A-4BC4-97E0-B01B85EE99BD}"/>
     <dgm:cxn modelId="{E776B5F9-0396-4747-8A77-F236C3D5FEC4}" type="presOf" srcId="{68992B54-EE22-4748-A406-5444F4DDFCCB}" destId="{59C231A3-4399-47E1-89DF-1C7125294808}" srcOrd="0" destOrd="4" presId="urn:microsoft.com/office/officeart/2005/8/layout/venn1"/>
     <dgm:cxn modelId="{EE3B88FC-5ECD-4AD8-8CA9-190CF339DA5D}" srcId="{8FFAAD93-093A-4643-8666-6592133D5148}" destId="{2CA1279D-C9E1-4254-95B4-AAC304B533A6}" srcOrd="2" destOrd="0" parTransId="{C33A9CFA-7161-4DFD-98CC-F13EDE82F84E}" sibTransId="{24EB42A6-9060-443B-B971-035EC8ADC523}"/>
     <dgm:cxn modelId="{37A01DFE-0964-4EB6-B04C-56427628D6EC}" srcId="{C43C6B0E-82E8-459E-90D3-8FA28CDB9FEB}" destId="{0D9103D6-0E0B-4A01-A0C2-A3D312E3F222}" srcOrd="0" destOrd="0" parTransId="{A1D0069F-1988-48C8-9FEA-319C7287A0B3}" sibTransId="{1AF917AA-981D-4B16-9E8E-BA24B49D4365}"/>
+    <dgm:cxn modelId="{24B569E6-0410-4E6E-B3A9-29B8018766C1}" srcId="{E8D6131E-3A0B-413C-A175-032074A7C8CD}" destId="{AE952CBC-AFBB-46D7-9562-B6107CA30E37}" srcOrd="2" destOrd="0" parTransId="{CFCFF80A-CA68-48D7-9E16-EFC0C7511E83}" sibTransId="{5C9DCE54-BFC6-4A9B-9B5E-6A10CBFF0DAF}"/>
+    <dgm:cxn modelId="{9565E676-F665-4438-933C-AD9D6A714537}" srcId="{0266A603-8232-4D71-B200-E5FE68D18F3F}" destId="{E8D6131E-3A0B-413C-A175-032074A7C8CD}" srcOrd="1" destOrd="0" parTransId="{2DFF84A4-06B4-4DE0-9EA7-677B263B0A4E}" sibTransId="{0206CF11-AF04-44BF-8AAA-B0D459371092}"/>
+    <dgm:cxn modelId="{70F6C2B7-91C8-4E55-A360-171B2B5B137B}" type="presOf" srcId="{2FEA0FE4-34BA-4CAD-A918-D2CC4C70FC09}" destId="{0B0A4924-9448-4041-80D8-5133D77B1EF8}" srcOrd="0" destOrd="5" presId="urn:microsoft.com/office/officeart/2005/8/layout/venn1"/>
+    <dgm:cxn modelId="{97851D67-2952-4049-AD5B-21A115667EEA}" type="presOf" srcId="{9E1FD446-4E0A-4888-B45A-C24376B4CA33}" destId="{0B0A4924-9448-4041-80D8-5133D77B1EF8}" srcOrd="0" destOrd="3" presId="urn:microsoft.com/office/officeart/2005/8/layout/venn1"/>
+    <dgm:cxn modelId="{15272A7C-2627-495B-AABC-9C936DD8F01C}" type="presOf" srcId="{0D9103D6-0E0B-4A01-A0C2-A3D312E3F222}" destId="{0B0A4924-9448-4041-80D8-5133D77B1EF8}" srcOrd="0" destOrd="1" presId="urn:microsoft.com/office/officeart/2005/8/layout/venn1"/>
     <dgm:cxn modelId="{DE88024E-9823-4C1C-8B29-0408B6F5C440}" type="presParOf" srcId="{11300E79-F0C0-45BF-A27C-36DBA708EADA}" destId="{59C231A3-4399-47E1-89DF-1C7125294808}" srcOrd="0" destOrd="0" presId="urn:microsoft.com/office/officeart/2005/8/layout/venn1"/>
     <dgm:cxn modelId="{756A008E-9D8A-4103-96F8-FB3AA9C2B117}" type="presParOf" srcId="{11300E79-F0C0-45BF-A27C-36DBA708EADA}" destId="{05A04829-3ADD-4A0E-AF44-AFC6C6576FCC}" srcOrd="1" destOrd="0" presId="urn:microsoft.com/office/officeart/2005/8/layout/venn1"/>
     <dgm:cxn modelId="{191021C9-35B7-4CAD-AFF8-559E2AF7472C}" type="presParOf" srcId="{11300E79-F0C0-45BF-A27C-36DBA708EADA}" destId="{A0DFDC1B-77C7-48EB-A021-78AA69786ADD}" srcOrd="2" destOrd="0" presId="urn:microsoft.com/office/officeart/2005/8/layout/venn1"/>
@@ -5404,7 +5544,7 @@
         </a:bodyPr>
         <a:lstStyle/>
         <a:p>
-          <a:pPr marL="0" lvl="0" indent="0" algn="ctr" defTabSz="1289050" rtl="0">
+          <a:pPr lvl="0" algn="ctr" defTabSz="1289050" rtl="0">
             <a:lnSpc>
               <a:spcPct val="90000"/>
             </a:lnSpc>
@@ -5414,7 +5554,6 @@
             <a:spcAft>
               <a:spcPct val="35000"/>
             </a:spcAft>
-            <a:buNone/>
           </a:pPr>
           <a:r>
             <a:rPr lang="de-DE" sz="2900" kern="1200" dirty="0" err="1"/>
@@ -5487,7 +5626,7 @@
         </a:bodyPr>
         <a:lstStyle/>
         <a:p>
-          <a:pPr marL="0" lvl="0" indent="0" algn="ctr" defTabSz="1289050" rtl="0">
+          <a:pPr lvl="0" algn="ctr" defTabSz="1289050" rtl="0">
             <a:lnSpc>
               <a:spcPct val="90000"/>
             </a:lnSpc>
@@ -5497,7 +5636,6 @@
             <a:spcAft>
               <a:spcPct val="35000"/>
             </a:spcAft>
-            <a:buNone/>
           </a:pPr>
           <a:r>
             <a:rPr lang="de-DE" sz="2900" kern="1200" dirty="0" err="1"/>
@@ -5566,7 +5704,7 @@
         </a:bodyPr>
         <a:lstStyle/>
         <a:p>
-          <a:pPr marL="0" lvl="0" indent="0" algn="ctr" defTabSz="1289050" rtl="0">
+          <a:pPr lvl="0" algn="ctr" defTabSz="1289050" rtl="0">
             <a:lnSpc>
               <a:spcPct val="90000"/>
             </a:lnSpc>
@@ -5576,7 +5714,6 @@
             <a:spcAft>
               <a:spcPct val="35000"/>
             </a:spcAft>
-            <a:buNone/>
           </a:pPr>
           <a:r>
             <a:rPr lang="de-DE" sz="2900" kern="1200"/>
@@ -5645,7 +5782,7 @@
         </a:bodyPr>
         <a:lstStyle/>
         <a:p>
-          <a:pPr marL="0" lvl="0" indent="0" algn="ctr" defTabSz="1289050" rtl="0">
+          <a:pPr lvl="0" algn="ctr" defTabSz="1289050" rtl="0">
             <a:lnSpc>
               <a:spcPct val="90000"/>
             </a:lnSpc>
@@ -5655,7 +5792,6 @@
             <a:spcAft>
               <a:spcPct val="35000"/>
             </a:spcAft>
-            <a:buNone/>
           </a:pPr>
           <a:r>
             <a:rPr lang="de-DE" sz="2900" kern="1200"/>
@@ -5737,7 +5873,7 @@
         </a:bodyPr>
         <a:lstStyle/>
         <a:p>
-          <a:pPr marL="0" lvl="0" indent="0" algn="ctr" defTabSz="622300" rtl="0">
+          <a:pPr lvl="0" algn="ctr" defTabSz="622300" rtl="0">
             <a:lnSpc>
               <a:spcPct val="90000"/>
             </a:lnSpc>
@@ -5747,7 +5883,6 @@
             <a:spcAft>
               <a:spcPct val="35000"/>
             </a:spcAft>
-            <a:buNone/>
           </a:pPr>
           <a:r>
             <a:rPr lang="de-DE" sz="1400" b="1" kern="1200" dirty="0" err="1"/>
@@ -5821,7 +5956,7 @@
         </a:bodyPr>
         <a:lstStyle/>
         <a:p>
-          <a:pPr marL="0" lvl="0" indent="0" algn="ctr" defTabSz="622300" rtl="0">
+          <a:pPr lvl="0" algn="ctr" defTabSz="622300" rtl="0">
             <a:lnSpc>
               <a:spcPct val="90000"/>
             </a:lnSpc>
@@ -5831,7 +5966,6 @@
             <a:spcAft>
               <a:spcPct val="35000"/>
             </a:spcAft>
-            <a:buNone/>
           </a:pPr>
           <a:r>
             <a:rPr lang="de-DE" sz="1400" b="1" kern="1200" dirty="0" err="1"/>
@@ -5911,7 +6045,7 @@
         </a:bodyPr>
         <a:lstStyle/>
         <a:p>
-          <a:pPr marL="0" lvl="0" indent="0" algn="l" defTabSz="1644650">
+          <a:pPr lvl="0" algn="l" defTabSz="1644650">
             <a:lnSpc>
               <a:spcPct val="90000"/>
             </a:lnSpc>
@@ -5921,7 +6055,6 @@
             <a:spcAft>
               <a:spcPct val="35000"/>
             </a:spcAft>
-            <a:buNone/>
           </a:pPr>
           <a:r>
             <a:rPr lang="de-DE" sz="3700" i="0" kern="1200" baseline="0" dirty="0"/>
@@ -5997,7 +6130,7 @@
         </a:bodyPr>
         <a:lstStyle/>
         <a:p>
-          <a:pPr marL="0" lvl="0" indent="0" algn="l" defTabSz="1644650">
+          <a:pPr lvl="0" algn="l" defTabSz="1644650">
             <a:lnSpc>
               <a:spcPct val="90000"/>
             </a:lnSpc>
@@ -6007,7 +6140,6 @@
             <a:spcAft>
               <a:spcPct val="35000"/>
             </a:spcAft>
-            <a:buNone/>
           </a:pPr>
           <a:r>
             <a:rPr lang="de-DE" sz="3700" i="0" kern="1200" baseline="0" dirty="0"/>
@@ -6089,7 +6221,7 @@
         </a:bodyPr>
         <a:lstStyle/>
         <a:p>
-          <a:pPr marL="0" lvl="0" indent="0" algn="l" defTabSz="622300">
+          <a:pPr lvl="0" algn="l" defTabSz="622300">
             <a:lnSpc>
               <a:spcPct val="90000"/>
             </a:lnSpc>
@@ -6099,7 +6231,6 @@
             <a:spcAft>
               <a:spcPct val="35000"/>
             </a:spcAft>
-            <a:buNone/>
           </a:pPr>
           <a:r>
             <a:rPr lang="de-DE" sz="1400" kern="1200" dirty="0"/>
@@ -6117,7 +6248,7 @@
             <a:spcAft>
               <a:spcPct val="15000"/>
             </a:spcAft>
-            <a:buChar char="•"/>
+            <a:buChar char="••"/>
           </a:pPr>
           <a:r>
             <a:rPr lang="de-DE" sz="1100" kern="1200" dirty="0"/>
@@ -6135,7 +6266,7 @@
             <a:spcAft>
               <a:spcPct val="15000"/>
             </a:spcAft>
-            <a:buChar char="•"/>
+            <a:buChar char="••"/>
           </a:pPr>
           <a:r>
             <a:rPr lang="de-DE" sz="1100" kern="1200" dirty="0"/>
@@ -6153,7 +6284,7 @@
             <a:spcAft>
               <a:spcPct val="15000"/>
             </a:spcAft>
-            <a:buChar char="•"/>
+            <a:buChar char="••"/>
           </a:pPr>
           <a:r>
             <a:rPr lang="de-DE" sz="1100" kern="1200" dirty="0"/>
@@ -6171,7 +6302,7 @@
             <a:spcAft>
               <a:spcPct val="15000"/>
             </a:spcAft>
-            <a:buChar char="•"/>
+            <a:buChar char="••"/>
           </a:pPr>
           <a:r>
             <a:rPr lang="de-DE" sz="1100" kern="1200" dirty="0"/>
@@ -6189,7 +6320,7 @@
             <a:spcAft>
               <a:spcPct val="15000"/>
             </a:spcAft>
-            <a:buChar char="•"/>
+            <a:buChar char="••"/>
           </a:pPr>
           <a:r>
             <a:rPr lang="de-DE" sz="1100" kern="1200" dirty="0"/>
@@ -6258,7 +6389,7 @@
         </a:bodyPr>
         <a:lstStyle/>
         <a:p>
-          <a:pPr marL="0" lvl="0" indent="0" algn="l" defTabSz="622300">
+          <a:pPr lvl="0" algn="l" defTabSz="622300">
             <a:lnSpc>
               <a:spcPct val="90000"/>
             </a:lnSpc>
@@ -6268,7 +6399,6 @@
             <a:spcAft>
               <a:spcPct val="35000"/>
             </a:spcAft>
-            <a:buNone/>
           </a:pPr>
           <a:r>
             <a:rPr lang="de-DE" sz="1400" kern="1200" dirty="0"/>
@@ -6286,7 +6416,7 @@
             <a:spcAft>
               <a:spcPct val="15000"/>
             </a:spcAft>
-            <a:buChar char="•"/>
+            <a:buChar char="••"/>
           </a:pPr>
           <a:r>
             <a:rPr lang="de-DE" sz="1100" kern="1200" dirty="0"/>
@@ -6304,7 +6434,7 @@
             <a:spcAft>
               <a:spcPct val="15000"/>
             </a:spcAft>
-            <a:buChar char="•"/>
+            <a:buChar char="••"/>
           </a:pPr>
           <a:r>
             <a:rPr lang="de-DE" sz="1100" kern="1200" dirty="0"/>
@@ -6322,7 +6452,7 @@
             <a:spcAft>
               <a:spcPct val="15000"/>
             </a:spcAft>
-            <a:buChar char="•"/>
+            <a:buChar char="••"/>
           </a:pPr>
           <a:r>
             <a:rPr lang="de-DE" sz="1100" kern="1200" dirty="0"/>
@@ -6340,7 +6470,7 @@
             <a:spcAft>
               <a:spcPct val="15000"/>
             </a:spcAft>
-            <a:buChar char="•"/>
+            <a:buChar char="••"/>
           </a:pPr>
           <a:r>
             <a:rPr lang="de-DE" sz="1100" kern="1200" dirty="0"/>
@@ -6358,7 +6488,7 @@
             <a:spcAft>
               <a:spcPct val="15000"/>
             </a:spcAft>
-            <a:buChar char="•"/>
+            <a:buChar char="••"/>
           </a:pPr>
           <a:r>
             <a:rPr lang="de-DE" sz="1100" kern="1200" dirty="0"/>
@@ -6427,7 +6557,7 @@
         </a:bodyPr>
         <a:lstStyle/>
         <a:p>
-          <a:pPr marL="0" lvl="0" indent="0" algn="l" defTabSz="622300">
+          <a:pPr lvl="0" algn="l" defTabSz="622300">
             <a:lnSpc>
               <a:spcPct val="90000"/>
             </a:lnSpc>
@@ -6437,7 +6567,6 @@
             <a:spcAft>
               <a:spcPct val="35000"/>
             </a:spcAft>
-            <a:buNone/>
           </a:pPr>
           <a:r>
             <a:rPr lang="de-DE" sz="1400" kern="1200" dirty="0"/>
@@ -6455,7 +6584,7 @@
             <a:spcAft>
               <a:spcPct val="15000"/>
             </a:spcAft>
-            <a:buChar char="•"/>
+            <a:buChar char="••"/>
           </a:pPr>
           <a:r>
             <a:rPr lang="de-DE" sz="1100" kern="1200" dirty="0"/>
@@ -6473,7 +6602,7 @@
             <a:spcAft>
               <a:spcPct val="15000"/>
             </a:spcAft>
-            <a:buChar char="•"/>
+            <a:buChar char="••"/>
           </a:pPr>
           <a:r>
             <a:rPr lang="de-DE" sz="1100" kern="1200" dirty="0"/>
@@ -6491,7 +6620,7 @@
             <a:spcAft>
               <a:spcPct val="15000"/>
             </a:spcAft>
-            <a:buChar char="•"/>
+            <a:buChar char="••"/>
           </a:pPr>
           <a:r>
             <a:rPr lang="de-DE" sz="1100" kern="1200" dirty="0"/>
@@ -6509,7 +6638,7 @@
             <a:spcAft>
               <a:spcPct val="15000"/>
             </a:spcAft>
-            <a:buChar char="•"/>
+            <a:buChar char="••"/>
           </a:pPr>
           <a:r>
             <a:rPr lang="de-DE" sz="1100" kern="1200" dirty="0"/>
@@ -6527,7 +6656,7 @@
             <a:spcAft>
               <a:spcPct val="15000"/>
             </a:spcAft>
-            <a:buChar char="•"/>
+            <a:buChar char="••"/>
           </a:pPr>
           <a:r>
             <a:rPr lang="de-DE" sz="1100" kern="1200" dirty="0"/>
@@ -15171,1024 +15300,6 @@
           <a:bodyPr/>
           <a:lstStyle/>
           <a:p>
-            <a:r>
-              <a:rPr lang="de-DE" dirty="0"/>
-              <a:t>Was ist Portierbarkeit?</a:t>
-            </a:r>
-          </a:p>
-          <a:p>
-            <a:r>
-              <a:rPr lang="de-DE" dirty="0" err="1"/>
-              <a:t>Korrekheit</a:t>
-            </a:r>
-            <a:r>
-              <a:rPr lang="de-DE" dirty="0"/>
-              <a:t>?</a:t>
-            </a:r>
-          </a:p>
-          <a:p>
-            <a:r>
-              <a:rPr lang="de-DE" dirty="0"/>
-              <a:t>Alle </a:t>
-            </a:r>
-            <a:r>
-              <a:rPr lang="de-DE" dirty="0" err="1"/>
-              <a:t>unterpunkte</a:t>
-            </a:r>
-            <a:r>
-              <a:rPr lang="de-DE" dirty="0"/>
-              <a:t> verstehen?</a:t>
-            </a:r>
-          </a:p>
-        </p:txBody>
-      </p:sp>
-      <p:sp>
-        <p:nvSpPr>
-          <p:cNvPr id="4" name="Foliennummernplatzhalter 3"/>
-          <p:cNvSpPr>
-            <a:spLocks noGrp="1"/>
-          </p:cNvSpPr>
-          <p:nvPr>
-            <p:ph type="sldNum" sz="quarter" idx="10"/>
-          </p:nvPr>
-        </p:nvSpPr>
-        <p:spPr/>
-        <p:txBody>
-          <a:bodyPr/>
-          <a:lstStyle/>
-          <a:p>
-            <a:fld id="{7C56EBB8-86B7-4B17-9FE6-1D6C78FAEC35}" type="slidenum">
-              <a:rPr lang="de-DE" altLang="de-DE" smtClean="0"/>
-              <a:pPr/>
-              <a:t>15</a:t>
-            </a:fld>
-            <a:endParaRPr lang="de-DE" altLang="de-DE"/>
-          </a:p>
-        </p:txBody>
-      </p:sp>
-    </p:spTree>
-    <p:extLst>
-      <p:ext uri="{BB962C8B-B14F-4D97-AF65-F5344CB8AC3E}">
-        <p14:creationId xmlns:p14="http://schemas.microsoft.com/office/powerpoint/2010/main" val="3964579411"/>
-      </p:ext>
-    </p:extLst>
-  </p:cSld>
-  <p:clrMapOvr>
-    <a:masterClrMapping/>
-  </p:clrMapOvr>
-</p:notes>
-</file>
-
-<file path=ppt/notesSlides/notesSlide2.xml><?xml version="1.0" encoding="utf-8"?>
-<p:notes xmlns:a="http://schemas.openxmlformats.org/drawingml/2006/main" xmlns:r="http://schemas.openxmlformats.org/officeDocument/2006/relationships" xmlns:p="http://schemas.openxmlformats.org/presentationml/2006/main">
-  <p:cSld>
-    <p:spTree>
-      <p:nvGrpSpPr>
-        <p:cNvPr id="1" name=""/>
-        <p:cNvGrpSpPr/>
-        <p:nvPr/>
-      </p:nvGrpSpPr>
-      <p:grpSpPr>
-        <a:xfrm>
-          <a:off x="0" y="0"/>
-          <a:ext cx="0" cy="0"/>
-          <a:chOff x="0" y="0"/>
-          <a:chExt cx="0" cy="0"/>
-        </a:xfrm>
-      </p:grpSpPr>
-      <p:sp>
-        <p:nvSpPr>
-          <p:cNvPr id="2" name="Folienbildplatzhalter 1"/>
-          <p:cNvSpPr>
-            <a:spLocks noGrp="1" noRot="1" noChangeAspect="1"/>
-          </p:cNvSpPr>
-          <p:nvPr>
-            <p:ph type="sldImg"/>
-          </p:nvPr>
-        </p:nvSpPr>
-        <p:spPr/>
-      </p:sp>
-      <p:sp>
-        <p:nvSpPr>
-          <p:cNvPr id="3" name="Notizenplatzhalter 2"/>
-          <p:cNvSpPr>
-            <a:spLocks noGrp="1"/>
-          </p:cNvSpPr>
-          <p:nvPr>
-            <p:ph type="body" idx="1"/>
-          </p:nvPr>
-        </p:nvSpPr>
-        <p:spPr/>
-        <p:txBody>
-          <a:bodyPr/>
-          <a:lstStyle/>
-          <a:p>
-            <a:pPr marL="0" indent="0">
-              <a:buFont typeface="+mj-lt"/>
-              <a:buNone/>
-            </a:pPr>
-            <a:r>
-              <a:rPr lang="de-DE" dirty="0"/>
-              <a:t>Mein Vortrag besteht aus 5 Teilen:</a:t>
-            </a:r>
-          </a:p>
-          <a:p>
-            <a:pPr marL="228600" indent="-228600">
-              <a:buFont typeface="+mj-lt"/>
-              <a:buAutoNum type="arabicPeriod"/>
-            </a:pPr>
-            <a:r>
-              <a:rPr lang="de-DE" b="1" dirty="0"/>
-              <a:t>Einleitung</a:t>
-            </a:r>
-            <a:r>
-              <a:rPr lang="de-DE" dirty="0"/>
-              <a:t>: wo die Motivation und Ziele kurz gesprochen werden sollen</a:t>
-            </a:r>
-          </a:p>
-          <a:p>
-            <a:pPr marL="228600" indent="-228600">
-              <a:buFont typeface="+mj-lt"/>
-              <a:buAutoNum type="arabicPeriod"/>
-            </a:pPr>
-            <a:r>
-              <a:rPr lang="de-DE" dirty="0"/>
-              <a:t>Wissensbasis=Knowledge Base:</a:t>
-            </a:r>
-          </a:p>
-          <a:p>
-            <a:pPr marL="685800" lvl="1" indent="-228600">
-              <a:buFont typeface="+mj-lt"/>
-              <a:buAutoNum type="arabicPeriod"/>
-            </a:pPr>
-            <a:r>
-              <a:rPr lang="de-DE" dirty="0"/>
-              <a:t>Öffentlicher Arbeitsbereich= was die Kunde sehen sollen zw. FAQ f abrufen kann.</a:t>
-            </a:r>
-          </a:p>
-          <a:p>
-            <a:pPr marL="685800" lvl="1" indent="-228600">
-              <a:buFont typeface="+mj-lt"/>
-              <a:buAutoNum type="arabicPeriod"/>
-            </a:pPr>
-            <a:r>
-              <a:rPr lang="de-DE" dirty="0"/>
-              <a:t>Versteckter Arbeitsbereich =</a:t>
-            </a:r>
-          </a:p>
-          <a:p>
-            <a:pPr marL="228600" lvl="0" indent="-228600">
-              <a:buFont typeface="+mj-lt"/>
-              <a:buAutoNum type="arabicPeriod"/>
-            </a:pPr>
-            <a:r>
-              <a:rPr lang="de-DE" dirty="0"/>
-              <a:t>Dokumentation</a:t>
-            </a:r>
-          </a:p>
-          <a:p>
-            <a:pPr marL="228600" lvl="0" indent="-228600">
-              <a:buFont typeface="+mj-lt"/>
-              <a:buAutoNum type="arabicPeriod"/>
-            </a:pPr>
-            <a:r>
-              <a:rPr lang="de-DE" dirty="0"/>
-              <a:t>Fehlermeldung: mit </a:t>
-            </a:r>
-            <a:r>
-              <a:rPr lang="de-DE" dirty="0" err="1"/>
-              <a:t>Epi</a:t>
-            </a:r>
-            <a:r>
-              <a:rPr lang="de-DE" dirty="0"/>
-              <a:t> in JIRA den </a:t>
-            </a:r>
-            <a:r>
-              <a:rPr lang="de-DE" dirty="0" err="1"/>
-              <a:t>Issue</a:t>
-            </a:r>
-            <a:r>
-              <a:rPr lang="de-DE" dirty="0"/>
-              <a:t> kennzeichnen. Was ein </a:t>
-            </a:r>
-            <a:r>
-              <a:rPr lang="de-DE" dirty="0" err="1"/>
-              <a:t>issue</a:t>
-            </a:r>
-            <a:r>
-              <a:rPr lang="de-DE" dirty="0"/>
-              <a:t> bzw. feature </a:t>
-            </a:r>
-            <a:r>
-              <a:rPr lang="de-DE" dirty="0" err="1"/>
-              <a:t>umbeding</a:t>
-            </a:r>
-            <a:r>
-              <a:rPr lang="de-DE" dirty="0"/>
-              <a:t> erhalten soll.</a:t>
-            </a:r>
-          </a:p>
-        </p:txBody>
-      </p:sp>
-      <p:sp>
-        <p:nvSpPr>
-          <p:cNvPr id="4" name="Foliennummernplatzhalter 3"/>
-          <p:cNvSpPr>
-            <a:spLocks noGrp="1"/>
-          </p:cNvSpPr>
-          <p:nvPr>
-            <p:ph type="sldNum" sz="quarter" idx="10"/>
-          </p:nvPr>
-        </p:nvSpPr>
-        <p:spPr/>
-        <p:txBody>
-          <a:bodyPr/>
-          <a:lstStyle/>
-          <a:p>
-            <a:fld id="{7C56EBB8-86B7-4B17-9FE6-1D6C78FAEC35}" type="slidenum">
-              <a:rPr lang="de-DE" altLang="de-DE" smtClean="0"/>
-              <a:pPr/>
-              <a:t>3</a:t>
-            </a:fld>
-            <a:endParaRPr lang="de-DE" altLang="de-DE"/>
-          </a:p>
-        </p:txBody>
-      </p:sp>
-    </p:spTree>
-    <p:extLst>
-      <p:ext uri="{BB962C8B-B14F-4D97-AF65-F5344CB8AC3E}">
-        <p14:creationId xmlns:p14="http://schemas.microsoft.com/office/powerpoint/2010/main" val="3517218494"/>
-      </p:ext>
-    </p:extLst>
-  </p:cSld>
-  <p:clrMapOvr>
-    <a:masterClrMapping/>
-  </p:clrMapOvr>
-</p:notes>
-</file>
-
-<file path=ppt/notesSlides/notesSlide3.xml><?xml version="1.0" encoding="utf-8"?>
-<p:notes xmlns:a="http://schemas.openxmlformats.org/drawingml/2006/main" xmlns:r="http://schemas.openxmlformats.org/officeDocument/2006/relationships" xmlns:p="http://schemas.openxmlformats.org/presentationml/2006/main">
-  <p:cSld>
-    <p:spTree>
-      <p:nvGrpSpPr>
-        <p:cNvPr id="1" name=""/>
-        <p:cNvGrpSpPr/>
-        <p:nvPr/>
-      </p:nvGrpSpPr>
-      <p:grpSpPr>
-        <a:xfrm>
-          <a:off x="0" y="0"/>
-          <a:ext cx="0" cy="0"/>
-          <a:chOff x="0" y="0"/>
-          <a:chExt cx="0" cy="0"/>
-        </a:xfrm>
-      </p:grpSpPr>
-      <p:sp>
-        <p:nvSpPr>
-          <p:cNvPr id="2" name="Folienbildplatzhalter 1"/>
-          <p:cNvSpPr>
-            <a:spLocks noGrp="1" noRot="1" noChangeAspect="1"/>
-          </p:cNvSpPr>
-          <p:nvPr>
-            <p:ph type="sldImg"/>
-          </p:nvPr>
-        </p:nvSpPr>
-        <p:spPr/>
-      </p:sp>
-      <p:sp>
-        <p:nvSpPr>
-          <p:cNvPr id="3" name="Notizenplatzhalter 2"/>
-          <p:cNvSpPr>
-            <a:spLocks noGrp="1"/>
-          </p:cNvSpPr>
-          <p:nvPr>
-            <p:ph type="body" idx="1"/>
-          </p:nvPr>
-        </p:nvSpPr>
-        <p:spPr/>
-        <p:txBody>
-          <a:bodyPr/>
-          <a:lstStyle/>
-          <a:p>
-            <a:r>
-              <a:rPr lang="de-DE" sz="1200" b="0" i="0" u="none" strike="noStrike" kern="1200" baseline="0" dirty="0">
-                <a:solidFill>
-                  <a:schemeClr val="tx1"/>
-                </a:solidFill>
-                <a:latin typeface="Arial" panose="020B0604020202020204" pitchFamily="34" charset="0"/>
-                <a:ea typeface="+mn-ea"/>
-                <a:cs typeface="+mn-cs"/>
-              </a:rPr>
-              <a:t>Die Firma Hilscher sucht eine Möglichkeit, das Engineering Tool Communication Studio um eine grafische Komponente für die Abbildung komplexer industriellen Netzwerke zu erweitern. </a:t>
-            </a:r>
-          </a:p>
-          <a:p>
-            <a:pPr marL="228600" indent="-228600">
-              <a:buAutoNum type="arabicPeriod"/>
-            </a:pPr>
-            <a:r>
-              <a:rPr lang="de-DE" sz="1200" b="0" i="0" u="none" strike="noStrike" kern="1200" baseline="0" dirty="0">
-                <a:solidFill>
-                  <a:schemeClr val="tx1"/>
-                </a:solidFill>
-                <a:latin typeface="Arial" panose="020B0604020202020204" pitchFamily="34" charset="0"/>
-                <a:ea typeface="+mn-ea"/>
-                <a:cs typeface="+mn-cs"/>
-              </a:rPr>
-              <a:t>Gefordert ist</a:t>
-            </a:r>
-          </a:p>
-          <a:p>
-            <a:pPr marL="228600" indent="-228600">
-              <a:buAutoNum type="arabicPeriod"/>
-            </a:pPr>
-            <a:r>
-              <a:rPr lang="de-DE" sz="1200" b="0" i="0" u="none" strike="noStrike" kern="1200" baseline="0" dirty="0">
-                <a:solidFill>
-                  <a:schemeClr val="tx1"/>
-                </a:solidFill>
-                <a:latin typeface="Arial" panose="020B0604020202020204" pitchFamily="34" charset="0"/>
-                <a:ea typeface="+mn-ea"/>
-                <a:cs typeface="+mn-cs"/>
-              </a:rPr>
-              <a:t>Das Modul soll integrierbar sein</a:t>
-            </a:r>
-          </a:p>
-          <a:p>
-            <a:pPr marL="228600" indent="-228600">
-              <a:buAutoNum type="arabicPeriod"/>
-            </a:pPr>
-            <a:r>
-              <a:rPr lang="de-DE" sz="1200" b="0" i="0" u="none" strike="noStrike" kern="1200" baseline="0" dirty="0">
-                <a:solidFill>
-                  <a:schemeClr val="tx1"/>
-                </a:solidFill>
-                <a:latin typeface="Arial" panose="020B0604020202020204" pitchFamily="34" charset="0"/>
-                <a:ea typeface="+mn-ea"/>
-                <a:cs typeface="+mn-cs"/>
-              </a:rPr>
-              <a:t>Die Geräte soll übersichtlich und intuitiv dargestellt werden</a:t>
-            </a:r>
-          </a:p>
-          <a:p>
-            <a:pPr marL="228600" indent="-228600">
-              <a:buAutoNum type="arabicPeriod"/>
-            </a:pPr>
-            <a:r>
-              <a:rPr lang="de-DE" sz="1200" b="0" i="0" u="none" strike="noStrike" kern="1200" baseline="0" dirty="0">
-                <a:solidFill>
-                  <a:schemeClr val="tx1"/>
-                </a:solidFill>
-                <a:latin typeface="Arial" panose="020B0604020202020204" pitchFamily="34" charset="0"/>
-                <a:ea typeface="+mn-ea"/>
-                <a:cs typeface="+mn-cs"/>
-              </a:rPr>
-              <a:t>Für eine effiziente Wartung des Komponenten soll  verschiedene Dokumentation bereitgestellt werden. Heute werden wir </a:t>
-            </a:r>
-            <a:r>
-              <a:rPr lang="de-DE" sz="1200" b="0" i="0" u="none" strike="noStrike" kern="1200" baseline="0" dirty="0" err="1">
-                <a:solidFill>
-                  <a:schemeClr val="tx1"/>
-                </a:solidFill>
-                <a:latin typeface="Arial" panose="020B0604020202020204" pitchFamily="34" charset="0"/>
-                <a:ea typeface="+mn-ea"/>
-                <a:cs typeface="+mn-cs"/>
-              </a:rPr>
-              <a:t>hauptsätlcih</a:t>
-            </a:r>
-            <a:r>
-              <a:rPr lang="de-DE" sz="1200" b="0" i="0" u="none" strike="noStrike" kern="1200" baseline="0" dirty="0">
-                <a:solidFill>
-                  <a:schemeClr val="tx1"/>
-                </a:solidFill>
-                <a:latin typeface="Arial" panose="020B0604020202020204" pitchFamily="34" charset="0"/>
-                <a:ea typeface="+mn-ea"/>
-                <a:cs typeface="+mn-cs"/>
-              </a:rPr>
-              <a:t> über die Dokumentation-Struktur sprechen</a:t>
-            </a:r>
-          </a:p>
-        </p:txBody>
-      </p:sp>
-      <p:sp>
-        <p:nvSpPr>
-          <p:cNvPr id="4" name="Foliennummernplatzhalter 3"/>
-          <p:cNvSpPr>
-            <a:spLocks noGrp="1"/>
-          </p:cNvSpPr>
-          <p:nvPr>
-            <p:ph type="sldNum" sz="quarter" idx="10"/>
-          </p:nvPr>
-        </p:nvSpPr>
-        <p:spPr/>
-        <p:txBody>
-          <a:bodyPr/>
-          <a:lstStyle/>
-          <a:p>
-            <a:fld id="{7C56EBB8-86B7-4B17-9FE6-1D6C78FAEC35}" type="slidenum">
-              <a:rPr lang="de-DE" altLang="de-DE" smtClean="0"/>
-              <a:pPr/>
-              <a:t>4</a:t>
-            </a:fld>
-            <a:endParaRPr lang="de-DE" altLang="de-DE"/>
-          </a:p>
-        </p:txBody>
-      </p:sp>
-    </p:spTree>
-    <p:extLst>
-      <p:ext uri="{BB962C8B-B14F-4D97-AF65-F5344CB8AC3E}">
-        <p14:creationId xmlns:p14="http://schemas.microsoft.com/office/powerpoint/2010/main" val="2046055574"/>
-      </p:ext>
-    </p:extLst>
-  </p:cSld>
-  <p:clrMapOvr>
-    <a:masterClrMapping/>
-  </p:clrMapOvr>
-</p:notes>
-</file>
-
-<file path=ppt/notesSlides/notesSlide4.xml><?xml version="1.0" encoding="utf-8"?>
-<p:notes xmlns:a="http://schemas.openxmlformats.org/drawingml/2006/main" xmlns:r="http://schemas.openxmlformats.org/officeDocument/2006/relationships" xmlns:p="http://schemas.openxmlformats.org/presentationml/2006/main">
-  <p:cSld>
-    <p:spTree>
-      <p:nvGrpSpPr>
-        <p:cNvPr id="1" name=""/>
-        <p:cNvGrpSpPr/>
-        <p:nvPr/>
-      </p:nvGrpSpPr>
-      <p:grpSpPr>
-        <a:xfrm>
-          <a:off x="0" y="0"/>
-          <a:ext cx="0" cy="0"/>
-          <a:chOff x="0" y="0"/>
-          <a:chExt cx="0" cy="0"/>
-        </a:xfrm>
-      </p:grpSpPr>
-      <p:sp>
-        <p:nvSpPr>
-          <p:cNvPr id="2" name="Folienbildplatzhalter 1"/>
-          <p:cNvSpPr>
-            <a:spLocks noGrp="1" noRot="1" noChangeAspect="1"/>
-          </p:cNvSpPr>
-          <p:nvPr>
-            <p:ph type="sldImg"/>
-          </p:nvPr>
-        </p:nvSpPr>
-        <p:spPr/>
-      </p:sp>
-      <p:sp>
-        <p:nvSpPr>
-          <p:cNvPr id="3" name="Notizenplatzhalter 2"/>
-          <p:cNvSpPr>
-            <a:spLocks noGrp="1"/>
-          </p:cNvSpPr>
-          <p:nvPr>
-            <p:ph type="body" idx="1"/>
-          </p:nvPr>
-        </p:nvSpPr>
-        <p:spPr/>
-        <p:txBody>
-          <a:bodyPr/>
-          <a:lstStyle/>
-          <a:p>
-            <a:r>
-              <a:rPr lang="de-DE" b="1" dirty="0"/>
-              <a:t>Die Ziele sind klar:</a:t>
-            </a:r>
-          </a:p>
-          <a:p>
-            <a:pPr marL="228600" indent="-228600">
-              <a:buFont typeface="+mj-lt"/>
-              <a:buAutoNum type="arabicPeriod"/>
-            </a:pPr>
-            <a:r>
-              <a:rPr lang="de-DE" b="0" dirty="0"/>
-              <a:t>Die tatsächliche TE soll  implementiert werden</a:t>
-            </a:r>
-          </a:p>
-          <a:p>
-            <a:pPr marL="228600" indent="-228600">
-              <a:buFont typeface="+mj-lt"/>
-              <a:buAutoNum type="arabicPeriod"/>
-            </a:pPr>
-            <a:r>
-              <a:rPr lang="de-DE" b="0" dirty="0"/>
-              <a:t>Die verschiede </a:t>
-            </a:r>
-            <a:r>
-              <a:rPr lang="de-DE" b="0" dirty="0" err="1"/>
-              <a:t>Dokumentype</a:t>
-            </a:r>
-            <a:r>
-              <a:rPr lang="de-DE" b="0" dirty="0"/>
-              <a:t> soll </a:t>
-            </a:r>
-            <a:r>
-              <a:rPr lang="de-DE" b="0" dirty="0" err="1"/>
-              <a:t>bereithestellt</a:t>
-            </a:r>
-            <a:r>
-              <a:rPr lang="de-DE" b="0" dirty="0"/>
-              <a:t> werden. Nämlich </a:t>
-            </a:r>
-          </a:p>
-          <a:p>
-            <a:r>
-              <a:rPr lang="de-DE" b="1" dirty="0"/>
-              <a:t>Produkte eines Release</a:t>
-            </a:r>
-          </a:p>
-          <a:p>
-            <a:r>
-              <a:rPr lang="de-DE" dirty="0"/>
-              <a:t>Î Software Project Management Plan (SPMP)</a:t>
-            </a:r>
-          </a:p>
-          <a:p>
-            <a:r>
-              <a:rPr lang="de-DE" dirty="0"/>
-              <a:t>Î </a:t>
-            </a:r>
-            <a:r>
-              <a:rPr lang="de-DE" dirty="0" err="1"/>
-              <a:t>Requirements</a:t>
-            </a:r>
-            <a:r>
-              <a:rPr lang="de-DE" dirty="0"/>
-              <a:t> Analysis </a:t>
-            </a:r>
-            <a:r>
-              <a:rPr lang="de-DE" dirty="0" err="1"/>
-              <a:t>Document</a:t>
-            </a:r>
-            <a:r>
-              <a:rPr lang="de-DE" dirty="0"/>
-              <a:t> (RAD) -</a:t>
-            </a:r>
-            <a:r>
-              <a:rPr lang="de-DE" dirty="0">
-                <a:sym typeface="Wingdings" panose="05000000000000000000" pitchFamily="2" charset="2"/>
-              </a:rPr>
-              <a:t>--&gt;https://www1.in.tum.de/lehrstuhl_1/component/content/article/43-books/241-oose-template-requirementsanalysisdocument</a:t>
-            </a:r>
-            <a:endParaRPr lang="de-DE" dirty="0"/>
-          </a:p>
-          <a:p>
-            <a:r>
-              <a:rPr lang="de-DE" dirty="0"/>
-              <a:t>Î System Design </a:t>
-            </a:r>
-            <a:r>
-              <a:rPr lang="de-DE" dirty="0" err="1"/>
-              <a:t>Document</a:t>
-            </a:r>
-            <a:r>
-              <a:rPr lang="de-DE" dirty="0"/>
-              <a:t> (SDD)</a:t>
-            </a:r>
-          </a:p>
-          <a:p>
-            <a:r>
-              <a:rPr lang="de-DE" dirty="0"/>
-              <a:t>Î </a:t>
-            </a:r>
-            <a:r>
-              <a:rPr lang="de-DE" dirty="0" err="1"/>
-              <a:t>Object</a:t>
-            </a:r>
-            <a:r>
-              <a:rPr lang="de-DE" dirty="0"/>
-              <a:t> Design </a:t>
-            </a:r>
-            <a:r>
-              <a:rPr lang="de-DE" dirty="0" err="1"/>
-              <a:t>Document</a:t>
-            </a:r>
-            <a:r>
-              <a:rPr lang="de-DE" dirty="0"/>
-              <a:t> (ODD)</a:t>
-            </a:r>
-          </a:p>
-          <a:p>
-            <a:r>
-              <a:rPr lang="de-DE" dirty="0"/>
-              <a:t>Î Test Manual (TM)</a:t>
-            </a:r>
-          </a:p>
-          <a:p>
-            <a:r>
-              <a:rPr lang="de-DE" dirty="0"/>
-              <a:t>Î User Manual (UM)</a:t>
-            </a:r>
-          </a:p>
-          <a:p>
-            <a:r>
-              <a:rPr lang="de-DE" dirty="0"/>
-              <a:t>Î Code</a:t>
-            </a:r>
-          </a:p>
-        </p:txBody>
-      </p:sp>
-      <p:sp>
-        <p:nvSpPr>
-          <p:cNvPr id="4" name="Foliennummernplatzhalter 3"/>
-          <p:cNvSpPr>
-            <a:spLocks noGrp="1"/>
-          </p:cNvSpPr>
-          <p:nvPr>
-            <p:ph type="sldNum" sz="quarter" idx="10"/>
-          </p:nvPr>
-        </p:nvSpPr>
-        <p:spPr/>
-        <p:txBody>
-          <a:bodyPr/>
-          <a:lstStyle/>
-          <a:p>
-            <a:fld id="{7C56EBB8-86B7-4B17-9FE6-1D6C78FAEC35}" type="slidenum">
-              <a:rPr lang="de-DE" altLang="de-DE" smtClean="0"/>
-              <a:pPr/>
-              <a:t>5</a:t>
-            </a:fld>
-            <a:endParaRPr lang="de-DE" altLang="de-DE"/>
-          </a:p>
-        </p:txBody>
-      </p:sp>
-    </p:spTree>
-    <p:extLst>
-      <p:ext uri="{BB962C8B-B14F-4D97-AF65-F5344CB8AC3E}">
-        <p14:creationId xmlns:p14="http://schemas.microsoft.com/office/powerpoint/2010/main" val="4186262116"/>
-      </p:ext>
-    </p:extLst>
-  </p:cSld>
-  <p:clrMapOvr>
-    <a:masterClrMapping/>
-  </p:clrMapOvr>
-</p:notes>
-</file>
-
-<file path=ppt/notesSlides/notesSlide5.xml><?xml version="1.0" encoding="utf-8"?>
-<p:notes xmlns:a="http://schemas.openxmlformats.org/drawingml/2006/main" xmlns:r="http://schemas.openxmlformats.org/officeDocument/2006/relationships" xmlns:p="http://schemas.openxmlformats.org/presentationml/2006/main">
-  <p:cSld>
-    <p:spTree>
-      <p:nvGrpSpPr>
-        <p:cNvPr id="1" name=""/>
-        <p:cNvGrpSpPr/>
-        <p:nvPr/>
-      </p:nvGrpSpPr>
-      <p:grpSpPr>
-        <a:xfrm>
-          <a:off x="0" y="0"/>
-          <a:ext cx="0" cy="0"/>
-          <a:chOff x="0" y="0"/>
-          <a:chExt cx="0" cy="0"/>
-        </a:xfrm>
-      </p:grpSpPr>
-      <p:sp>
-        <p:nvSpPr>
-          <p:cNvPr id="2" name="Folienbildplatzhalter 1"/>
-          <p:cNvSpPr>
-            <a:spLocks noGrp="1" noRot="1" noChangeAspect="1"/>
-          </p:cNvSpPr>
-          <p:nvPr>
-            <p:ph type="sldImg"/>
-          </p:nvPr>
-        </p:nvSpPr>
-        <p:spPr/>
-      </p:sp>
-      <p:sp>
-        <p:nvSpPr>
-          <p:cNvPr id="3" name="Notizenplatzhalter 2"/>
-          <p:cNvSpPr>
-            <a:spLocks noGrp="1"/>
-          </p:cNvSpPr>
-          <p:nvPr>
-            <p:ph type="body" idx="1"/>
-          </p:nvPr>
-        </p:nvSpPr>
-        <p:spPr/>
-        <p:txBody>
-          <a:bodyPr/>
-          <a:lstStyle/>
-          <a:p>
-            <a:r>
-              <a:rPr lang="de-DE" dirty="0"/>
-              <a:t>Quellcode</a:t>
-            </a:r>
-            <a:r>
-              <a:rPr lang="de-DE" baseline="0" dirty="0"/>
-              <a:t> ===? Repository</a:t>
-            </a:r>
-          </a:p>
-          <a:p>
-            <a:r>
-              <a:rPr lang="de-DE" baseline="0" dirty="0" err="1"/>
-              <a:t>Issue</a:t>
-            </a:r>
-            <a:r>
-              <a:rPr lang="de-DE" baseline="0" dirty="0"/>
-              <a:t> Tracking == Fehlermeldung</a:t>
-            </a:r>
-          </a:p>
-          <a:p>
-            <a:pPr lvl="1"/>
-            <a:r>
-              <a:rPr lang="de-DE" baseline="0" dirty="0"/>
-              <a:t>*  </a:t>
-            </a:r>
-            <a:endParaRPr lang="en-US" dirty="0"/>
-          </a:p>
-        </p:txBody>
-      </p:sp>
-      <p:sp>
-        <p:nvSpPr>
-          <p:cNvPr id="4" name="Foliennummernplatzhalter 3"/>
-          <p:cNvSpPr>
-            <a:spLocks noGrp="1"/>
-          </p:cNvSpPr>
-          <p:nvPr>
-            <p:ph type="sldNum" sz="quarter" idx="10"/>
-          </p:nvPr>
-        </p:nvSpPr>
-        <p:spPr/>
-        <p:txBody>
-          <a:bodyPr/>
-          <a:lstStyle/>
-          <a:p>
-            <a:fld id="{7C56EBB8-86B7-4B17-9FE6-1D6C78FAEC35}" type="slidenum">
-              <a:rPr lang="de-DE" altLang="de-DE" smtClean="0"/>
-              <a:pPr/>
-              <a:t>8</a:t>
-            </a:fld>
-            <a:endParaRPr lang="de-DE" altLang="de-DE"/>
-          </a:p>
-        </p:txBody>
-      </p:sp>
-    </p:spTree>
-    <p:extLst>
-      <p:ext uri="{BB962C8B-B14F-4D97-AF65-F5344CB8AC3E}">
-        <p14:creationId xmlns:p14="http://schemas.microsoft.com/office/powerpoint/2010/main" val="2385980104"/>
-      </p:ext>
-    </p:extLst>
-  </p:cSld>
-  <p:clrMapOvr>
-    <a:masterClrMapping/>
-  </p:clrMapOvr>
-</p:notes>
-</file>
-
-<file path=ppt/notesSlides/notesSlide6.xml><?xml version="1.0" encoding="utf-8"?>
-<p:notes xmlns:a="http://schemas.openxmlformats.org/drawingml/2006/main" xmlns:r="http://schemas.openxmlformats.org/officeDocument/2006/relationships" xmlns:p="http://schemas.openxmlformats.org/presentationml/2006/main">
-  <p:cSld>
-    <p:spTree>
-      <p:nvGrpSpPr>
-        <p:cNvPr id="1" name=""/>
-        <p:cNvGrpSpPr/>
-        <p:nvPr/>
-      </p:nvGrpSpPr>
-      <p:grpSpPr>
-        <a:xfrm>
-          <a:off x="0" y="0"/>
-          <a:ext cx="0" cy="0"/>
-          <a:chOff x="0" y="0"/>
-          <a:chExt cx="0" cy="0"/>
-        </a:xfrm>
-      </p:grpSpPr>
-      <p:sp>
-        <p:nvSpPr>
-          <p:cNvPr id="2" name="Folienbildplatzhalter 1"/>
-          <p:cNvSpPr>
-            <a:spLocks noGrp="1" noRot="1" noChangeAspect="1"/>
-          </p:cNvSpPr>
-          <p:nvPr>
-            <p:ph type="sldImg"/>
-          </p:nvPr>
-        </p:nvSpPr>
-        <p:spPr/>
-      </p:sp>
-      <p:sp>
-        <p:nvSpPr>
-          <p:cNvPr id="3" name="Notizenplatzhalter 2"/>
-          <p:cNvSpPr>
-            <a:spLocks noGrp="1"/>
-          </p:cNvSpPr>
-          <p:nvPr>
-            <p:ph type="body" idx="1"/>
-          </p:nvPr>
-        </p:nvSpPr>
-        <p:spPr/>
-        <p:txBody>
-          <a:bodyPr/>
-          <a:lstStyle/>
-          <a:p>
-            <a:r>
-              <a:rPr lang="de-DE" dirty="0"/>
-              <a:t>SDD: System Design </a:t>
-            </a:r>
-            <a:r>
-              <a:rPr lang="de-DE" dirty="0" err="1"/>
-              <a:t>Documents</a:t>
-            </a:r>
-            <a:r>
-              <a:rPr lang="de-DE" dirty="0"/>
-              <a:t>/</a:t>
-            </a:r>
-            <a:r>
-              <a:rPr lang="de-DE" dirty="0" err="1"/>
-              <a:t>Decription</a:t>
-            </a:r>
-            <a:r>
-              <a:rPr lang="de-DE" dirty="0"/>
-              <a:t> was?</a:t>
-            </a:r>
-          </a:p>
-        </p:txBody>
-      </p:sp>
-      <p:sp>
-        <p:nvSpPr>
-          <p:cNvPr id="4" name="Foliennummernplatzhalter 3"/>
-          <p:cNvSpPr>
-            <a:spLocks noGrp="1"/>
-          </p:cNvSpPr>
-          <p:nvPr>
-            <p:ph type="sldNum" sz="quarter" idx="10"/>
-          </p:nvPr>
-        </p:nvSpPr>
-        <p:spPr/>
-        <p:txBody>
-          <a:bodyPr/>
-          <a:lstStyle/>
-          <a:p>
-            <a:fld id="{7C56EBB8-86B7-4B17-9FE6-1D6C78FAEC35}" type="slidenum">
-              <a:rPr lang="de-DE" altLang="de-DE" smtClean="0"/>
-              <a:pPr/>
-              <a:t>9</a:t>
-            </a:fld>
-            <a:endParaRPr lang="de-DE" altLang="de-DE"/>
-          </a:p>
-        </p:txBody>
-      </p:sp>
-    </p:spTree>
-    <p:extLst>
-      <p:ext uri="{BB962C8B-B14F-4D97-AF65-F5344CB8AC3E}">
-        <p14:creationId xmlns:p14="http://schemas.microsoft.com/office/powerpoint/2010/main" val="2185017981"/>
-      </p:ext>
-    </p:extLst>
-  </p:cSld>
-  <p:clrMapOvr>
-    <a:masterClrMapping/>
-  </p:clrMapOvr>
-</p:notes>
-</file>
-
-<file path=ppt/notesSlides/notesSlide7.xml><?xml version="1.0" encoding="utf-8"?>
-<p:notes xmlns:a="http://schemas.openxmlformats.org/drawingml/2006/main" xmlns:r="http://schemas.openxmlformats.org/officeDocument/2006/relationships" xmlns:p="http://schemas.openxmlformats.org/presentationml/2006/main">
-  <p:cSld>
-    <p:spTree>
-      <p:nvGrpSpPr>
-        <p:cNvPr id="1" name=""/>
-        <p:cNvGrpSpPr/>
-        <p:nvPr/>
-      </p:nvGrpSpPr>
-      <p:grpSpPr>
-        <a:xfrm>
-          <a:off x="0" y="0"/>
-          <a:ext cx="0" cy="0"/>
-          <a:chOff x="0" y="0"/>
-          <a:chExt cx="0" cy="0"/>
-        </a:xfrm>
-      </p:grpSpPr>
-      <p:sp>
-        <p:nvSpPr>
-          <p:cNvPr id="2" name="Folienbildplatzhalter 1"/>
-          <p:cNvSpPr>
-            <a:spLocks noGrp="1" noRot="1" noChangeAspect="1"/>
-          </p:cNvSpPr>
-          <p:nvPr>
-            <p:ph type="sldImg"/>
-          </p:nvPr>
-        </p:nvSpPr>
-        <p:spPr/>
-      </p:sp>
-      <p:sp>
-        <p:nvSpPr>
-          <p:cNvPr id="3" name="Notizenplatzhalter 2"/>
-          <p:cNvSpPr>
-            <a:spLocks noGrp="1"/>
-          </p:cNvSpPr>
-          <p:nvPr>
-            <p:ph type="body" idx="1"/>
-          </p:nvPr>
-        </p:nvSpPr>
-        <p:spPr/>
-        <p:txBody>
-          <a:bodyPr/>
-          <a:lstStyle/>
-          <a:p>
-            <a:r>
-              <a:rPr lang="de-DE" dirty="0"/>
-              <a:t>SDD: Software Design </a:t>
-            </a:r>
-            <a:r>
-              <a:rPr lang="de-DE" dirty="0" err="1"/>
-              <a:t>Documents</a:t>
-            </a:r>
-            <a:r>
-              <a:rPr lang="de-DE" dirty="0"/>
-              <a:t>/</a:t>
-            </a:r>
-            <a:r>
-              <a:rPr lang="de-DE" dirty="0" err="1"/>
-              <a:t>Decription</a:t>
-            </a:r>
-            <a:r>
-              <a:rPr lang="de-DE" dirty="0"/>
-              <a:t> was?</a:t>
-            </a:r>
-          </a:p>
-        </p:txBody>
-      </p:sp>
-      <p:sp>
-        <p:nvSpPr>
-          <p:cNvPr id="4" name="Foliennummernplatzhalter 3"/>
-          <p:cNvSpPr>
-            <a:spLocks noGrp="1"/>
-          </p:cNvSpPr>
-          <p:nvPr>
-            <p:ph type="sldNum" sz="quarter" idx="10"/>
-          </p:nvPr>
-        </p:nvSpPr>
-        <p:spPr/>
-        <p:txBody>
-          <a:bodyPr/>
-          <a:lstStyle/>
-          <a:p>
-            <a:fld id="{7C56EBB8-86B7-4B17-9FE6-1D6C78FAEC35}" type="slidenum">
-              <a:rPr lang="de-DE" altLang="de-DE" smtClean="0"/>
-              <a:pPr/>
-              <a:t>10</a:t>
-            </a:fld>
-            <a:endParaRPr lang="de-DE" altLang="de-DE"/>
-          </a:p>
-        </p:txBody>
-      </p:sp>
-    </p:spTree>
-    <p:extLst>
-      <p:ext uri="{BB962C8B-B14F-4D97-AF65-F5344CB8AC3E}">
-        <p14:creationId xmlns:p14="http://schemas.microsoft.com/office/powerpoint/2010/main" val="1855379874"/>
-      </p:ext>
-    </p:extLst>
-  </p:cSld>
-  <p:clrMapOvr>
-    <a:masterClrMapping/>
-  </p:clrMapOvr>
-</p:notes>
-</file>
-
-<file path=ppt/notesSlides/notesSlide8.xml><?xml version="1.0" encoding="utf-8"?>
-<p:notes xmlns:a="http://schemas.openxmlformats.org/drawingml/2006/main" xmlns:r="http://schemas.openxmlformats.org/officeDocument/2006/relationships" xmlns:p="http://schemas.openxmlformats.org/presentationml/2006/main">
-  <p:cSld>
-    <p:spTree>
-      <p:nvGrpSpPr>
-        <p:cNvPr id="1" name=""/>
-        <p:cNvGrpSpPr/>
-        <p:nvPr/>
-      </p:nvGrpSpPr>
-      <p:grpSpPr>
-        <a:xfrm>
-          <a:off x="0" y="0"/>
-          <a:ext cx="0" cy="0"/>
-          <a:chOff x="0" y="0"/>
-          <a:chExt cx="0" cy="0"/>
-        </a:xfrm>
-      </p:grpSpPr>
-      <p:sp>
-        <p:nvSpPr>
-          <p:cNvPr id="2" name="Folienbildplatzhalter 1"/>
-          <p:cNvSpPr>
-            <a:spLocks noGrp="1" noRot="1" noChangeAspect="1"/>
-          </p:cNvSpPr>
-          <p:nvPr>
-            <p:ph type="sldImg"/>
-          </p:nvPr>
-        </p:nvSpPr>
-        <p:spPr/>
-      </p:sp>
-      <p:sp>
-        <p:nvSpPr>
-          <p:cNvPr id="3" name="Notizenplatzhalter 2"/>
-          <p:cNvSpPr>
-            <a:spLocks noGrp="1"/>
-          </p:cNvSpPr>
-          <p:nvPr>
-            <p:ph type="body" idx="1"/>
-          </p:nvPr>
-        </p:nvSpPr>
-        <p:spPr/>
-        <p:txBody>
-          <a:bodyPr/>
-          <a:lstStyle/>
-          <a:p>
             <a:pPr marL="171450" indent="-171450">
               <a:buFont typeface="Arial" panose="020B0604020202020204" pitchFamily="34" charset="0"/>
               <a:buChar char="•"/>
@@ -16542,7 +15653,7 @@
 </p:notes>
 </file>
 
-<file path=ppt/notesSlides/notesSlide9.xml><?xml version="1.0" encoding="utf-8"?>
+<file path=ppt/notesSlides/notesSlide11.xml><?xml version="1.0" encoding="utf-8"?>
 <p:notes xmlns:a="http://schemas.openxmlformats.org/drawingml/2006/main" xmlns:r="http://schemas.openxmlformats.org/officeDocument/2006/relationships" xmlns:p="http://schemas.openxmlformats.org/presentationml/2006/main">
   <p:cSld>
     <p:spTree>
@@ -16637,6 +15748,1533 @@
         </p:txBody>
       </p:sp>
     </p:spTree>
+  </p:cSld>
+  <p:clrMapOvr>
+    <a:masterClrMapping/>
+  </p:clrMapOvr>
+</p:notes>
+</file>
+
+<file path=ppt/notesSlides/notesSlide12.xml><?xml version="1.0" encoding="utf-8"?>
+<p:notes xmlns:a="http://schemas.openxmlformats.org/drawingml/2006/main" xmlns:r="http://schemas.openxmlformats.org/officeDocument/2006/relationships" xmlns:p="http://schemas.openxmlformats.org/presentationml/2006/main">
+  <p:cSld>
+    <p:spTree>
+      <p:nvGrpSpPr>
+        <p:cNvPr id="1" name=""/>
+        <p:cNvGrpSpPr/>
+        <p:nvPr/>
+      </p:nvGrpSpPr>
+      <p:grpSpPr>
+        <a:xfrm>
+          <a:off x="0" y="0"/>
+          <a:ext cx="0" cy="0"/>
+          <a:chOff x="0" y="0"/>
+          <a:chExt cx="0" cy="0"/>
+        </a:xfrm>
+      </p:grpSpPr>
+      <p:sp>
+        <p:nvSpPr>
+          <p:cNvPr id="2" name="Folienbildplatzhalter 1"/>
+          <p:cNvSpPr>
+            <a:spLocks noGrp="1" noRot="1" noChangeAspect="1"/>
+          </p:cNvSpPr>
+          <p:nvPr>
+            <p:ph type="sldImg"/>
+          </p:nvPr>
+        </p:nvSpPr>
+        <p:spPr/>
+      </p:sp>
+      <p:sp>
+        <p:nvSpPr>
+          <p:cNvPr id="3" name="Notizenplatzhalter 2"/>
+          <p:cNvSpPr>
+            <a:spLocks noGrp="1"/>
+          </p:cNvSpPr>
+          <p:nvPr>
+            <p:ph type="body" idx="1"/>
+          </p:nvPr>
+        </p:nvSpPr>
+        <p:spPr/>
+        <p:txBody>
+          <a:bodyPr/>
+          <a:lstStyle/>
+          <a:p>
+            <a:r>
+              <a:rPr lang="de-DE" dirty="0"/>
+              <a:t>Was ist Portierbarkeit?</a:t>
+            </a:r>
+          </a:p>
+          <a:p>
+            <a:r>
+              <a:rPr lang="de-DE" dirty="0" err="1"/>
+              <a:t>Korrekheit</a:t>
+            </a:r>
+            <a:r>
+              <a:rPr lang="de-DE" dirty="0"/>
+              <a:t>?</a:t>
+            </a:r>
+          </a:p>
+          <a:p>
+            <a:r>
+              <a:rPr lang="de-DE" dirty="0"/>
+              <a:t>Alle </a:t>
+            </a:r>
+            <a:r>
+              <a:rPr lang="de-DE" dirty="0" err="1"/>
+              <a:t>unterpunkte</a:t>
+            </a:r>
+            <a:r>
+              <a:rPr lang="de-DE" dirty="0"/>
+              <a:t> verstehen?</a:t>
+            </a:r>
+          </a:p>
+        </p:txBody>
+      </p:sp>
+      <p:sp>
+        <p:nvSpPr>
+          <p:cNvPr id="4" name="Foliennummernplatzhalter 3"/>
+          <p:cNvSpPr>
+            <a:spLocks noGrp="1"/>
+          </p:cNvSpPr>
+          <p:nvPr>
+            <p:ph type="sldNum" sz="quarter" idx="10"/>
+          </p:nvPr>
+        </p:nvSpPr>
+        <p:spPr/>
+        <p:txBody>
+          <a:bodyPr/>
+          <a:lstStyle/>
+          <a:p>
+            <a:fld id="{7C56EBB8-86B7-4B17-9FE6-1D6C78FAEC35}" type="slidenum">
+              <a:rPr lang="de-DE" altLang="de-DE" smtClean="0"/>
+              <a:pPr/>
+              <a:t>15</a:t>
+            </a:fld>
+            <a:endParaRPr lang="de-DE" altLang="de-DE"/>
+          </a:p>
+        </p:txBody>
+      </p:sp>
+    </p:spTree>
+    <p:extLst>
+      <p:ext uri="{BB962C8B-B14F-4D97-AF65-F5344CB8AC3E}">
+        <p14:creationId xmlns:p14="http://schemas.microsoft.com/office/powerpoint/2010/main" val="3964579411"/>
+      </p:ext>
+    </p:extLst>
+  </p:cSld>
+  <p:clrMapOvr>
+    <a:masterClrMapping/>
+  </p:clrMapOvr>
+</p:notes>
+</file>
+
+<file path=ppt/notesSlides/notesSlide2.xml><?xml version="1.0" encoding="utf-8"?>
+<p:notes xmlns:a="http://schemas.openxmlformats.org/drawingml/2006/main" xmlns:r="http://schemas.openxmlformats.org/officeDocument/2006/relationships" xmlns:p="http://schemas.openxmlformats.org/presentationml/2006/main">
+  <p:cSld>
+    <p:spTree>
+      <p:nvGrpSpPr>
+        <p:cNvPr id="1" name=""/>
+        <p:cNvGrpSpPr/>
+        <p:nvPr/>
+      </p:nvGrpSpPr>
+      <p:grpSpPr>
+        <a:xfrm>
+          <a:off x="0" y="0"/>
+          <a:ext cx="0" cy="0"/>
+          <a:chOff x="0" y="0"/>
+          <a:chExt cx="0" cy="0"/>
+        </a:xfrm>
+      </p:grpSpPr>
+      <p:sp>
+        <p:nvSpPr>
+          <p:cNvPr id="2" name="Folienbildplatzhalter 1"/>
+          <p:cNvSpPr>
+            <a:spLocks noGrp="1" noRot="1" noChangeAspect="1"/>
+          </p:cNvSpPr>
+          <p:nvPr>
+            <p:ph type="sldImg"/>
+          </p:nvPr>
+        </p:nvSpPr>
+        <p:spPr/>
+      </p:sp>
+      <p:sp>
+        <p:nvSpPr>
+          <p:cNvPr id="3" name="Notizenplatzhalter 2"/>
+          <p:cNvSpPr>
+            <a:spLocks noGrp="1"/>
+          </p:cNvSpPr>
+          <p:nvPr>
+            <p:ph type="body" idx="1"/>
+          </p:nvPr>
+        </p:nvSpPr>
+        <p:spPr/>
+        <p:txBody>
+          <a:bodyPr/>
+          <a:lstStyle/>
+          <a:p>
+            <a:pPr marL="0" indent="0">
+              <a:buFont typeface="+mj-lt"/>
+              <a:buNone/>
+            </a:pPr>
+            <a:r>
+              <a:rPr lang="de-DE" dirty="0"/>
+              <a:t>Mein Vortrag besteht aus 5 Teilen:</a:t>
+            </a:r>
+          </a:p>
+          <a:p>
+            <a:pPr marL="228600" indent="-228600">
+              <a:buFont typeface="+mj-lt"/>
+              <a:buAutoNum type="arabicPeriod"/>
+            </a:pPr>
+            <a:r>
+              <a:rPr lang="de-DE" b="1" dirty="0"/>
+              <a:t>Einleitung</a:t>
+            </a:r>
+            <a:r>
+              <a:rPr lang="de-DE" dirty="0"/>
+              <a:t>: wo die Motivation und Ziele kurz gesprochen werden sollen</a:t>
+            </a:r>
+          </a:p>
+          <a:p>
+            <a:pPr marL="228600" indent="-228600">
+              <a:buFont typeface="+mj-lt"/>
+              <a:buAutoNum type="arabicPeriod"/>
+            </a:pPr>
+            <a:r>
+              <a:rPr lang="de-DE" b="1" dirty="0" smtClean="0"/>
+              <a:t>Knowledge </a:t>
+            </a:r>
+            <a:r>
+              <a:rPr lang="de-DE" b="1" dirty="0"/>
+              <a:t>Base</a:t>
+            </a:r>
+            <a:r>
+              <a:rPr lang="de-DE" dirty="0" smtClean="0"/>
+              <a:t>: ist die Webseite</a:t>
+            </a:r>
+            <a:r>
+              <a:rPr lang="de-DE" baseline="0" dirty="0" smtClean="0"/>
+              <a:t> wo alle benötigten Informationen über das Modul zu finden sind. Diese Webseite ist in 2 Bereiche Unterteilt.</a:t>
+            </a:r>
+            <a:endParaRPr lang="de-DE" dirty="0"/>
+          </a:p>
+          <a:p>
+            <a:pPr marL="685800" lvl="1" indent="-228600">
+              <a:buFont typeface="+mj-lt"/>
+              <a:buAutoNum type="arabicPeriod"/>
+            </a:pPr>
+            <a:r>
+              <a:rPr lang="de-DE" dirty="0" smtClean="0"/>
+              <a:t>ÖA= wo </a:t>
+            </a:r>
+            <a:r>
+              <a:rPr lang="de-DE" dirty="0"/>
+              <a:t>die Kunde </a:t>
+            </a:r>
+            <a:r>
+              <a:rPr lang="de-DE" dirty="0" smtClean="0"/>
+              <a:t> und </a:t>
+            </a:r>
+            <a:r>
+              <a:rPr lang="de-DE" b="1" dirty="0" smtClean="0"/>
+              <a:t>Endbenutzer Support</a:t>
+            </a:r>
+            <a:r>
+              <a:rPr lang="de-DE" b="1" baseline="0" dirty="0" smtClean="0"/>
+              <a:t> bekommen </a:t>
+            </a:r>
+            <a:r>
+              <a:rPr lang="de-DE" baseline="0" dirty="0" smtClean="0"/>
+              <a:t>können</a:t>
+            </a:r>
+            <a:r>
+              <a:rPr lang="de-DE" dirty="0" smtClean="0"/>
+              <a:t>.</a:t>
+            </a:r>
+            <a:endParaRPr lang="de-DE" dirty="0"/>
+          </a:p>
+          <a:p>
+            <a:pPr marL="685800" lvl="1" indent="-228600">
+              <a:buFont typeface="+mj-lt"/>
+              <a:buAutoNum type="arabicPeriod"/>
+            </a:pPr>
+            <a:r>
+              <a:rPr lang="de-DE" dirty="0" smtClean="0"/>
+              <a:t>VA= wo der </a:t>
+            </a:r>
+            <a:r>
+              <a:rPr lang="de-DE" b="1" dirty="0" smtClean="0"/>
+              <a:t>Entwickler</a:t>
+            </a:r>
+            <a:r>
+              <a:rPr lang="de-DE" b="1" baseline="0" dirty="0" smtClean="0"/>
+              <a:t> einsteigen </a:t>
+            </a:r>
+            <a:r>
+              <a:rPr lang="de-DE" baseline="0" dirty="0" smtClean="0"/>
+              <a:t>soll</a:t>
+            </a:r>
+            <a:endParaRPr lang="de-DE" dirty="0"/>
+          </a:p>
+          <a:p>
+            <a:pPr marL="228600" lvl="0" indent="-228600">
+              <a:buFont typeface="+mj-lt"/>
+              <a:buAutoNum type="arabicPeriod"/>
+            </a:pPr>
+            <a:r>
+              <a:rPr lang="de-DE" dirty="0" smtClean="0"/>
+              <a:t>Dokumentation: hier wird die </a:t>
+            </a:r>
+            <a:r>
+              <a:rPr lang="de-DE" b="1" dirty="0" smtClean="0"/>
+              <a:t>Dokumentation-Gliederung</a:t>
+            </a:r>
+            <a:r>
+              <a:rPr lang="de-DE" b="1" baseline="0" dirty="0" smtClean="0"/>
+              <a:t> angesprochen</a:t>
+            </a:r>
+            <a:r>
+              <a:rPr lang="de-DE" baseline="0" dirty="0" smtClean="0"/>
+              <a:t>: die Wiki und regelmäßige Meeting über das Modul</a:t>
+            </a:r>
+            <a:endParaRPr lang="de-DE" dirty="0"/>
+          </a:p>
+          <a:p>
+            <a:pPr marL="228600" lvl="0" indent="-228600">
+              <a:buFont typeface="+mj-lt"/>
+              <a:buAutoNum type="arabicPeriod"/>
+            </a:pPr>
+            <a:r>
+              <a:rPr lang="de-DE" b="1" dirty="0" smtClean="0"/>
+              <a:t>IS</a:t>
+            </a:r>
+            <a:r>
+              <a:rPr lang="de-DE" dirty="0" smtClean="0"/>
+              <a:t>: </a:t>
+            </a:r>
+            <a:r>
+              <a:rPr lang="de-DE" dirty="0"/>
+              <a:t>Was ein </a:t>
+            </a:r>
+            <a:r>
+              <a:rPr lang="de-DE" dirty="0" err="1"/>
+              <a:t>issue</a:t>
+            </a:r>
+            <a:r>
+              <a:rPr lang="de-DE" dirty="0"/>
+              <a:t> bzw. </a:t>
+            </a:r>
+            <a:r>
+              <a:rPr lang="de-DE" dirty="0" err="1"/>
+              <a:t>feature</a:t>
+            </a:r>
+            <a:r>
+              <a:rPr lang="de-DE" dirty="0"/>
+              <a:t> </a:t>
+            </a:r>
+            <a:r>
+              <a:rPr lang="de-DE" dirty="0" smtClean="0"/>
+              <a:t>unbedingt </a:t>
+            </a:r>
+            <a:r>
+              <a:rPr lang="de-DE" dirty="0"/>
+              <a:t>erhalten </a:t>
+            </a:r>
+            <a:r>
+              <a:rPr lang="de-DE" dirty="0" smtClean="0"/>
+              <a:t>soll</a:t>
+            </a:r>
+            <a:r>
+              <a:rPr lang="de-DE" baseline="0" dirty="0" smtClean="0"/>
+              <a:t>  zum Bsp.: </a:t>
+            </a:r>
+            <a:r>
+              <a:rPr lang="de-DE" dirty="0" smtClean="0"/>
+              <a:t>mit einem</a:t>
+            </a:r>
+            <a:r>
+              <a:rPr lang="de-DE" baseline="0" dirty="0" smtClean="0"/>
+              <a:t> </a:t>
+            </a:r>
+            <a:r>
+              <a:rPr lang="de-DE" dirty="0" err="1" smtClean="0"/>
+              <a:t>Epi</a:t>
+            </a:r>
+            <a:r>
+              <a:rPr lang="de-DE" dirty="0" smtClean="0"/>
+              <a:t> in JIRA den </a:t>
+            </a:r>
+            <a:r>
+              <a:rPr lang="de-DE" dirty="0" err="1" smtClean="0"/>
+              <a:t>Issue</a:t>
+            </a:r>
+            <a:r>
+              <a:rPr lang="de-DE" dirty="0" smtClean="0"/>
+              <a:t> kennzeichnen.</a:t>
+            </a:r>
+          </a:p>
+          <a:p>
+            <a:pPr marL="228600" lvl="0" indent="-228600">
+              <a:buFont typeface="+mj-lt"/>
+              <a:buAutoNum type="arabicPeriod"/>
+            </a:pPr>
+            <a:r>
+              <a:rPr lang="de-DE" dirty="0" smtClean="0"/>
+              <a:t>Zum Schluss gibt es einige Fakte zur Dokumentation bzw. Diskussion</a:t>
+            </a:r>
+            <a:endParaRPr lang="de-DE" dirty="0"/>
+          </a:p>
+        </p:txBody>
+      </p:sp>
+      <p:sp>
+        <p:nvSpPr>
+          <p:cNvPr id="4" name="Foliennummernplatzhalter 3"/>
+          <p:cNvSpPr>
+            <a:spLocks noGrp="1"/>
+          </p:cNvSpPr>
+          <p:nvPr>
+            <p:ph type="sldNum" sz="quarter" idx="10"/>
+          </p:nvPr>
+        </p:nvSpPr>
+        <p:spPr/>
+        <p:txBody>
+          <a:bodyPr/>
+          <a:lstStyle/>
+          <a:p>
+            <a:fld id="{7C56EBB8-86B7-4B17-9FE6-1D6C78FAEC35}" type="slidenum">
+              <a:rPr lang="de-DE" altLang="de-DE" smtClean="0"/>
+              <a:pPr/>
+              <a:t>3</a:t>
+            </a:fld>
+            <a:endParaRPr lang="de-DE" altLang="de-DE"/>
+          </a:p>
+        </p:txBody>
+      </p:sp>
+    </p:spTree>
+    <p:extLst>
+      <p:ext uri="{BB962C8B-B14F-4D97-AF65-F5344CB8AC3E}">
+        <p14:creationId xmlns:p14="http://schemas.microsoft.com/office/powerpoint/2010/main" val="3517218494"/>
+      </p:ext>
+    </p:extLst>
+  </p:cSld>
+  <p:clrMapOvr>
+    <a:masterClrMapping/>
+  </p:clrMapOvr>
+</p:notes>
+</file>
+
+<file path=ppt/notesSlides/notesSlide3.xml><?xml version="1.0" encoding="utf-8"?>
+<p:notes xmlns:a="http://schemas.openxmlformats.org/drawingml/2006/main" xmlns:r="http://schemas.openxmlformats.org/officeDocument/2006/relationships" xmlns:p="http://schemas.openxmlformats.org/presentationml/2006/main">
+  <p:cSld>
+    <p:spTree>
+      <p:nvGrpSpPr>
+        <p:cNvPr id="1" name=""/>
+        <p:cNvGrpSpPr/>
+        <p:nvPr/>
+      </p:nvGrpSpPr>
+      <p:grpSpPr>
+        <a:xfrm>
+          <a:off x="0" y="0"/>
+          <a:ext cx="0" cy="0"/>
+          <a:chOff x="0" y="0"/>
+          <a:chExt cx="0" cy="0"/>
+        </a:xfrm>
+      </p:grpSpPr>
+      <p:sp>
+        <p:nvSpPr>
+          <p:cNvPr id="2" name="Folienbildplatzhalter 1"/>
+          <p:cNvSpPr>
+            <a:spLocks noGrp="1" noRot="1" noChangeAspect="1"/>
+          </p:cNvSpPr>
+          <p:nvPr>
+            <p:ph type="sldImg"/>
+          </p:nvPr>
+        </p:nvSpPr>
+        <p:spPr/>
+      </p:sp>
+      <p:sp>
+        <p:nvSpPr>
+          <p:cNvPr id="3" name="Notizenplatzhalter 2"/>
+          <p:cNvSpPr>
+            <a:spLocks noGrp="1"/>
+          </p:cNvSpPr>
+          <p:nvPr>
+            <p:ph type="body" idx="1"/>
+          </p:nvPr>
+        </p:nvSpPr>
+        <p:spPr/>
+        <p:txBody>
+          <a:bodyPr/>
+          <a:lstStyle/>
+          <a:p>
+            <a:r>
+              <a:rPr lang="de-DE" sz="1200" b="0" i="0" u="none" strike="noStrike" kern="1200" baseline="0" dirty="0">
+                <a:solidFill>
+                  <a:schemeClr val="tx1"/>
+                </a:solidFill>
+                <a:latin typeface="Arial" panose="020B0604020202020204" pitchFamily="34" charset="0"/>
+                <a:ea typeface="+mn-ea"/>
+                <a:cs typeface="+mn-cs"/>
+              </a:rPr>
+              <a:t>Die Firma Hilscher sucht eine Möglichkeit, das Engineering Tool Communication Studio um eine grafische Komponente für die Abbildung komplexer industriellen Netzwerke zu erweitern. </a:t>
+            </a:r>
+          </a:p>
+          <a:p>
+            <a:pPr marL="228600" indent="-228600">
+              <a:buAutoNum type="arabicPeriod"/>
+            </a:pPr>
+            <a:r>
+              <a:rPr lang="de-DE" sz="1200" b="0" i="0" u="none" strike="noStrike" kern="1200" baseline="0" dirty="0">
+                <a:solidFill>
+                  <a:schemeClr val="tx1"/>
+                </a:solidFill>
+                <a:latin typeface="Arial" panose="020B0604020202020204" pitchFamily="34" charset="0"/>
+                <a:ea typeface="+mn-ea"/>
+                <a:cs typeface="+mn-cs"/>
+              </a:rPr>
+              <a:t>Gefordert ist</a:t>
+            </a:r>
+          </a:p>
+          <a:p>
+            <a:pPr marL="228600" indent="-228600">
+              <a:buAutoNum type="arabicPeriod"/>
+            </a:pPr>
+            <a:r>
+              <a:rPr lang="de-DE" sz="1200" b="0" i="0" u="none" strike="noStrike" kern="1200" baseline="0" dirty="0">
+                <a:solidFill>
+                  <a:schemeClr val="tx1"/>
+                </a:solidFill>
+                <a:latin typeface="Arial" panose="020B0604020202020204" pitchFamily="34" charset="0"/>
+                <a:ea typeface="+mn-ea"/>
+                <a:cs typeface="+mn-cs"/>
+              </a:rPr>
+              <a:t>Das Modul soll integrierbar sein</a:t>
+            </a:r>
+          </a:p>
+          <a:p>
+            <a:pPr marL="228600" indent="-228600">
+              <a:buAutoNum type="arabicPeriod"/>
+            </a:pPr>
+            <a:r>
+              <a:rPr lang="de-DE" sz="1200" b="0" i="0" u="none" strike="noStrike" kern="1200" baseline="0" dirty="0">
+                <a:solidFill>
+                  <a:schemeClr val="tx1"/>
+                </a:solidFill>
+                <a:latin typeface="Arial" panose="020B0604020202020204" pitchFamily="34" charset="0"/>
+                <a:ea typeface="+mn-ea"/>
+                <a:cs typeface="+mn-cs"/>
+              </a:rPr>
+              <a:t>Die Geräte </a:t>
+            </a:r>
+            <a:r>
+              <a:rPr lang="de-DE" sz="1200" b="0" i="0" u="none" strike="noStrike" kern="1200" baseline="0" dirty="0" smtClean="0">
+                <a:solidFill>
+                  <a:schemeClr val="tx1"/>
+                </a:solidFill>
+                <a:latin typeface="Arial" panose="020B0604020202020204" pitchFamily="34" charset="0"/>
+                <a:ea typeface="+mn-ea"/>
+                <a:cs typeface="+mn-cs"/>
+              </a:rPr>
+              <a:t>und Verbindungen sollen </a:t>
+            </a:r>
+            <a:r>
+              <a:rPr lang="de-DE" sz="1200" b="0" i="0" u="none" strike="noStrike" kern="1200" baseline="0" dirty="0">
+                <a:solidFill>
+                  <a:schemeClr val="tx1"/>
+                </a:solidFill>
+                <a:latin typeface="Arial" panose="020B0604020202020204" pitchFamily="34" charset="0"/>
+                <a:ea typeface="+mn-ea"/>
+                <a:cs typeface="+mn-cs"/>
+              </a:rPr>
+              <a:t>übersichtlich und intuitiv </a:t>
+            </a:r>
+            <a:r>
+              <a:rPr lang="de-DE" sz="1200" b="1" i="0" u="none" strike="noStrike" kern="1200" baseline="0" dirty="0" smtClean="0">
+                <a:solidFill>
+                  <a:schemeClr val="tx1"/>
+                </a:solidFill>
+                <a:latin typeface="Arial" panose="020B0604020202020204" pitchFamily="34" charset="0"/>
+                <a:ea typeface="+mn-ea"/>
+                <a:cs typeface="+mn-cs"/>
+              </a:rPr>
+              <a:t>symbolisiert</a:t>
+            </a:r>
+            <a:r>
+              <a:rPr lang="de-DE" sz="1200" b="0" i="0" u="none" strike="noStrike" kern="1200" baseline="0" dirty="0" smtClean="0">
+                <a:solidFill>
+                  <a:schemeClr val="tx1"/>
+                </a:solidFill>
+                <a:latin typeface="Arial" panose="020B0604020202020204" pitchFamily="34" charset="0"/>
+                <a:ea typeface="+mn-ea"/>
+                <a:cs typeface="+mn-cs"/>
+              </a:rPr>
+              <a:t> </a:t>
+            </a:r>
+            <a:r>
+              <a:rPr lang="de-DE" sz="1200" b="0" i="0" u="none" strike="noStrike" kern="1200" baseline="0" dirty="0">
+                <a:solidFill>
+                  <a:schemeClr val="tx1"/>
+                </a:solidFill>
+                <a:latin typeface="Arial" panose="020B0604020202020204" pitchFamily="34" charset="0"/>
+                <a:ea typeface="+mn-ea"/>
+                <a:cs typeface="+mn-cs"/>
+              </a:rPr>
+              <a:t>werden</a:t>
+            </a:r>
+          </a:p>
+          <a:p>
+            <a:pPr marL="228600" indent="-228600">
+              <a:buAutoNum type="arabicPeriod"/>
+            </a:pPr>
+            <a:r>
+              <a:rPr lang="de-DE" sz="1200" b="0" i="0" u="none" strike="noStrike" kern="1200" baseline="0" dirty="0">
+                <a:solidFill>
+                  <a:schemeClr val="tx1"/>
+                </a:solidFill>
+                <a:latin typeface="Arial" panose="020B0604020202020204" pitchFamily="34" charset="0"/>
+                <a:ea typeface="+mn-ea"/>
+                <a:cs typeface="+mn-cs"/>
+              </a:rPr>
+              <a:t>Für eine effiziente Wartung des Komponenten soll  verschiedene </a:t>
+            </a:r>
+            <a:r>
+              <a:rPr lang="de-DE" sz="1200" b="0" i="0" u="none" strike="noStrike" kern="1200" baseline="0" dirty="0" smtClean="0">
+                <a:solidFill>
+                  <a:schemeClr val="tx1"/>
+                </a:solidFill>
+                <a:latin typeface="Arial" panose="020B0604020202020204" pitchFamily="34" charset="0"/>
+                <a:ea typeface="+mn-ea"/>
+                <a:cs typeface="+mn-cs"/>
+              </a:rPr>
+              <a:t>Dokumentation-Type </a:t>
+            </a:r>
+            <a:r>
+              <a:rPr lang="de-DE" sz="1200" b="0" i="0" u="none" strike="noStrike" kern="1200" baseline="0" dirty="0">
+                <a:solidFill>
+                  <a:schemeClr val="tx1"/>
+                </a:solidFill>
+                <a:latin typeface="Arial" panose="020B0604020202020204" pitchFamily="34" charset="0"/>
+                <a:ea typeface="+mn-ea"/>
+                <a:cs typeface="+mn-cs"/>
+              </a:rPr>
+              <a:t>bereitgestellt werden. Heute werden wir </a:t>
+            </a:r>
+            <a:r>
+              <a:rPr lang="de-DE" sz="1200" b="0" i="0" u="none" strike="noStrike" kern="1200" baseline="0" dirty="0" err="1" smtClean="0">
+                <a:solidFill>
+                  <a:schemeClr val="tx1"/>
+                </a:solidFill>
+                <a:latin typeface="Arial" panose="020B0604020202020204" pitchFamily="34" charset="0"/>
+                <a:ea typeface="+mn-ea"/>
+                <a:cs typeface="+mn-cs"/>
+              </a:rPr>
+              <a:t>hauptsätchtlich</a:t>
+            </a:r>
+            <a:r>
+              <a:rPr lang="de-DE" sz="1200" b="0" i="0" u="none" strike="noStrike" kern="1200" baseline="0" dirty="0" smtClean="0">
+                <a:solidFill>
+                  <a:schemeClr val="tx1"/>
+                </a:solidFill>
+                <a:latin typeface="Arial" panose="020B0604020202020204" pitchFamily="34" charset="0"/>
+                <a:ea typeface="+mn-ea"/>
+                <a:cs typeface="+mn-cs"/>
+              </a:rPr>
+              <a:t> </a:t>
+            </a:r>
+            <a:r>
+              <a:rPr lang="de-DE" sz="1200" b="0" i="0" u="none" strike="noStrike" kern="1200" baseline="0" dirty="0">
+                <a:solidFill>
+                  <a:schemeClr val="tx1"/>
+                </a:solidFill>
+                <a:latin typeface="Arial" panose="020B0604020202020204" pitchFamily="34" charset="0"/>
+                <a:ea typeface="+mn-ea"/>
+                <a:cs typeface="+mn-cs"/>
+              </a:rPr>
+              <a:t>über die Dokumentation-Struktur sprechen</a:t>
+            </a:r>
+          </a:p>
+        </p:txBody>
+      </p:sp>
+      <p:sp>
+        <p:nvSpPr>
+          <p:cNvPr id="4" name="Foliennummernplatzhalter 3"/>
+          <p:cNvSpPr>
+            <a:spLocks noGrp="1"/>
+          </p:cNvSpPr>
+          <p:nvPr>
+            <p:ph type="sldNum" sz="quarter" idx="10"/>
+          </p:nvPr>
+        </p:nvSpPr>
+        <p:spPr/>
+        <p:txBody>
+          <a:bodyPr/>
+          <a:lstStyle/>
+          <a:p>
+            <a:fld id="{7C56EBB8-86B7-4B17-9FE6-1D6C78FAEC35}" type="slidenum">
+              <a:rPr lang="de-DE" altLang="de-DE" smtClean="0"/>
+              <a:pPr/>
+              <a:t>4</a:t>
+            </a:fld>
+            <a:endParaRPr lang="de-DE" altLang="de-DE"/>
+          </a:p>
+        </p:txBody>
+      </p:sp>
+    </p:spTree>
+    <p:extLst>
+      <p:ext uri="{BB962C8B-B14F-4D97-AF65-F5344CB8AC3E}">
+        <p14:creationId xmlns:p14="http://schemas.microsoft.com/office/powerpoint/2010/main" val="2046055574"/>
+      </p:ext>
+    </p:extLst>
+  </p:cSld>
+  <p:clrMapOvr>
+    <a:masterClrMapping/>
+  </p:clrMapOvr>
+</p:notes>
+</file>
+
+<file path=ppt/notesSlides/notesSlide4.xml><?xml version="1.0" encoding="utf-8"?>
+<p:notes xmlns:a="http://schemas.openxmlformats.org/drawingml/2006/main" xmlns:r="http://schemas.openxmlformats.org/officeDocument/2006/relationships" xmlns:p="http://schemas.openxmlformats.org/presentationml/2006/main">
+  <p:cSld>
+    <p:spTree>
+      <p:nvGrpSpPr>
+        <p:cNvPr id="1" name=""/>
+        <p:cNvGrpSpPr/>
+        <p:nvPr/>
+      </p:nvGrpSpPr>
+      <p:grpSpPr>
+        <a:xfrm>
+          <a:off x="0" y="0"/>
+          <a:ext cx="0" cy="0"/>
+          <a:chOff x="0" y="0"/>
+          <a:chExt cx="0" cy="0"/>
+        </a:xfrm>
+      </p:grpSpPr>
+      <p:sp>
+        <p:nvSpPr>
+          <p:cNvPr id="2" name="Folienbildplatzhalter 1"/>
+          <p:cNvSpPr>
+            <a:spLocks noGrp="1" noRot="1" noChangeAspect="1"/>
+          </p:cNvSpPr>
+          <p:nvPr>
+            <p:ph type="sldImg"/>
+          </p:nvPr>
+        </p:nvSpPr>
+        <p:spPr/>
+      </p:sp>
+      <p:sp>
+        <p:nvSpPr>
+          <p:cNvPr id="3" name="Notizenplatzhalter 2"/>
+          <p:cNvSpPr>
+            <a:spLocks noGrp="1"/>
+          </p:cNvSpPr>
+          <p:nvPr>
+            <p:ph type="body" idx="1"/>
+          </p:nvPr>
+        </p:nvSpPr>
+        <p:spPr/>
+        <p:txBody>
+          <a:bodyPr/>
+          <a:lstStyle/>
+          <a:p>
+            <a:r>
+              <a:rPr lang="de-DE" b="1" dirty="0"/>
+              <a:t>Die Ziele sind klar:</a:t>
+            </a:r>
+          </a:p>
+          <a:p>
+            <a:pPr marL="228600" indent="-228600">
+              <a:buFont typeface="+mj-lt"/>
+              <a:buAutoNum type="arabicPeriod"/>
+            </a:pPr>
+            <a:r>
+              <a:rPr lang="de-DE" b="0" dirty="0"/>
+              <a:t>Die tatsächliche TE soll  implementiert werden</a:t>
+            </a:r>
+          </a:p>
+          <a:p>
+            <a:pPr marL="228600" indent="-228600">
+              <a:buFont typeface="+mj-lt"/>
+              <a:buAutoNum type="arabicPeriod"/>
+            </a:pPr>
+            <a:r>
+              <a:rPr lang="de-DE" b="0" dirty="0"/>
+              <a:t>Die verschiede </a:t>
+            </a:r>
+            <a:r>
+              <a:rPr lang="de-DE" b="0" dirty="0" err="1"/>
+              <a:t>Dokumentype</a:t>
+            </a:r>
+            <a:r>
+              <a:rPr lang="de-DE" b="0" dirty="0"/>
+              <a:t> soll </a:t>
+            </a:r>
+            <a:r>
+              <a:rPr lang="de-DE" b="0" dirty="0" err="1"/>
+              <a:t>bereithestellt</a:t>
+            </a:r>
+            <a:r>
+              <a:rPr lang="de-DE" b="0" dirty="0"/>
+              <a:t> werden. Nämlich </a:t>
+            </a:r>
+            <a:endParaRPr lang="de-DE" b="0" dirty="0" smtClean="0"/>
+          </a:p>
+          <a:p>
+            <a:pPr marL="0" indent="0">
+              <a:buFont typeface="+mj-lt"/>
+              <a:buNone/>
+            </a:pPr>
+            <a:endParaRPr lang="de-DE" b="0" dirty="0"/>
+          </a:p>
+          <a:p>
+            <a:r>
+              <a:rPr lang="de-DE" b="0" dirty="0"/>
+              <a:t>Produkte eines Release</a:t>
+            </a:r>
+          </a:p>
+          <a:p>
+            <a:pPr marL="228600" indent="-228600">
+              <a:buFont typeface="+mj-lt"/>
+              <a:buAutoNum type="arabicPeriod"/>
+            </a:pPr>
+            <a:r>
+              <a:rPr lang="de-DE" dirty="0" smtClean="0"/>
+              <a:t>Software </a:t>
+            </a:r>
+            <a:r>
+              <a:rPr lang="de-DE" dirty="0"/>
+              <a:t>Project Management Plan (</a:t>
+            </a:r>
+            <a:r>
+              <a:rPr lang="de-DE" dirty="0" smtClean="0"/>
+              <a:t>SPMP)</a:t>
+            </a:r>
+          </a:p>
+          <a:p>
+            <a:pPr marL="228600" indent="-228600">
+              <a:buFont typeface="+mj-lt"/>
+              <a:buAutoNum type="arabicPeriod"/>
+            </a:pPr>
+            <a:r>
+              <a:rPr lang="de-DE" dirty="0" err="1" smtClean="0"/>
+              <a:t>Requirements</a:t>
+            </a:r>
+            <a:r>
+              <a:rPr lang="de-DE" dirty="0" smtClean="0"/>
+              <a:t> </a:t>
+            </a:r>
+            <a:r>
+              <a:rPr lang="de-DE" dirty="0"/>
+              <a:t>Analysis </a:t>
+            </a:r>
+            <a:r>
+              <a:rPr lang="de-DE" dirty="0" err="1"/>
+              <a:t>Document</a:t>
+            </a:r>
+            <a:r>
+              <a:rPr lang="de-DE" dirty="0"/>
+              <a:t> (RAD) -</a:t>
+            </a:r>
+            <a:r>
+              <a:rPr lang="de-DE" dirty="0">
+                <a:sym typeface="Wingdings" panose="05000000000000000000" pitchFamily="2" charset="2"/>
+              </a:rPr>
+              <a:t>--&gt;https://</a:t>
+            </a:r>
+            <a:r>
+              <a:rPr lang="de-DE" dirty="0" smtClean="0">
+                <a:sym typeface="Wingdings" panose="05000000000000000000" pitchFamily="2" charset="2"/>
+              </a:rPr>
+              <a:t>www1.in.tum.de/lehrstuhl_1/component/content/article/43-books/241-oose-template-requirementsanalysisdocument</a:t>
+            </a:r>
+            <a:endParaRPr lang="de-DE" dirty="0">
+              <a:sym typeface="Wingdings" panose="05000000000000000000" pitchFamily="2" charset="2"/>
+            </a:endParaRPr>
+          </a:p>
+          <a:p>
+            <a:pPr marL="228600" indent="-228600">
+              <a:buFont typeface="+mj-lt"/>
+              <a:buAutoNum type="arabicPeriod"/>
+            </a:pPr>
+            <a:r>
+              <a:rPr lang="de-DE" dirty="0" smtClean="0"/>
+              <a:t>System </a:t>
+            </a:r>
+            <a:r>
+              <a:rPr lang="de-DE" dirty="0"/>
+              <a:t>Design </a:t>
+            </a:r>
+            <a:r>
+              <a:rPr lang="de-DE" dirty="0" err="1"/>
+              <a:t>Document</a:t>
+            </a:r>
+            <a:r>
+              <a:rPr lang="de-DE" dirty="0"/>
+              <a:t> (SDD</a:t>
+            </a:r>
+            <a:r>
+              <a:rPr lang="de-DE" dirty="0" smtClean="0"/>
+              <a:t>) ----&gt; https://www1.in.tum.de/lehrstuhl_1/component/content/article/43-books/243-oose-template-systemdesigndocument</a:t>
+            </a:r>
+          </a:p>
+          <a:p>
+            <a:pPr marL="228600" indent="-228600">
+              <a:buFont typeface="+mj-lt"/>
+              <a:buAutoNum type="arabicPeriod"/>
+            </a:pPr>
+            <a:r>
+              <a:rPr lang="de-DE" dirty="0" err="1" smtClean="0"/>
+              <a:t>Object</a:t>
+            </a:r>
+            <a:r>
+              <a:rPr lang="de-DE" dirty="0" smtClean="0"/>
+              <a:t> </a:t>
+            </a:r>
+            <a:r>
+              <a:rPr lang="de-DE" dirty="0"/>
+              <a:t>Design </a:t>
+            </a:r>
+            <a:r>
+              <a:rPr lang="de-DE" dirty="0" err="1"/>
+              <a:t>Document</a:t>
+            </a:r>
+            <a:r>
+              <a:rPr lang="de-DE" dirty="0"/>
+              <a:t> (</a:t>
+            </a:r>
+            <a:r>
+              <a:rPr lang="de-DE" dirty="0" smtClean="0"/>
+              <a:t>ODD) --</a:t>
+            </a:r>
+            <a:r>
+              <a:rPr lang="de-DE" dirty="0" smtClean="0">
+                <a:sym typeface="Wingdings" panose="05000000000000000000" pitchFamily="2" charset="2"/>
+              </a:rPr>
+              <a:t>--&gt; https://www1.in.tum.de/lehrstuhl_1/people/people-archive/43-publications/books/244-oose-template-objectdesigndocument</a:t>
+            </a:r>
+            <a:endParaRPr lang="de-DE" dirty="0" smtClean="0"/>
+          </a:p>
+          <a:p>
+            <a:pPr marL="228600" indent="-228600">
+              <a:buFont typeface="+mj-lt"/>
+              <a:buAutoNum type="arabicPeriod"/>
+            </a:pPr>
+            <a:r>
+              <a:rPr lang="de-DE" dirty="0" smtClean="0"/>
+              <a:t>Test </a:t>
+            </a:r>
+            <a:r>
+              <a:rPr lang="de-DE" dirty="0"/>
+              <a:t>Manual (TM</a:t>
+            </a:r>
+            <a:r>
+              <a:rPr lang="de-DE" dirty="0" smtClean="0"/>
+              <a:t>)</a:t>
+            </a:r>
+          </a:p>
+          <a:p>
+            <a:pPr marL="228600" indent="-228600">
+              <a:buFont typeface="+mj-lt"/>
+              <a:buAutoNum type="arabicPeriod"/>
+            </a:pPr>
+            <a:r>
+              <a:rPr lang="de-DE" dirty="0" smtClean="0"/>
+              <a:t>User </a:t>
+            </a:r>
+            <a:r>
+              <a:rPr lang="de-DE" dirty="0"/>
+              <a:t>Manual (UM)</a:t>
+            </a:r>
+          </a:p>
+          <a:p>
+            <a:endParaRPr lang="de-DE" dirty="0" smtClean="0"/>
+          </a:p>
+          <a:p>
+            <a:r>
+              <a:rPr lang="de-DE" dirty="0" smtClean="0"/>
+              <a:t>Code</a:t>
+            </a:r>
+            <a:endParaRPr lang="de-DE" dirty="0"/>
+          </a:p>
+        </p:txBody>
+      </p:sp>
+      <p:sp>
+        <p:nvSpPr>
+          <p:cNvPr id="4" name="Foliennummernplatzhalter 3"/>
+          <p:cNvSpPr>
+            <a:spLocks noGrp="1"/>
+          </p:cNvSpPr>
+          <p:nvPr>
+            <p:ph type="sldNum" sz="quarter" idx="10"/>
+          </p:nvPr>
+        </p:nvSpPr>
+        <p:spPr/>
+        <p:txBody>
+          <a:bodyPr/>
+          <a:lstStyle/>
+          <a:p>
+            <a:fld id="{7C56EBB8-86B7-4B17-9FE6-1D6C78FAEC35}" type="slidenum">
+              <a:rPr lang="de-DE" altLang="de-DE" smtClean="0"/>
+              <a:pPr/>
+              <a:t>5</a:t>
+            </a:fld>
+            <a:endParaRPr lang="de-DE" altLang="de-DE"/>
+          </a:p>
+        </p:txBody>
+      </p:sp>
+    </p:spTree>
+    <p:extLst>
+      <p:ext uri="{BB962C8B-B14F-4D97-AF65-F5344CB8AC3E}">
+        <p14:creationId xmlns:p14="http://schemas.microsoft.com/office/powerpoint/2010/main" val="4186262116"/>
+      </p:ext>
+    </p:extLst>
+  </p:cSld>
+  <p:clrMapOvr>
+    <a:masterClrMapping/>
+  </p:clrMapOvr>
+</p:notes>
+</file>
+
+<file path=ppt/notesSlides/notesSlide5.xml><?xml version="1.0" encoding="utf-8"?>
+<p:notes xmlns:a="http://schemas.openxmlformats.org/drawingml/2006/main" xmlns:r="http://schemas.openxmlformats.org/officeDocument/2006/relationships" xmlns:p="http://schemas.openxmlformats.org/presentationml/2006/main">
+  <p:cSld>
+    <p:spTree>
+      <p:nvGrpSpPr>
+        <p:cNvPr id="1" name=""/>
+        <p:cNvGrpSpPr/>
+        <p:nvPr/>
+      </p:nvGrpSpPr>
+      <p:grpSpPr>
+        <a:xfrm>
+          <a:off x="0" y="0"/>
+          <a:ext cx="0" cy="0"/>
+          <a:chOff x="0" y="0"/>
+          <a:chExt cx="0" cy="0"/>
+        </a:xfrm>
+      </p:grpSpPr>
+      <p:sp>
+        <p:nvSpPr>
+          <p:cNvPr id="2" name="Folienbildplatzhalter 1"/>
+          <p:cNvSpPr>
+            <a:spLocks noGrp="1" noRot="1" noChangeAspect="1"/>
+          </p:cNvSpPr>
+          <p:nvPr>
+            <p:ph type="sldImg"/>
+          </p:nvPr>
+        </p:nvSpPr>
+        <p:spPr/>
+      </p:sp>
+      <p:sp>
+        <p:nvSpPr>
+          <p:cNvPr id="3" name="Notizenplatzhalter 2"/>
+          <p:cNvSpPr>
+            <a:spLocks noGrp="1"/>
+          </p:cNvSpPr>
+          <p:nvPr>
+            <p:ph type="body" idx="1"/>
+          </p:nvPr>
+        </p:nvSpPr>
+        <p:spPr/>
+        <p:txBody>
+          <a:bodyPr/>
+          <a:lstStyle/>
+          <a:p>
+            <a:r>
+              <a:rPr lang="de-DE" b="1" dirty="0" smtClean="0"/>
+              <a:t>Wenn ein Kunde oder ein Entwickler die KB bezüglich der TE abruft. Sollte diese Webseite </a:t>
+            </a:r>
+            <a:r>
+              <a:rPr lang="de-DE" b="1" baseline="0" dirty="0" smtClean="0"/>
+              <a:t> die gewünschte Information liefern. Die Webseite ist in 2 Bereiche gegliedert</a:t>
+            </a:r>
+          </a:p>
+          <a:p>
+            <a:endParaRPr lang="de-DE" b="1" baseline="0" dirty="0" smtClean="0"/>
+          </a:p>
+          <a:p>
+            <a:pPr marL="228600" indent="-228600">
+              <a:buFont typeface="+mj-lt"/>
+              <a:buAutoNum type="arabicPeriod"/>
+            </a:pPr>
+            <a:r>
+              <a:rPr lang="de-DE" baseline="0" dirty="0" smtClean="0"/>
+              <a:t>ÖF= wo Entwickler, Kunde und Endnutzer </a:t>
+            </a:r>
+            <a:r>
+              <a:rPr lang="de-DE" baseline="0" dirty="0" err="1" smtClean="0"/>
+              <a:t>freeie</a:t>
+            </a:r>
+            <a:r>
+              <a:rPr lang="de-DE" baseline="0" dirty="0" smtClean="0"/>
+              <a:t> Zugriffe  haben.</a:t>
+            </a:r>
+          </a:p>
+          <a:p>
+            <a:pPr marL="228600" indent="-228600">
+              <a:buFont typeface="+mj-lt"/>
+              <a:buAutoNum type="arabicPeriod"/>
+            </a:pPr>
+            <a:r>
+              <a:rPr lang="de-DE" baseline="0" dirty="0" smtClean="0"/>
+              <a:t>VB= Wo der Entwickler zugrifft hat und  unter keine Umstände die Kunden sehen soll.</a:t>
+            </a:r>
+          </a:p>
+          <a:p>
+            <a:pPr marL="228600" indent="-228600">
+              <a:buFont typeface="+mj-lt"/>
+              <a:buAutoNum type="arabicPeriod"/>
+            </a:pPr>
+            <a:endParaRPr lang="en-US" dirty="0"/>
+          </a:p>
+        </p:txBody>
+      </p:sp>
+      <p:sp>
+        <p:nvSpPr>
+          <p:cNvPr id="4" name="Foliennummernplatzhalter 3"/>
+          <p:cNvSpPr>
+            <a:spLocks noGrp="1"/>
+          </p:cNvSpPr>
+          <p:nvPr>
+            <p:ph type="sldNum" sz="quarter" idx="10"/>
+          </p:nvPr>
+        </p:nvSpPr>
+        <p:spPr/>
+        <p:txBody>
+          <a:bodyPr/>
+          <a:lstStyle/>
+          <a:p>
+            <a:fld id="{7C56EBB8-86B7-4B17-9FE6-1D6C78FAEC35}" type="slidenum">
+              <a:rPr lang="de-DE" altLang="de-DE" smtClean="0"/>
+              <a:pPr/>
+              <a:t>6</a:t>
+            </a:fld>
+            <a:endParaRPr lang="de-DE" altLang="de-DE"/>
+          </a:p>
+        </p:txBody>
+      </p:sp>
+    </p:spTree>
+    <p:extLst>
+      <p:ext uri="{BB962C8B-B14F-4D97-AF65-F5344CB8AC3E}">
+        <p14:creationId xmlns:p14="http://schemas.microsoft.com/office/powerpoint/2010/main" val="3026496968"/>
+      </p:ext>
+    </p:extLst>
+  </p:cSld>
+  <p:clrMapOvr>
+    <a:masterClrMapping/>
+  </p:clrMapOvr>
+</p:notes>
+</file>
+
+<file path=ppt/notesSlides/notesSlide6.xml><?xml version="1.0" encoding="utf-8"?>
+<p:notes xmlns:a="http://schemas.openxmlformats.org/drawingml/2006/main" xmlns:r="http://schemas.openxmlformats.org/officeDocument/2006/relationships" xmlns:p="http://schemas.openxmlformats.org/presentationml/2006/main">
+  <p:cSld>
+    <p:spTree>
+      <p:nvGrpSpPr>
+        <p:cNvPr id="1" name=""/>
+        <p:cNvGrpSpPr/>
+        <p:nvPr/>
+      </p:nvGrpSpPr>
+      <p:grpSpPr>
+        <a:xfrm>
+          <a:off x="0" y="0"/>
+          <a:ext cx="0" cy="0"/>
+          <a:chOff x="0" y="0"/>
+          <a:chExt cx="0" cy="0"/>
+        </a:xfrm>
+      </p:grpSpPr>
+      <p:sp>
+        <p:nvSpPr>
+          <p:cNvPr id="2" name="Folienbildplatzhalter 1"/>
+          <p:cNvSpPr>
+            <a:spLocks noGrp="1" noRot="1" noChangeAspect="1"/>
+          </p:cNvSpPr>
+          <p:nvPr>
+            <p:ph type="sldImg"/>
+          </p:nvPr>
+        </p:nvSpPr>
+        <p:spPr/>
+      </p:sp>
+      <p:sp>
+        <p:nvSpPr>
+          <p:cNvPr id="3" name="Notizenplatzhalter 2"/>
+          <p:cNvSpPr>
+            <a:spLocks noGrp="1"/>
+          </p:cNvSpPr>
+          <p:nvPr>
+            <p:ph type="body" idx="1"/>
+          </p:nvPr>
+        </p:nvSpPr>
+        <p:spPr/>
+        <p:txBody>
+          <a:bodyPr/>
+          <a:lstStyle/>
+          <a:p>
+            <a:r>
+              <a:rPr lang="de-DE" dirty="0" smtClean="0"/>
+              <a:t>Die  </a:t>
+            </a:r>
+            <a:r>
+              <a:rPr lang="de-DE" b="1" dirty="0" smtClean="0"/>
+              <a:t>Öffentlicher  </a:t>
+            </a:r>
+            <a:r>
+              <a:rPr lang="de-DE" b="1" baseline="0" dirty="0" smtClean="0"/>
+              <a:t> Arbeitsbereich </a:t>
+            </a:r>
+            <a:r>
+              <a:rPr lang="de-DE" baseline="0" dirty="0" smtClean="0"/>
+              <a:t>ist hier einfach gelistet . Da von Hilscher Standard definiert ist. Daher ist an diese Stelle nicht so relevant.</a:t>
+            </a:r>
+            <a:endParaRPr lang="en-US" dirty="0"/>
+          </a:p>
+        </p:txBody>
+      </p:sp>
+      <p:sp>
+        <p:nvSpPr>
+          <p:cNvPr id="4" name="Foliennummernplatzhalter 3"/>
+          <p:cNvSpPr>
+            <a:spLocks noGrp="1"/>
+          </p:cNvSpPr>
+          <p:nvPr>
+            <p:ph type="sldNum" sz="quarter" idx="10"/>
+          </p:nvPr>
+        </p:nvSpPr>
+        <p:spPr/>
+        <p:txBody>
+          <a:bodyPr/>
+          <a:lstStyle/>
+          <a:p>
+            <a:fld id="{7C56EBB8-86B7-4B17-9FE6-1D6C78FAEC35}" type="slidenum">
+              <a:rPr lang="de-DE" altLang="de-DE" smtClean="0"/>
+              <a:pPr/>
+              <a:t>7</a:t>
+            </a:fld>
+            <a:endParaRPr lang="de-DE" altLang="de-DE"/>
+          </a:p>
+        </p:txBody>
+      </p:sp>
+    </p:spTree>
+    <p:extLst>
+      <p:ext uri="{BB962C8B-B14F-4D97-AF65-F5344CB8AC3E}">
+        <p14:creationId xmlns:p14="http://schemas.microsoft.com/office/powerpoint/2010/main" val="1487043745"/>
+      </p:ext>
+    </p:extLst>
+  </p:cSld>
+  <p:clrMapOvr>
+    <a:masterClrMapping/>
+  </p:clrMapOvr>
+</p:notes>
+</file>
+
+<file path=ppt/notesSlides/notesSlide7.xml><?xml version="1.0" encoding="utf-8"?>
+<p:notes xmlns:a="http://schemas.openxmlformats.org/drawingml/2006/main" xmlns:r="http://schemas.openxmlformats.org/officeDocument/2006/relationships" xmlns:p="http://schemas.openxmlformats.org/presentationml/2006/main">
+  <p:cSld>
+    <p:spTree>
+      <p:nvGrpSpPr>
+        <p:cNvPr id="1" name=""/>
+        <p:cNvGrpSpPr/>
+        <p:nvPr/>
+      </p:nvGrpSpPr>
+      <p:grpSpPr>
+        <a:xfrm>
+          <a:off x="0" y="0"/>
+          <a:ext cx="0" cy="0"/>
+          <a:chOff x="0" y="0"/>
+          <a:chExt cx="0" cy="0"/>
+        </a:xfrm>
+      </p:grpSpPr>
+      <p:sp>
+        <p:nvSpPr>
+          <p:cNvPr id="2" name="Folienbildplatzhalter 1"/>
+          <p:cNvSpPr>
+            <a:spLocks noGrp="1" noRot="1" noChangeAspect="1"/>
+          </p:cNvSpPr>
+          <p:nvPr>
+            <p:ph type="sldImg"/>
+          </p:nvPr>
+        </p:nvSpPr>
+        <p:spPr/>
+      </p:sp>
+      <p:sp>
+        <p:nvSpPr>
+          <p:cNvPr id="3" name="Notizenplatzhalter 2"/>
+          <p:cNvSpPr>
+            <a:spLocks noGrp="1"/>
+          </p:cNvSpPr>
+          <p:nvPr>
+            <p:ph type="body" idx="1"/>
+          </p:nvPr>
+        </p:nvSpPr>
+        <p:spPr/>
+        <p:txBody>
+          <a:bodyPr/>
+          <a:lstStyle/>
+          <a:p>
+            <a:r>
+              <a:rPr lang="de-DE" dirty="0"/>
+              <a:t>Quellcode</a:t>
+            </a:r>
+            <a:r>
+              <a:rPr lang="de-DE" baseline="0" dirty="0"/>
+              <a:t> ===? Repository</a:t>
+            </a:r>
+          </a:p>
+          <a:p>
+            <a:r>
+              <a:rPr lang="de-DE" baseline="0" dirty="0" err="1"/>
+              <a:t>Issue</a:t>
+            </a:r>
+            <a:r>
+              <a:rPr lang="de-DE" baseline="0" dirty="0"/>
+              <a:t> Tracking == Fehlermeldung</a:t>
+            </a:r>
+          </a:p>
+          <a:p>
+            <a:pPr lvl="1"/>
+            <a:r>
+              <a:rPr lang="de-DE" baseline="0" dirty="0"/>
+              <a:t>*  </a:t>
+            </a:r>
+            <a:endParaRPr lang="en-US" dirty="0"/>
+          </a:p>
+        </p:txBody>
+      </p:sp>
+      <p:sp>
+        <p:nvSpPr>
+          <p:cNvPr id="4" name="Foliennummernplatzhalter 3"/>
+          <p:cNvSpPr>
+            <a:spLocks noGrp="1"/>
+          </p:cNvSpPr>
+          <p:nvPr>
+            <p:ph type="sldNum" sz="quarter" idx="10"/>
+          </p:nvPr>
+        </p:nvSpPr>
+        <p:spPr/>
+        <p:txBody>
+          <a:bodyPr/>
+          <a:lstStyle/>
+          <a:p>
+            <a:fld id="{7C56EBB8-86B7-4B17-9FE6-1D6C78FAEC35}" type="slidenum">
+              <a:rPr lang="de-DE" altLang="de-DE" smtClean="0"/>
+              <a:pPr/>
+              <a:t>8</a:t>
+            </a:fld>
+            <a:endParaRPr lang="de-DE" altLang="de-DE"/>
+          </a:p>
+        </p:txBody>
+      </p:sp>
+    </p:spTree>
+    <p:extLst>
+      <p:ext uri="{BB962C8B-B14F-4D97-AF65-F5344CB8AC3E}">
+        <p14:creationId xmlns:p14="http://schemas.microsoft.com/office/powerpoint/2010/main" val="2385980104"/>
+      </p:ext>
+    </p:extLst>
+  </p:cSld>
+  <p:clrMapOvr>
+    <a:masterClrMapping/>
+  </p:clrMapOvr>
+</p:notes>
+</file>
+
+<file path=ppt/notesSlides/notesSlide8.xml><?xml version="1.0" encoding="utf-8"?>
+<p:notes xmlns:a="http://schemas.openxmlformats.org/drawingml/2006/main" xmlns:r="http://schemas.openxmlformats.org/officeDocument/2006/relationships" xmlns:p="http://schemas.openxmlformats.org/presentationml/2006/main">
+  <p:cSld>
+    <p:spTree>
+      <p:nvGrpSpPr>
+        <p:cNvPr id="1" name=""/>
+        <p:cNvGrpSpPr/>
+        <p:nvPr/>
+      </p:nvGrpSpPr>
+      <p:grpSpPr>
+        <a:xfrm>
+          <a:off x="0" y="0"/>
+          <a:ext cx="0" cy="0"/>
+          <a:chOff x="0" y="0"/>
+          <a:chExt cx="0" cy="0"/>
+        </a:xfrm>
+      </p:grpSpPr>
+      <p:sp>
+        <p:nvSpPr>
+          <p:cNvPr id="2" name="Folienbildplatzhalter 1"/>
+          <p:cNvSpPr>
+            <a:spLocks noGrp="1" noRot="1" noChangeAspect="1"/>
+          </p:cNvSpPr>
+          <p:nvPr>
+            <p:ph type="sldImg"/>
+          </p:nvPr>
+        </p:nvSpPr>
+        <p:spPr/>
+      </p:sp>
+      <p:sp>
+        <p:nvSpPr>
+          <p:cNvPr id="3" name="Notizenplatzhalter 2"/>
+          <p:cNvSpPr>
+            <a:spLocks noGrp="1"/>
+          </p:cNvSpPr>
+          <p:nvPr>
+            <p:ph type="body" idx="1"/>
+          </p:nvPr>
+        </p:nvSpPr>
+        <p:spPr/>
+        <p:txBody>
+          <a:bodyPr/>
+          <a:lstStyle/>
+          <a:p>
+            <a:r>
+              <a:rPr lang="de-DE" dirty="0"/>
+              <a:t>SDD: System Design </a:t>
+            </a:r>
+            <a:r>
+              <a:rPr lang="de-DE" dirty="0" err="1"/>
+              <a:t>Documents</a:t>
+            </a:r>
+            <a:r>
+              <a:rPr lang="de-DE" dirty="0"/>
+              <a:t>/</a:t>
+            </a:r>
+            <a:r>
+              <a:rPr lang="de-DE" dirty="0" err="1"/>
+              <a:t>Decription</a:t>
+            </a:r>
+            <a:r>
+              <a:rPr lang="de-DE" dirty="0"/>
+              <a:t> was?</a:t>
+            </a:r>
+          </a:p>
+        </p:txBody>
+      </p:sp>
+      <p:sp>
+        <p:nvSpPr>
+          <p:cNvPr id="4" name="Foliennummernplatzhalter 3"/>
+          <p:cNvSpPr>
+            <a:spLocks noGrp="1"/>
+          </p:cNvSpPr>
+          <p:nvPr>
+            <p:ph type="sldNum" sz="quarter" idx="10"/>
+          </p:nvPr>
+        </p:nvSpPr>
+        <p:spPr/>
+        <p:txBody>
+          <a:bodyPr/>
+          <a:lstStyle/>
+          <a:p>
+            <a:fld id="{7C56EBB8-86B7-4B17-9FE6-1D6C78FAEC35}" type="slidenum">
+              <a:rPr lang="de-DE" altLang="de-DE" smtClean="0"/>
+              <a:pPr/>
+              <a:t>9</a:t>
+            </a:fld>
+            <a:endParaRPr lang="de-DE" altLang="de-DE"/>
+          </a:p>
+        </p:txBody>
+      </p:sp>
+    </p:spTree>
+    <p:extLst>
+      <p:ext uri="{BB962C8B-B14F-4D97-AF65-F5344CB8AC3E}">
+        <p14:creationId xmlns:p14="http://schemas.microsoft.com/office/powerpoint/2010/main" val="2185017981"/>
+      </p:ext>
+    </p:extLst>
+  </p:cSld>
+  <p:clrMapOvr>
+    <a:masterClrMapping/>
+  </p:clrMapOvr>
+</p:notes>
+</file>
+
+<file path=ppt/notesSlides/notesSlide9.xml><?xml version="1.0" encoding="utf-8"?>
+<p:notes xmlns:a="http://schemas.openxmlformats.org/drawingml/2006/main" xmlns:r="http://schemas.openxmlformats.org/officeDocument/2006/relationships" xmlns:p="http://schemas.openxmlformats.org/presentationml/2006/main">
+  <p:cSld>
+    <p:spTree>
+      <p:nvGrpSpPr>
+        <p:cNvPr id="1" name=""/>
+        <p:cNvGrpSpPr/>
+        <p:nvPr/>
+      </p:nvGrpSpPr>
+      <p:grpSpPr>
+        <a:xfrm>
+          <a:off x="0" y="0"/>
+          <a:ext cx="0" cy="0"/>
+          <a:chOff x="0" y="0"/>
+          <a:chExt cx="0" cy="0"/>
+        </a:xfrm>
+      </p:grpSpPr>
+      <p:sp>
+        <p:nvSpPr>
+          <p:cNvPr id="2" name="Folienbildplatzhalter 1"/>
+          <p:cNvSpPr>
+            <a:spLocks noGrp="1" noRot="1" noChangeAspect="1"/>
+          </p:cNvSpPr>
+          <p:nvPr>
+            <p:ph type="sldImg"/>
+          </p:nvPr>
+        </p:nvSpPr>
+        <p:spPr/>
+      </p:sp>
+      <p:sp>
+        <p:nvSpPr>
+          <p:cNvPr id="3" name="Notizenplatzhalter 2"/>
+          <p:cNvSpPr>
+            <a:spLocks noGrp="1"/>
+          </p:cNvSpPr>
+          <p:nvPr>
+            <p:ph type="body" idx="1"/>
+          </p:nvPr>
+        </p:nvSpPr>
+        <p:spPr/>
+        <p:txBody>
+          <a:bodyPr/>
+          <a:lstStyle/>
+          <a:p>
+            <a:r>
+              <a:rPr lang="de-DE" dirty="0"/>
+              <a:t>SDD: Software Design </a:t>
+            </a:r>
+            <a:r>
+              <a:rPr lang="de-DE" dirty="0" err="1"/>
+              <a:t>Documents</a:t>
+            </a:r>
+            <a:r>
+              <a:rPr lang="de-DE" dirty="0"/>
+              <a:t>/</a:t>
+            </a:r>
+            <a:r>
+              <a:rPr lang="de-DE" dirty="0" err="1"/>
+              <a:t>Decription</a:t>
+            </a:r>
+            <a:r>
+              <a:rPr lang="de-DE" dirty="0"/>
+              <a:t> was?</a:t>
+            </a:r>
+          </a:p>
+        </p:txBody>
+      </p:sp>
+      <p:sp>
+        <p:nvSpPr>
+          <p:cNvPr id="4" name="Foliennummernplatzhalter 3"/>
+          <p:cNvSpPr>
+            <a:spLocks noGrp="1"/>
+          </p:cNvSpPr>
+          <p:nvPr>
+            <p:ph type="sldNum" sz="quarter" idx="10"/>
+          </p:nvPr>
+        </p:nvSpPr>
+        <p:spPr/>
+        <p:txBody>
+          <a:bodyPr/>
+          <a:lstStyle/>
+          <a:p>
+            <a:fld id="{7C56EBB8-86B7-4B17-9FE6-1D6C78FAEC35}" type="slidenum">
+              <a:rPr lang="de-DE" altLang="de-DE" smtClean="0"/>
+              <a:pPr/>
+              <a:t>10</a:t>
+            </a:fld>
+            <a:endParaRPr lang="de-DE" altLang="de-DE"/>
+          </a:p>
+        </p:txBody>
+      </p:sp>
+    </p:spTree>
+    <p:extLst>
+      <p:ext uri="{BB962C8B-B14F-4D97-AF65-F5344CB8AC3E}">
+        <p14:creationId xmlns:p14="http://schemas.microsoft.com/office/powerpoint/2010/main" val="1855379874"/>
+      </p:ext>
+    </p:extLst>
   </p:cSld>
   <p:clrMapOvr>
     <a:masterClrMapping/>
@@ -20213,6 +20851,14 @@
               </a:rPr>
               <a:t>Intelligente Lösungen für die industrielle Kommunikation</a:t>
             </a:r>
+            <a:r>
+              <a:rPr lang="de-DE" altLang="de-DE" sz="1400">
+                <a:solidFill>
+                  <a:schemeClr val="bg1"/>
+                </a:solidFill>
+              </a:rPr>
+              <a:t/>
+            </a:r>
             <a:br>
               <a:rPr lang="de-DE" altLang="de-DE" sz="1400">
                 <a:solidFill>
@@ -20236,6 +20882,13 @@
   <p:transition>
     <p:randomBar/>
   </p:transition>
+  <p:timing>
+    <p:tnLst>
+      <p:par>
+        <p:cTn id="1" dur="indefinite" restart="never" nodeType="tmRoot"/>
+      </p:par>
+    </p:tnLst>
+  </p:timing>
 </p:sld>
 </file>
 
@@ -21752,6 +22405,13 @@
   <p:transition>
     <p:zoom/>
   </p:transition>
+  <p:timing>
+    <p:tnLst>
+      <p:par>
+        <p:cTn id="1" dur="indefinite" restart="never" nodeType="tmRoot"/>
+      </p:par>
+    </p:tnLst>
+  </p:timing>
 </p:sld>
 </file>
 
@@ -23214,6 +23874,13 @@
   <p:transition>
     <p:zoom/>
   </p:transition>
+  <p:timing>
+    <p:tnLst>
+      <p:par>
+        <p:cTn id="1" dur="indefinite" restart="never" nodeType="tmRoot"/>
+      </p:par>
+    </p:tnLst>
+  </p:timing>
 </p:sld>
 </file>
 
@@ -23542,6 +24209,10 @@
             <a:br>
               <a:rPr lang="de-DE" altLang="de-DE" sz="2400" b="0"/>
             </a:br>
+            <a:r>
+              <a:rPr lang="de-DE" altLang="de-DE" sz="700"/>
+              <a:t/>
+            </a:r>
             <a:br>
               <a:rPr lang="de-DE" altLang="de-DE" sz="700"/>
             </a:br>
@@ -23771,6 +24442,14 @@
               </a:rPr>
               <a:t>Vorname Nachname</a:t>
             </a:r>
+            <a:r>
+              <a:rPr lang="de-DE" altLang="de-DE" sz="2100">
+                <a:solidFill>
+                  <a:schemeClr val="bg2"/>
+                </a:solidFill>
+              </a:rPr>
+              <a:t/>
+            </a:r>
             <a:br>
               <a:rPr lang="de-DE" altLang="de-DE" sz="2100">
                 <a:solidFill>
@@ -24111,6 +24790,14 @@
                 </a:solidFill>
               </a:rPr>
             </a:br>
+            <a:r>
+              <a:rPr lang="de-DE" altLang="de-DE" sz="700">
+                <a:solidFill>
+                  <a:srgbClr val="DF0029"/>
+                </a:solidFill>
+              </a:rPr>
+              <a:t/>
+            </a:r>
             <a:br>
               <a:rPr lang="de-DE" altLang="de-DE" sz="700">
                 <a:solidFill>
@@ -26221,6 +26908,13 @@
   <p:transition>
     <p:randomBar/>
   </p:transition>
+  <p:timing>
+    <p:tnLst>
+      <p:par>
+        <p:cTn id="1" dur="indefinite" restart="never" nodeType="tmRoot"/>
+      </p:par>
+    </p:tnLst>
+  </p:timing>
 </p:sld>
 </file>
 
@@ -27937,33 +28631,15 @@
                                   </p:childTnLst>
                                 </p:cTn>
                               </p:par>
-                            </p:childTnLst>
-                          </p:cTn>
-                        </p:par>
-                      </p:childTnLst>
-                    </p:cTn>
-                  </p:par>
-                  <p:par>
-                    <p:cTn id="8" fill="hold">
-                      <p:stCondLst>
-                        <p:cond delay="indefinite"/>
-                      </p:stCondLst>
-                      <p:childTnLst>
-                        <p:par>
-                          <p:cTn id="9" fill="hold">
-                            <p:stCondLst>
-                              <p:cond delay="0"/>
-                            </p:stCondLst>
-                            <p:childTnLst>
                               <p:par>
-                                <p:cTn id="10" presetID="22" presetClass="entr" presetSubtype="4" fill="hold" grpId="0" nodeType="clickEffect">
+                                <p:cTn id="8" presetID="22" presetClass="entr" presetSubtype="4" fill="hold" grpId="0" nodeType="withEffect">
                                   <p:stCondLst>
                                     <p:cond delay="0"/>
                                   </p:stCondLst>
                                   <p:childTnLst>
                                     <p:set>
                                       <p:cBhvr>
-                                        <p:cTn id="11" dur="1" fill="hold">
+                                        <p:cTn id="9" dur="1" fill="hold">
                                           <p:stCondLst>
                                             <p:cond delay="0"/>
                                           </p:stCondLst>
@@ -27985,7 +28661,7 @@
                                     </p:set>
                                     <p:animEffect transition="in" filter="wipe(down)">
                                       <p:cBhvr>
-                                        <p:cTn id="12" dur="500"/>
+                                        <p:cTn id="10" dur="500"/>
                                         <p:tgtEl>
                                           <p:spTgt spid="5">
                                             <p:graphicEl>
@@ -28005,26 +28681,26 @@
                     </p:cTn>
                   </p:par>
                   <p:par>
-                    <p:cTn id="13" fill="hold">
+                    <p:cTn id="11" fill="hold">
                       <p:stCondLst>
                         <p:cond delay="indefinite"/>
                       </p:stCondLst>
                       <p:childTnLst>
                         <p:par>
-                          <p:cTn id="14" fill="hold">
+                          <p:cTn id="12" fill="hold">
                             <p:stCondLst>
                               <p:cond delay="0"/>
                             </p:stCondLst>
                             <p:childTnLst>
                               <p:par>
-                                <p:cTn id="15" presetID="22" presetClass="entr" presetSubtype="4" fill="hold" grpId="0" nodeType="clickEffect">
+                                <p:cTn id="13" presetID="22" presetClass="entr" presetSubtype="4" fill="hold" grpId="0" nodeType="clickEffect">
                                   <p:stCondLst>
                                     <p:cond delay="0"/>
                                   </p:stCondLst>
                                   <p:childTnLst>
                                     <p:set>
                                       <p:cBhvr>
-                                        <p:cTn id="16" dur="1" fill="hold">
+                                        <p:cTn id="14" dur="1" fill="hold">
                                           <p:stCondLst>
                                             <p:cond delay="0"/>
                                           </p:stCondLst>
@@ -28046,7 +28722,7 @@
                                     </p:set>
                                     <p:animEffect transition="in" filter="wipe(down)">
                                       <p:cBhvr>
-                                        <p:cTn id="17" dur="500"/>
+                                        <p:cTn id="15" dur="500"/>
                                         <p:tgtEl>
                                           <p:spTgt spid="5">
                                             <p:graphicEl>
@@ -28066,26 +28742,26 @@
                     </p:cTn>
                   </p:par>
                   <p:par>
-                    <p:cTn id="18" fill="hold">
+                    <p:cTn id="16" fill="hold">
                       <p:stCondLst>
                         <p:cond delay="indefinite"/>
                       </p:stCondLst>
                       <p:childTnLst>
                         <p:par>
-                          <p:cTn id="19" fill="hold">
+                          <p:cTn id="17" fill="hold">
                             <p:stCondLst>
                               <p:cond delay="0"/>
                             </p:stCondLst>
                             <p:childTnLst>
                               <p:par>
-                                <p:cTn id="20" presetID="22" presetClass="entr" presetSubtype="4" fill="hold" nodeType="clickEffect">
+                                <p:cTn id="18" presetID="22" presetClass="entr" presetSubtype="4" fill="hold" nodeType="clickEffect">
                                   <p:stCondLst>
                                     <p:cond delay="0"/>
                                   </p:stCondLst>
                                   <p:childTnLst>
                                     <p:set>
                                       <p:cBhvr>
-                                        <p:cTn id="21" dur="1" fill="hold">
+                                        <p:cTn id="19" dur="1" fill="hold">
                                           <p:stCondLst>
                                             <p:cond delay="0"/>
                                           </p:stCondLst>
@@ -28107,7 +28783,7 @@
                                     </p:set>
                                     <p:animEffect transition="in" filter="wipe(down)">
                                       <p:cBhvr>
-                                        <p:cTn id="22" dur="500"/>
+                                        <p:cTn id="20" dur="500"/>
                                         <p:tgtEl>
                                           <p:spTgt spid="3">
                                             <p:txEl>
@@ -28127,26 +28803,26 @@
                     </p:cTn>
                   </p:par>
                   <p:par>
-                    <p:cTn id="23" fill="hold">
+                    <p:cTn id="21" fill="hold">
                       <p:stCondLst>
                         <p:cond delay="indefinite"/>
                       </p:stCondLst>
                       <p:childTnLst>
                         <p:par>
-                          <p:cTn id="24" fill="hold">
+                          <p:cTn id="22" fill="hold">
                             <p:stCondLst>
                               <p:cond delay="0"/>
                             </p:stCondLst>
                             <p:childTnLst>
                               <p:par>
-                                <p:cTn id="25" presetID="22" presetClass="entr" presetSubtype="4" fill="hold" nodeType="clickEffect">
+                                <p:cTn id="23" presetID="22" presetClass="entr" presetSubtype="4" fill="hold" nodeType="clickEffect">
                                   <p:stCondLst>
                                     <p:cond delay="0"/>
                                   </p:stCondLst>
                                   <p:childTnLst>
                                     <p:set>
                                       <p:cBhvr>
-                                        <p:cTn id="26" dur="1" fill="hold">
+                                        <p:cTn id="24" dur="1" fill="hold">
                                           <p:stCondLst>
                                             <p:cond delay="0"/>
                                           </p:stCondLst>
@@ -28168,7 +28844,7 @@
                                     </p:set>
                                     <p:animEffect transition="in" filter="wipe(down)">
                                       <p:cBhvr>
-                                        <p:cTn id="27" dur="500"/>
+                                        <p:cTn id="25" dur="500"/>
                                         <p:tgtEl>
                                           <p:spTgt spid="3">
                                             <p:txEl>
@@ -28188,26 +28864,26 @@
                     </p:cTn>
                   </p:par>
                   <p:par>
-                    <p:cTn id="28" fill="hold">
+                    <p:cTn id="26" fill="hold">
                       <p:stCondLst>
                         <p:cond delay="indefinite"/>
                       </p:stCondLst>
                       <p:childTnLst>
                         <p:par>
-                          <p:cTn id="29" fill="hold">
+                          <p:cTn id="27" fill="hold">
                             <p:stCondLst>
                               <p:cond delay="0"/>
                             </p:stCondLst>
                             <p:childTnLst>
                               <p:par>
-                                <p:cTn id="30" presetID="22" presetClass="entr" presetSubtype="4" fill="hold" nodeType="clickEffect">
+                                <p:cTn id="28" presetID="22" presetClass="entr" presetSubtype="4" fill="hold" nodeType="clickEffect">
                                   <p:stCondLst>
                                     <p:cond delay="0"/>
                                   </p:stCondLst>
                                   <p:childTnLst>
                                     <p:set>
                                       <p:cBhvr>
-                                        <p:cTn id="31" dur="1" fill="hold">
+                                        <p:cTn id="29" dur="1" fill="hold">
                                           <p:stCondLst>
                                             <p:cond delay="0"/>
                                           </p:stCondLst>
@@ -28229,7 +28905,7 @@
                                     </p:set>
                                     <p:animEffect transition="in" filter="wipe(down)">
                                       <p:cBhvr>
-                                        <p:cTn id="32" dur="500"/>
+                                        <p:cTn id="30" dur="500"/>
                                         <p:tgtEl>
                                           <p:spTgt spid="3">
                                             <p:txEl>
@@ -28249,26 +28925,26 @@
                     </p:cTn>
                   </p:par>
                   <p:par>
-                    <p:cTn id="33" fill="hold">
+                    <p:cTn id="31" fill="hold">
                       <p:stCondLst>
                         <p:cond delay="indefinite"/>
                       </p:stCondLst>
                       <p:childTnLst>
                         <p:par>
-                          <p:cTn id="34" fill="hold">
+                          <p:cTn id="32" fill="hold">
                             <p:stCondLst>
                               <p:cond delay="0"/>
                             </p:stCondLst>
                             <p:childTnLst>
                               <p:par>
-                                <p:cTn id="35" presetID="22" presetClass="entr" presetSubtype="4" fill="hold" nodeType="clickEffect">
+                                <p:cTn id="33" presetID="22" presetClass="entr" presetSubtype="4" fill="hold" nodeType="clickEffect">
                                   <p:stCondLst>
                                     <p:cond delay="0"/>
                                   </p:stCondLst>
                                   <p:childTnLst>
                                     <p:set>
                                       <p:cBhvr>
-                                        <p:cTn id="36" dur="1" fill="hold">
+                                        <p:cTn id="34" dur="1" fill="hold">
                                           <p:stCondLst>
                                             <p:cond delay="0"/>
                                           </p:stCondLst>
@@ -28290,7 +28966,7 @@
                                     </p:set>
                                     <p:animEffect transition="in" filter="wipe(down)">
                                       <p:cBhvr>
-                                        <p:cTn id="37" dur="500"/>
+                                        <p:cTn id="35" dur="500"/>
                                         <p:tgtEl>
                                           <p:spTgt spid="3">
                                             <p:txEl>
@@ -28310,26 +28986,26 @@
                     </p:cTn>
                   </p:par>
                   <p:par>
-                    <p:cTn id="38" fill="hold">
+                    <p:cTn id="36" fill="hold">
                       <p:stCondLst>
                         <p:cond delay="indefinite"/>
                       </p:stCondLst>
                       <p:childTnLst>
                         <p:par>
-                          <p:cTn id="39" fill="hold">
+                          <p:cTn id="37" fill="hold">
                             <p:stCondLst>
                               <p:cond delay="0"/>
                             </p:stCondLst>
                             <p:childTnLst>
                               <p:par>
-                                <p:cTn id="40" presetID="22" presetClass="entr" presetSubtype="4" fill="hold" nodeType="clickEffect">
+                                <p:cTn id="38" presetID="22" presetClass="entr" presetSubtype="4" fill="hold" nodeType="clickEffect">
                                   <p:stCondLst>
                                     <p:cond delay="0"/>
                                   </p:stCondLst>
                                   <p:childTnLst>
                                     <p:set>
                                       <p:cBhvr>
-                                        <p:cTn id="41" dur="1" fill="hold">
+                                        <p:cTn id="39" dur="1" fill="hold">
                                           <p:stCondLst>
                                             <p:cond delay="0"/>
                                           </p:stCondLst>
@@ -28351,7 +29027,7 @@
                                     </p:set>
                                     <p:animEffect transition="in" filter="wipe(down)">
                                       <p:cBhvr>
-                                        <p:cTn id="42" dur="500"/>
+                                        <p:cTn id="40" dur="500"/>
                                         <p:tgtEl>
                                           <p:spTgt spid="3">
                                             <p:txEl>
@@ -28371,26 +29047,26 @@
                     </p:cTn>
                   </p:par>
                   <p:par>
-                    <p:cTn id="43" fill="hold">
+                    <p:cTn id="41" fill="hold">
                       <p:stCondLst>
                         <p:cond delay="indefinite"/>
                       </p:stCondLst>
                       <p:childTnLst>
                         <p:par>
-                          <p:cTn id="44" fill="hold">
+                          <p:cTn id="42" fill="hold">
                             <p:stCondLst>
                               <p:cond delay="0"/>
                             </p:stCondLst>
                             <p:childTnLst>
                               <p:par>
-                                <p:cTn id="45" presetID="22" presetClass="entr" presetSubtype="4" fill="hold" nodeType="clickEffect">
+                                <p:cTn id="43" presetID="22" presetClass="entr" presetSubtype="4" fill="hold" nodeType="clickEffect">
                                   <p:stCondLst>
                                     <p:cond delay="0"/>
                                   </p:stCondLst>
                                   <p:childTnLst>
                                     <p:set>
                                       <p:cBhvr>
-                                        <p:cTn id="46" dur="1" fill="hold">
+                                        <p:cTn id="44" dur="1" fill="hold">
                                           <p:stCondLst>
                                             <p:cond delay="0"/>
                                           </p:stCondLst>
@@ -28412,7 +29088,7 @@
                                     </p:set>
                                     <p:animEffect transition="in" filter="wipe(down)">
                                       <p:cBhvr>
-                                        <p:cTn id="47" dur="500"/>
+                                        <p:cTn id="45" dur="500"/>
                                         <p:tgtEl>
                                           <p:spTgt spid="3">
                                             <p:txEl>
@@ -28432,26 +29108,26 @@
                     </p:cTn>
                   </p:par>
                   <p:par>
-                    <p:cTn id="48" fill="hold">
+                    <p:cTn id="46" fill="hold">
                       <p:stCondLst>
                         <p:cond delay="indefinite"/>
                       </p:stCondLst>
                       <p:childTnLst>
                         <p:par>
-                          <p:cTn id="49" fill="hold">
+                          <p:cTn id="47" fill="hold">
                             <p:stCondLst>
                               <p:cond delay="0"/>
                             </p:stCondLst>
                             <p:childTnLst>
                               <p:par>
-                                <p:cTn id="50" presetID="22" presetClass="entr" presetSubtype="4" fill="hold" grpId="0" nodeType="clickEffect">
+                                <p:cTn id="48" presetID="22" presetClass="entr" presetSubtype="4" fill="hold" grpId="0" nodeType="clickEffect">
                                   <p:stCondLst>
                                     <p:cond delay="0"/>
                                   </p:stCondLst>
                                   <p:childTnLst>
                                     <p:set>
                                       <p:cBhvr>
-                                        <p:cTn id="51" dur="1" fill="hold">
+                                        <p:cTn id="49" dur="1" fill="hold">
                                           <p:stCondLst>
                                             <p:cond delay="0"/>
                                           </p:stCondLst>
@@ -28469,7 +29145,7 @@
                                     </p:set>
                                     <p:animEffect transition="in" filter="wipe(down)">
                                       <p:cBhvr>
-                                        <p:cTn id="52" dur="500"/>
+                                        <p:cTn id="50" dur="500"/>
                                         <p:tgtEl>
                                           <p:spTgt spid="6"/>
                                         </p:tgtEl>
@@ -28506,7 +29182,7 @@
       </p:par>
     </p:tnLst>
     <p:bldLst>
-      <p:bldGraphic spid="5" grpId="0">
+      <p:bldGraphic spid="5" grpId="0" uiExpand="1">
         <p:bldSub>
           <a:bldDgm bld="one"/>
         </p:bldSub>
@@ -28584,7 +29260,7 @@
           </p:nvPr>
         </p:nvPicPr>
         <p:blipFill>
-          <a:blip r:embed="rId2"/>
+          <a:blip r:embed="rId3"/>
           <a:stretch>
             <a:fillRect/>
           </a:stretch>
@@ -28886,7 +29562,7 @@
         </p:xfrm>
         <a:graphic>
           <a:graphicData uri="http://schemas.openxmlformats.org/drawingml/2006/diagram">
-            <dgm:relIds xmlns:dgm="http://schemas.openxmlformats.org/drawingml/2006/diagram" xmlns:r="http://schemas.openxmlformats.org/officeDocument/2006/relationships" r:dm="rId3" r:lo="rId4" r:qs="rId5" r:cs="rId6"/>
+            <dgm:relIds xmlns:dgm="http://schemas.openxmlformats.org/drawingml/2006/diagram" xmlns:r="http://schemas.openxmlformats.org/officeDocument/2006/relationships" r:dm="rId4" r:lo="rId5" r:qs="rId6" r:cs="rId7"/>
           </a:graphicData>
         </a:graphic>
       </p:graphicFrame>
@@ -28905,7 +29581,7 @@
           <p:nvPr/>
         </p:nvPicPr>
         <p:blipFill>
-          <a:blip r:embed="rId2"/>
+          <a:blip r:embed="rId3"/>
           <a:stretch>
             <a:fillRect/>
           </a:stretch>
@@ -28947,7 +29623,7 @@
         </p:xfrm>
         <a:graphic>
           <a:graphicData uri="http://schemas.openxmlformats.org/drawingml/2006/diagram">
-            <dgm:relIds xmlns:dgm="http://schemas.openxmlformats.org/drawingml/2006/diagram" xmlns:r="http://schemas.openxmlformats.org/officeDocument/2006/relationships" r:dm="rId8" r:lo="rId9" r:qs="rId10" r:cs="rId11"/>
+            <dgm:relIds xmlns:dgm="http://schemas.openxmlformats.org/drawingml/2006/diagram" xmlns:r="http://schemas.openxmlformats.org/officeDocument/2006/relationships" r:dm="rId9" r:lo="rId10" r:qs="rId11" r:cs="rId12"/>
           </a:graphicData>
         </a:graphic>
       </p:graphicFrame>
@@ -29751,6 +30427,13 @@
   <p:transition>
     <p:zoom/>
   </p:transition>
+  <p:timing>
+    <p:tnLst>
+      <p:par>
+        <p:cTn id="1" dur="indefinite" restart="never" nodeType="tmRoot"/>
+      </p:par>
+    </p:tnLst>
+  </p:timing>
 </p:sld>
 </file>
 
@@ -30788,6 +31471,13 @@
   <p:transition>
     <p:zoom/>
   </p:transition>
+  <p:timing>
+    <p:tnLst>
+      <p:par>
+        <p:cTn id="1" dur="indefinite" restart="never" nodeType="tmRoot"/>
+      </p:par>
+    </p:tnLst>
+  </p:timing>
 </p:sld>
 </file>
 

</xml_diff>